<commit_message>
- Adding new weather metrics to data_processing and model training - Adding directory for Graphs model results - Adding short and long trip for model
</commit_message>
<xml_diff>
--- a/PowerPoint/Updated_Presentation_Uber.pptx
+++ b/PowerPoint/Updated_Presentation_Uber.pptx
@@ -9,6 +9,7 @@
     <p:sldId id="257" r:id="rId3"/>
     <p:sldId id="258" r:id="rId4"/>
     <p:sldId id="261" r:id="rId5"/>
+    <p:sldId id="262" r:id="rId6"/>
   </p:sldIdLst>
   <p:sldSz cx="12192000" cy="6858000"/>
   <p:notesSz cx="6858000" cy="9144000"/>
@@ -3425,7 +3426,7 @@
                 </a:solidFill>
                 <a:latin typeface="Uber Move Medium" panose="02010603030201060303" pitchFamily="50" charset="0"/>
               </a:rPr>
-              <a:t>By: João Pedro Martins Longo Zucoloto</a:t>
+              <a:t>By Zucoloto, João Pedro</a:t>
             </a:r>
             <a:endParaRPr lang="pt-BR" dirty="0">
               <a:solidFill>
@@ -3900,88 +3901,6 @@
       </p:grpSpPr>
       <p:sp>
         <p:nvSpPr>
-          <p:cNvPr id="2" name="Título 1">
-            <a:extLst>
-              <a:ext uri="{FF2B5EF4-FFF2-40B4-BE49-F238E27FC236}">
-                <a16:creationId xmlns:a16="http://schemas.microsoft.com/office/drawing/2014/main" id="{52EF5014-AD24-73CC-7B83-0B80621F65E6}"/>
-              </a:ext>
-            </a:extLst>
-          </p:cNvPr>
-          <p:cNvSpPr>
-            <a:spLocks noGrp="1"/>
-          </p:cNvSpPr>
-          <p:nvPr>
-            <p:ph type="ctrTitle"/>
-          </p:nvPr>
-        </p:nvSpPr>
-        <p:spPr>
-          <a:xfrm>
-            <a:off x="107950" y="215900"/>
-            <a:ext cx="2520950" cy="508000"/>
-          </a:xfrm>
-        </p:spPr>
-        <p:txBody>
-          <a:bodyPr>
-            <a:normAutofit fontScale="90000"/>
-          </a:bodyPr>
-          <a:lstStyle/>
-          <a:p>
-            <a:r>
-              <a:rPr lang="pt-BR" sz="3200" dirty="0" err="1">
-                <a:solidFill>
-                  <a:schemeClr val="bg1"/>
-                </a:solidFill>
-                <a:latin typeface="Uber Move" panose="02010803030201060303" pitchFamily="50" charset="0"/>
-              </a:rPr>
-              <a:t>Assumptions</a:t>
-            </a:r>
-            <a:endParaRPr lang="pt-BR" sz="3200" b="1" dirty="0">
-              <a:solidFill>
-                <a:schemeClr val="bg1"/>
-              </a:solidFill>
-              <a:latin typeface="Uber Move" panose="02010803030201060303" pitchFamily="50" charset="0"/>
-            </a:endParaRPr>
-          </a:p>
-        </p:txBody>
-      </p:sp>
-      <p:sp>
-        <p:nvSpPr>
-          <p:cNvPr id="3" name="Subtítulo 2">
-            <a:extLst>
-              <a:ext uri="{FF2B5EF4-FFF2-40B4-BE49-F238E27FC236}">
-                <a16:creationId xmlns:a16="http://schemas.microsoft.com/office/drawing/2014/main" id="{5B922D05-1E2D-9712-CE32-FCB799D07B0E}"/>
-              </a:ext>
-            </a:extLst>
-          </p:cNvPr>
-          <p:cNvSpPr>
-            <a:spLocks noGrp="1"/>
-          </p:cNvSpPr>
-          <p:nvPr>
-            <p:ph type="subTitle" idx="1"/>
-          </p:nvPr>
-        </p:nvSpPr>
-        <p:spPr>
-          <a:xfrm>
-            <a:off x="1524000" y="2992438"/>
-            <a:ext cx="9144000" cy="1655762"/>
-          </a:xfrm>
-        </p:spPr>
-        <p:txBody>
-          <a:bodyPr>
-            <a:normAutofit/>
-          </a:bodyPr>
-          <a:lstStyle/>
-          <a:p>
-            <a:endParaRPr lang="en-US" dirty="0">
-              <a:solidFill>
-                <a:srgbClr val="FFFFFF"/>
-              </a:solidFill>
-            </a:endParaRPr>
-          </a:p>
-        </p:txBody>
-      </p:sp>
-      <p:sp>
-        <p:nvSpPr>
           <p:cNvPr id="4" name="Retângulo Arredondado 3">
             <a:extLst>
               <a:ext uri="{FF2B5EF4-FFF2-40B4-BE49-F238E27FC236}">
@@ -4026,7 +3945,258 @@
           <a:lstStyle/>
           <a:p>
             <a:pPr algn="ctr"/>
-            <a:endParaRPr lang="pt-BR"/>
+            <a:endParaRPr lang="pt-BR" dirty="0"/>
+          </a:p>
+        </p:txBody>
+      </p:sp>
+      <p:sp>
+        <p:nvSpPr>
+          <p:cNvPr id="2" name="Título 1">
+            <a:extLst>
+              <a:ext uri="{FF2B5EF4-FFF2-40B4-BE49-F238E27FC236}">
+                <a16:creationId xmlns:a16="http://schemas.microsoft.com/office/drawing/2014/main" id="{52EF5014-AD24-73CC-7B83-0B80621F65E6}"/>
+              </a:ext>
+            </a:extLst>
+          </p:cNvPr>
+          <p:cNvSpPr>
+            <a:spLocks noGrp="1"/>
+          </p:cNvSpPr>
+          <p:nvPr>
+            <p:ph type="ctrTitle"/>
+          </p:nvPr>
+        </p:nvSpPr>
+        <p:spPr>
+          <a:xfrm rot="16200000">
+            <a:off x="10501539" y="3412122"/>
+            <a:ext cx="2520950" cy="508000"/>
+          </a:xfrm>
+        </p:spPr>
+        <p:txBody>
+          <a:bodyPr>
+            <a:normAutofit fontScale="90000"/>
+          </a:bodyPr>
+          <a:lstStyle/>
+          <a:p>
+            <a:r>
+              <a:rPr lang="pt-BR" sz="3200" dirty="0" err="1">
+                <a:latin typeface="Uber Move" panose="02010803030201060303" pitchFamily="50" charset="0"/>
+              </a:rPr>
+              <a:t>Assumptions</a:t>
+            </a:r>
+            <a:endParaRPr lang="pt-BR" sz="3200" b="1" dirty="0">
+              <a:latin typeface="Uber Move" panose="02010803030201060303" pitchFamily="50" charset="0"/>
+            </a:endParaRPr>
+          </a:p>
+        </p:txBody>
+      </p:sp>
+      <p:pic>
+        <p:nvPicPr>
+          <p:cNvPr id="5" name="Imagem 4" descr="Gráfico, Histograma&#10;&#10;Descrição gerada automaticamente">
+            <a:extLst>
+              <a:ext uri="{FF2B5EF4-FFF2-40B4-BE49-F238E27FC236}">
+                <a16:creationId xmlns:a16="http://schemas.microsoft.com/office/drawing/2014/main" id="{74D12E19-07F5-48BA-D421-ED8ED91DE415}"/>
+              </a:ext>
+            </a:extLst>
+          </p:cNvPr>
+          <p:cNvPicPr>
+            <a:picLocks noChangeAspect="1"/>
+          </p:cNvPicPr>
+          <p:nvPr/>
+        </p:nvPicPr>
+        <p:blipFill>
+          <a:blip r:embed="rId2"/>
+          <a:stretch>
+            <a:fillRect/>
+          </a:stretch>
+        </p:blipFill>
+        <p:spPr>
+          <a:xfrm>
+            <a:off x="5744301" y="302674"/>
+            <a:ext cx="4101962" cy="3076471"/>
+          </a:xfrm>
+          <a:prstGeom prst="rect">
+            <a:avLst/>
+          </a:prstGeom>
+        </p:spPr>
+      </p:pic>
+      <p:pic>
+        <p:nvPicPr>
+          <p:cNvPr id="7" name="Imagem 6" descr="Uma imagem contendo Logotipo&#10;&#10;Descrição gerada automaticamente">
+            <a:extLst>
+              <a:ext uri="{FF2B5EF4-FFF2-40B4-BE49-F238E27FC236}">
+                <a16:creationId xmlns:a16="http://schemas.microsoft.com/office/drawing/2014/main" id="{F9BBF8D2-3E1B-B7AA-B7F7-F877E6CD3936}"/>
+              </a:ext>
+            </a:extLst>
+          </p:cNvPr>
+          <p:cNvPicPr>
+            <a:picLocks noChangeAspect="1"/>
+          </p:cNvPicPr>
+          <p:nvPr/>
+        </p:nvPicPr>
+        <p:blipFill>
+          <a:blip r:embed="rId3"/>
+          <a:stretch>
+            <a:fillRect/>
+          </a:stretch>
+        </p:blipFill>
+        <p:spPr>
+          <a:xfrm>
+            <a:off x="-287224" y="3432070"/>
+            <a:ext cx="4032747" cy="3024560"/>
+          </a:xfrm>
+          <a:prstGeom prst="rect">
+            <a:avLst/>
+          </a:prstGeom>
+        </p:spPr>
+      </p:pic>
+      <p:pic>
+        <p:nvPicPr>
+          <p:cNvPr id="9" name="Imagem 8" descr="Uma imagem contendo Logotipo&#10;&#10;Descrição gerada automaticamente">
+            <a:extLst>
+              <a:ext uri="{FF2B5EF4-FFF2-40B4-BE49-F238E27FC236}">
+                <a16:creationId xmlns:a16="http://schemas.microsoft.com/office/drawing/2014/main" id="{12267A65-0551-99B9-3A1D-E960012FA274}"/>
+              </a:ext>
+            </a:extLst>
+          </p:cNvPr>
+          <p:cNvPicPr>
+            <a:picLocks noChangeAspect="1"/>
+          </p:cNvPicPr>
+          <p:nvPr/>
+        </p:nvPicPr>
+        <p:blipFill>
+          <a:blip r:embed="rId4"/>
+          <a:stretch>
+            <a:fillRect/>
+          </a:stretch>
+        </p:blipFill>
+        <p:spPr>
+          <a:xfrm>
+            <a:off x="5726720" y="3666122"/>
+            <a:ext cx="3165239" cy="2373929"/>
+          </a:xfrm>
+          <a:prstGeom prst="rect">
+            <a:avLst/>
+          </a:prstGeom>
+        </p:spPr>
+      </p:pic>
+      <p:pic>
+        <p:nvPicPr>
+          <p:cNvPr id="11" name="Imagem 10" descr="Texto&#10;&#10;Descrição gerada automaticamente com confiança baixa">
+            <a:extLst>
+              <a:ext uri="{FF2B5EF4-FFF2-40B4-BE49-F238E27FC236}">
+                <a16:creationId xmlns:a16="http://schemas.microsoft.com/office/drawing/2014/main" id="{B2058130-E08F-737A-3770-8673F8B770CC}"/>
+              </a:ext>
+            </a:extLst>
+          </p:cNvPr>
+          <p:cNvPicPr>
+            <a:picLocks noChangeAspect="1"/>
+          </p:cNvPicPr>
+          <p:nvPr/>
+        </p:nvPicPr>
+        <p:blipFill>
+          <a:blip r:embed="rId5"/>
+          <a:stretch>
+            <a:fillRect/>
+          </a:stretch>
+        </p:blipFill>
+        <p:spPr>
+          <a:xfrm>
+            <a:off x="686992" y="1329998"/>
+            <a:ext cx="2868397" cy="2151298"/>
+          </a:xfrm>
+          <a:prstGeom prst="rect">
+            <a:avLst/>
+          </a:prstGeom>
+        </p:spPr>
+      </p:pic>
+      <p:sp>
+        <p:nvSpPr>
+          <p:cNvPr id="12" name="CaixaDeTexto 11">
+            <a:extLst>
+              <a:ext uri="{FF2B5EF4-FFF2-40B4-BE49-F238E27FC236}">
+                <a16:creationId xmlns:a16="http://schemas.microsoft.com/office/drawing/2014/main" id="{DE7B19A6-F720-5C67-9DF0-36912173E853}"/>
+              </a:ext>
+            </a:extLst>
+          </p:cNvPr>
+          <p:cNvSpPr txBox="1"/>
+          <p:nvPr/>
+        </p:nvSpPr>
+        <p:spPr>
+          <a:xfrm>
+            <a:off x="674883" y="314783"/>
+            <a:ext cx="4032747" cy="369332"/>
+          </a:xfrm>
+          <a:prstGeom prst="rect">
+            <a:avLst/>
+          </a:prstGeom>
+          <a:noFill/>
+        </p:spPr>
+        <p:txBody>
+          <a:bodyPr wrap="square" rtlCol="0">
+            <a:spAutoFit/>
+          </a:bodyPr>
+          <a:lstStyle/>
+          <a:p>
+            <a:r>
+              <a:rPr lang="pt-BR" dirty="0">
+                <a:solidFill>
+                  <a:schemeClr val="bg1"/>
+                </a:solidFill>
+                <a:latin typeface="Uber Move" panose="02010803030201060303" pitchFamily="50" charset="0"/>
+              </a:rPr>
+              <a:t>Data </a:t>
+            </a:r>
+            <a:r>
+              <a:rPr lang="pt-BR" dirty="0" err="1">
+                <a:solidFill>
+                  <a:schemeClr val="bg1"/>
+                </a:solidFill>
+                <a:latin typeface="Uber Move" panose="02010803030201060303" pitchFamily="50" charset="0"/>
+              </a:rPr>
+              <a:t>analysis</a:t>
+            </a:r>
+            <a:r>
+              <a:rPr lang="pt-BR" dirty="0">
+                <a:solidFill>
+                  <a:schemeClr val="bg1"/>
+                </a:solidFill>
+                <a:latin typeface="Uber Move" panose="02010803030201060303" pitchFamily="50" charset="0"/>
+              </a:rPr>
+              <a:t> for </a:t>
+            </a:r>
+            <a:r>
+              <a:rPr lang="pt-BR" dirty="0" err="1">
+                <a:solidFill>
+                  <a:schemeClr val="bg1"/>
+                </a:solidFill>
+                <a:latin typeface="Uber Move" panose="02010803030201060303" pitchFamily="50" charset="0"/>
+              </a:rPr>
+              <a:t>datetime</a:t>
+            </a:r>
+            <a:r>
+              <a:rPr lang="pt-BR" dirty="0">
+                <a:solidFill>
+                  <a:schemeClr val="bg1"/>
+                </a:solidFill>
+                <a:latin typeface="Uber Move" panose="02010803030201060303" pitchFamily="50" charset="0"/>
+              </a:rPr>
+              <a:t> </a:t>
+            </a:r>
+            <a:r>
+              <a:rPr lang="pt-BR" dirty="0" err="1">
+                <a:solidFill>
+                  <a:schemeClr val="bg1"/>
+                </a:solidFill>
+                <a:latin typeface="Uber Move" panose="02010803030201060303" pitchFamily="50" charset="0"/>
+              </a:rPr>
+              <a:t>pickup</a:t>
+            </a:r>
+            <a:endParaRPr lang="pt-BR" dirty="0">
+              <a:solidFill>
+                <a:schemeClr val="bg1"/>
+              </a:solidFill>
+              <a:latin typeface="Uber Move" panose="02010803030201060303" pitchFamily="50" charset="0"/>
+            </a:endParaRPr>
           </a:p>
         </p:txBody>
       </p:sp>
@@ -4034,6 +4204,229 @@
     <p:extLst>
       <p:ext uri="{BB962C8B-B14F-4D97-AF65-F5344CB8AC3E}">
         <p14:creationId xmlns:p14="http://schemas.microsoft.com/office/powerpoint/2010/main" val="2408337061"/>
+      </p:ext>
+    </p:extLst>
+  </p:cSld>
+  <p:clrMapOvr>
+    <a:masterClrMapping/>
+  </p:clrMapOvr>
+</p:sld>
+</file>
+
+<file path=ppt/slides/slide5.xml><?xml version="1.0" encoding="utf-8"?>
+<p:sld xmlns:a="http://schemas.openxmlformats.org/drawingml/2006/main" xmlns:r="http://schemas.openxmlformats.org/officeDocument/2006/relationships" xmlns:p="http://schemas.openxmlformats.org/presentationml/2006/main">
+  <p:cSld>
+    <p:spTree>
+      <p:nvGrpSpPr>
+        <p:cNvPr id="1" name="">
+          <a:extLst>
+            <a:ext uri="{FF2B5EF4-FFF2-40B4-BE49-F238E27FC236}">
+              <a16:creationId xmlns:a16="http://schemas.microsoft.com/office/drawing/2014/main" id="{8FED7CB6-5E14-0005-F926-8DAFC98DC239}"/>
+            </a:ext>
+          </a:extLst>
+        </p:cNvPr>
+        <p:cNvGrpSpPr/>
+        <p:nvPr/>
+      </p:nvGrpSpPr>
+      <p:grpSpPr>
+        <a:xfrm>
+          <a:off x="0" y="0"/>
+          <a:ext cx="0" cy="0"/>
+          <a:chOff x="0" y="0"/>
+          <a:chExt cx="0" cy="0"/>
+        </a:xfrm>
+      </p:grpSpPr>
+      <p:sp>
+        <p:nvSpPr>
+          <p:cNvPr id="4" name="Retângulo Arredondado 3">
+            <a:extLst>
+              <a:ext uri="{FF2B5EF4-FFF2-40B4-BE49-F238E27FC236}">
+                <a16:creationId xmlns:a16="http://schemas.microsoft.com/office/drawing/2014/main" id="{FF157ED4-2208-3509-674C-6D8E0FEA05CC}"/>
+              </a:ext>
+            </a:extLst>
+          </p:cNvPr>
+          <p:cNvSpPr/>
+          <p:nvPr/>
+        </p:nvSpPr>
+        <p:spPr>
+          <a:xfrm>
+            <a:off x="11332028" y="-234043"/>
+            <a:ext cx="859972" cy="7326086"/>
+          </a:xfrm>
+          <a:prstGeom prst="roundRect">
+            <a:avLst/>
+          </a:prstGeom>
+          <a:solidFill>
+            <a:schemeClr val="bg1"/>
+          </a:solidFill>
+          <a:ln>
+            <a:noFill/>
+          </a:ln>
+        </p:spPr>
+        <p:style>
+          <a:lnRef idx="0">
+            <a:scrgbClr r="0" g="0" b="0"/>
+          </a:lnRef>
+          <a:fillRef idx="0">
+            <a:scrgbClr r="0" g="0" b="0"/>
+          </a:fillRef>
+          <a:effectRef idx="0">
+            <a:scrgbClr r="0" g="0" b="0"/>
+          </a:effectRef>
+          <a:fontRef idx="minor">
+            <a:schemeClr val="lt1"/>
+          </a:fontRef>
+        </p:style>
+        <p:txBody>
+          <a:bodyPr rtlCol="0" anchor="ctr"/>
+          <a:lstStyle/>
+          <a:p>
+            <a:pPr algn="ctr"/>
+            <a:endParaRPr lang="pt-BR" dirty="0"/>
+          </a:p>
+        </p:txBody>
+      </p:sp>
+      <p:sp>
+        <p:nvSpPr>
+          <p:cNvPr id="2" name="Título 1">
+            <a:extLst>
+              <a:ext uri="{FF2B5EF4-FFF2-40B4-BE49-F238E27FC236}">
+                <a16:creationId xmlns:a16="http://schemas.microsoft.com/office/drawing/2014/main" id="{B2980D83-5B00-5747-33BE-3246F77926F0}"/>
+              </a:ext>
+            </a:extLst>
+          </p:cNvPr>
+          <p:cNvSpPr>
+            <a:spLocks noGrp="1"/>
+          </p:cNvSpPr>
+          <p:nvPr>
+            <p:ph type="ctrTitle"/>
+          </p:nvPr>
+        </p:nvSpPr>
+        <p:spPr>
+          <a:xfrm rot="16200000">
+            <a:off x="10501539" y="3412122"/>
+            <a:ext cx="2520950" cy="508000"/>
+          </a:xfrm>
+        </p:spPr>
+        <p:txBody>
+          <a:bodyPr>
+            <a:normAutofit fontScale="90000"/>
+          </a:bodyPr>
+          <a:lstStyle/>
+          <a:p>
+            <a:r>
+              <a:rPr lang="pt-BR" sz="3200" dirty="0" err="1">
+                <a:latin typeface="Uber Move" panose="02010803030201060303" pitchFamily="50" charset="0"/>
+              </a:rPr>
+              <a:t>Assumptions</a:t>
+            </a:r>
+            <a:endParaRPr lang="pt-BR" sz="3200" b="1" dirty="0">
+              <a:latin typeface="Uber Move" panose="02010803030201060303" pitchFamily="50" charset="0"/>
+            </a:endParaRPr>
+          </a:p>
+        </p:txBody>
+      </p:sp>
+      <p:pic>
+        <p:nvPicPr>
+          <p:cNvPr id="7" name="Imagem 6" descr="Uma imagem contendo Texto&#10;&#10;Descrição gerada automaticamente">
+            <a:extLst>
+              <a:ext uri="{FF2B5EF4-FFF2-40B4-BE49-F238E27FC236}">
+                <a16:creationId xmlns:a16="http://schemas.microsoft.com/office/drawing/2014/main" id="{D2ABF249-EBB5-4745-E1B0-FF4D0C8FAEB4}"/>
+              </a:ext>
+            </a:extLst>
+          </p:cNvPr>
+          <p:cNvPicPr>
+            <a:picLocks noChangeAspect="1"/>
+          </p:cNvPicPr>
+          <p:nvPr/>
+        </p:nvPicPr>
+        <p:blipFill>
+          <a:blip r:embed="rId2"/>
+          <a:stretch>
+            <a:fillRect/>
+          </a:stretch>
+        </p:blipFill>
+        <p:spPr>
+          <a:xfrm>
+            <a:off x="2307017" y="587263"/>
+            <a:ext cx="7577966" cy="5683474"/>
+          </a:xfrm>
+          <a:prstGeom prst="rect">
+            <a:avLst/>
+          </a:prstGeom>
+        </p:spPr>
+      </p:pic>
+      <p:sp>
+        <p:nvSpPr>
+          <p:cNvPr id="3" name="CaixaDeTexto 2">
+            <a:extLst>
+              <a:ext uri="{FF2B5EF4-FFF2-40B4-BE49-F238E27FC236}">
+                <a16:creationId xmlns:a16="http://schemas.microsoft.com/office/drawing/2014/main" id="{138B790E-F51D-F333-9F19-2FAA8DFD446A}"/>
+              </a:ext>
+            </a:extLst>
+          </p:cNvPr>
+          <p:cNvSpPr txBox="1"/>
+          <p:nvPr/>
+        </p:nvSpPr>
+        <p:spPr>
+          <a:xfrm>
+            <a:off x="397043" y="217931"/>
+            <a:ext cx="4032747" cy="369332"/>
+          </a:xfrm>
+          <a:prstGeom prst="rect">
+            <a:avLst/>
+          </a:prstGeom>
+          <a:noFill/>
+        </p:spPr>
+        <p:txBody>
+          <a:bodyPr wrap="square" rtlCol="0">
+            <a:spAutoFit/>
+          </a:bodyPr>
+          <a:lstStyle/>
+          <a:p>
+            <a:r>
+              <a:rPr lang="pt-BR" dirty="0" err="1">
+                <a:solidFill>
+                  <a:schemeClr val="bg1"/>
+                </a:solidFill>
+                <a:latin typeface="Uber Move" panose="02010803030201060303" pitchFamily="50" charset="0"/>
+              </a:rPr>
+              <a:t>Importance</a:t>
+            </a:r>
+            <a:r>
+              <a:rPr lang="pt-BR" dirty="0">
+                <a:solidFill>
+                  <a:schemeClr val="bg1"/>
+                </a:solidFill>
+                <a:latin typeface="Uber Move" panose="02010803030201060303" pitchFamily="50" charset="0"/>
+              </a:rPr>
+              <a:t> for </a:t>
+            </a:r>
+            <a:r>
+              <a:rPr lang="pt-BR" dirty="0" err="1">
+                <a:solidFill>
+                  <a:schemeClr val="bg1"/>
+                </a:solidFill>
+                <a:latin typeface="Uber Move" panose="02010803030201060303" pitchFamily="50" charset="0"/>
+              </a:rPr>
+              <a:t>each</a:t>
+            </a:r>
+            <a:r>
+              <a:rPr lang="pt-BR" dirty="0">
+                <a:solidFill>
+                  <a:schemeClr val="bg1"/>
+                </a:solidFill>
+                <a:latin typeface="Uber Move" panose="02010803030201060303" pitchFamily="50" charset="0"/>
+              </a:rPr>
+              <a:t> feature</a:t>
+            </a:r>
+          </a:p>
+        </p:txBody>
+      </p:sp>
+    </p:spTree>
+    <p:extLst>
+      <p:ext uri="{BB962C8B-B14F-4D97-AF65-F5344CB8AC3E}">
+        <p14:creationId xmlns:p14="http://schemas.microsoft.com/office/powerpoint/2010/main" val="1361207640"/>
       </p:ext>
     </p:extLst>
   </p:cSld>

</xml_diff>

<commit_message>
- Adding feature to remove or not the outliers
</commit_message>
<xml_diff>
--- a/PowerPoint/Updated_Presentation_Uber.pptx
+++ b/PowerPoint/Updated_Presentation_Uber.pptx
@@ -9,7 +9,14 @@
     <p:sldId id="257" r:id="rId3"/>
     <p:sldId id="258" r:id="rId4"/>
     <p:sldId id="261" r:id="rId5"/>
-    <p:sldId id="262" r:id="rId6"/>
+    <p:sldId id="263" r:id="rId6"/>
+    <p:sldId id="264" r:id="rId7"/>
+    <p:sldId id="265" r:id="rId8"/>
+    <p:sldId id="267" r:id="rId9"/>
+    <p:sldId id="266" r:id="rId10"/>
+    <p:sldId id="268" r:id="rId11"/>
+    <p:sldId id="269" r:id="rId12"/>
+    <p:sldId id="262" r:id="rId13"/>
   </p:sldIdLst>
   <p:sldSz cx="12192000" cy="6858000"/>
   <p:notesSz cx="6858000" cy="9144000"/>
@@ -110,7 +117,18 @@
   </p:defaultTextStyle>
   <p:extLst>
     <p:ext uri="{EFAFB233-063F-42B5-8137-9DF3F51BA10A}">
-      <p15:sldGuideLst xmlns:p15="http://schemas.microsoft.com/office/powerpoint/2012/main"/>
+      <p15:sldGuideLst xmlns:p15="http://schemas.microsoft.com/office/powerpoint/2012/main">
+        <p15:guide id="1" orient="horz" pos="2160" userDrawn="1">
+          <p15:clr>
+            <a:srgbClr val="A4A3A4"/>
+          </p15:clr>
+        </p15:guide>
+        <p15:guide id="2" pos="3840" userDrawn="1">
+          <p15:clr>
+            <a:srgbClr val="A4A3A4"/>
+          </p15:clr>
+        </p15:guide>
+      </p15:sldGuideLst>
     </p:ext>
   </p:extLst>
 </p:presentation>
@@ -3351,8 +3369,8 @@
         </p:nvSpPr>
         <p:spPr>
           <a:xfrm>
-            <a:off x="4216400" y="1255144"/>
-            <a:ext cx="3759200" cy="1058863"/>
+            <a:off x="4756150" y="1140844"/>
+            <a:ext cx="1993900" cy="1058863"/>
           </a:xfrm>
         </p:spPr>
         <p:txBody>
@@ -3391,8 +3409,8 @@
         </p:nvSpPr>
         <p:spPr>
           <a:xfrm>
-            <a:off x="1524000" y="3371057"/>
-            <a:ext cx="9144000" cy="1655762"/>
+            <a:off x="1076325" y="3088257"/>
+            <a:ext cx="9353550" cy="1655762"/>
           </a:xfrm>
         </p:spPr>
         <p:txBody>
@@ -3497,6 +3515,838 @@
   <p:clrMapOvr>
     <a:masterClrMapping/>
   </p:clrMapOvr>
+</p:sld>
+</file>
+
+<file path=ppt/slides/slide10.xml><?xml version="1.0" encoding="utf-8"?>
+<p:sld xmlns:a="http://schemas.openxmlformats.org/drawingml/2006/main" xmlns:r="http://schemas.openxmlformats.org/officeDocument/2006/relationships" xmlns:p="http://schemas.openxmlformats.org/presentationml/2006/main">
+  <p:cSld>
+    <p:spTree>
+      <p:nvGrpSpPr>
+        <p:cNvPr id="1" name="">
+          <a:extLst>
+            <a:ext uri="{FF2B5EF4-FFF2-40B4-BE49-F238E27FC236}">
+              <a16:creationId xmlns:a16="http://schemas.microsoft.com/office/drawing/2014/main" id="{0C2E2F90-CA87-911B-91AF-78580F999755}"/>
+            </a:ext>
+          </a:extLst>
+        </p:cNvPr>
+        <p:cNvGrpSpPr/>
+        <p:nvPr/>
+      </p:nvGrpSpPr>
+      <p:grpSpPr>
+        <a:xfrm>
+          <a:off x="0" y="0"/>
+          <a:ext cx="0" cy="0"/>
+          <a:chOff x="0" y="0"/>
+          <a:chExt cx="0" cy="0"/>
+        </a:xfrm>
+      </p:grpSpPr>
+      <p:sp>
+        <p:nvSpPr>
+          <p:cNvPr id="4" name="Retângulo Arredondado 3">
+            <a:extLst>
+              <a:ext uri="{FF2B5EF4-FFF2-40B4-BE49-F238E27FC236}">
+                <a16:creationId xmlns:a16="http://schemas.microsoft.com/office/drawing/2014/main" id="{DE8F909E-2628-57A4-AB09-43A35A119885}"/>
+              </a:ext>
+            </a:extLst>
+          </p:cNvPr>
+          <p:cNvSpPr/>
+          <p:nvPr/>
+        </p:nvSpPr>
+        <p:spPr>
+          <a:xfrm>
+            <a:off x="11332028" y="-234043"/>
+            <a:ext cx="859972" cy="7326086"/>
+          </a:xfrm>
+          <a:prstGeom prst="roundRect">
+            <a:avLst/>
+          </a:prstGeom>
+          <a:solidFill>
+            <a:schemeClr val="bg1"/>
+          </a:solidFill>
+          <a:ln>
+            <a:noFill/>
+          </a:ln>
+        </p:spPr>
+        <p:style>
+          <a:lnRef idx="0">
+            <a:scrgbClr r="0" g="0" b="0"/>
+          </a:lnRef>
+          <a:fillRef idx="0">
+            <a:scrgbClr r="0" g="0" b="0"/>
+          </a:fillRef>
+          <a:effectRef idx="0">
+            <a:scrgbClr r="0" g="0" b="0"/>
+          </a:effectRef>
+          <a:fontRef idx="minor">
+            <a:schemeClr val="lt1"/>
+          </a:fontRef>
+        </p:style>
+        <p:txBody>
+          <a:bodyPr rtlCol="0" anchor="ctr"/>
+          <a:lstStyle/>
+          <a:p>
+            <a:pPr algn="ctr"/>
+            <a:endParaRPr lang="pt-BR" dirty="0"/>
+          </a:p>
+        </p:txBody>
+      </p:sp>
+      <p:sp>
+        <p:nvSpPr>
+          <p:cNvPr id="2" name="Título 1">
+            <a:extLst>
+              <a:ext uri="{FF2B5EF4-FFF2-40B4-BE49-F238E27FC236}">
+                <a16:creationId xmlns:a16="http://schemas.microsoft.com/office/drawing/2014/main" id="{B9F6D251-CCC9-05EB-F0E5-9332247B9EB5}"/>
+              </a:ext>
+            </a:extLst>
+          </p:cNvPr>
+          <p:cNvSpPr>
+            <a:spLocks noGrp="1"/>
+          </p:cNvSpPr>
+          <p:nvPr>
+            <p:ph type="ctrTitle"/>
+          </p:nvPr>
+        </p:nvSpPr>
+        <p:spPr>
+          <a:xfrm rot="16200000">
+            <a:off x="10501539" y="3412122"/>
+            <a:ext cx="2520950" cy="508000"/>
+          </a:xfrm>
+        </p:spPr>
+        <p:txBody>
+          <a:bodyPr>
+            <a:normAutofit fontScale="90000"/>
+          </a:bodyPr>
+          <a:lstStyle/>
+          <a:p>
+            <a:r>
+              <a:rPr lang="pt-BR" sz="3200" dirty="0" err="1">
+                <a:latin typeface="Uber Move" panose="02010803030201060303" pitchFamily="50" charset="0"/>
+              </a:rPr>
+              <a:t>Assumptions</a:t>
+            </a:r>
+            <a:endParaRPr lang="pt-BR" sz="3200" b="1" dirty="0">
+              <a:latin typeface="Uber Move" panose="02010803030201060303" pitchFamily="50" charset="0"/>
+            </a:endParaRPr>
+          </a:p>
+        </p:txBody>
+      </p:sp>
+      <p:pic>
+        <p:nvPicPr>
+          <p:cNvPr id="5" name="Imagem 4" descr="Gráfico, Histograma&#10;&#10;Descrição gerada automaticamente">
+            <a:extLst>
+              <a:ext uri="{FF2B5EF4-FFF2-40B4-BE49-F238E27FC236}">
+                <a16:creationId xmlns:a16="http://schemas.microsoft.com/office/drawing/2014/main" id="{7A104058-8FA4-39D2-5BDA-8E24FCF8CC6E}"/>
+              </a:ext>
+            </a:extLst>
+          </p:cNvPr>
+          <p:cNvPicPr>
+            <a:picLocks noChangeAspect="1"/>
+          </p:cNvPicPr>
+          <p:nvPr/>
+        </p:nvPicPr>
+        <p:blipFill>
+          <a:blip r:embed="rId2"/>
+          <a:stretch>
+            <a:fillRect/>
+          </a:stretch>
+        </p:blipFill>
+        <p:spPr>
+          <a:xfrm>
+            <a:off x="6930207" y="4111056"/>
+            <a:ext cx="2400000" cy="1800000"/>
+          </a:xfrm>
+          <a:prstGeom prst="rect">
+            <a:avLst/>
+          </a:prstGeom>
+        </p:spPr>
+      </p:pic>
+      <p:pic>
+        <p:nvPicPr>
+          <p:cNvPr id="7" name="Imagem 6" descr="Uma imagem contendo Logotipo&#10;&#10;Descrição gerada automaticamente">
+            <a:extLst>
+              <a:ext uri="{FF2B5EF4-FFF2-40B4-BE49-F238E27FC236}">
+                <a16:creationId xmlns:a16="http://schemas.microsoft.com/office/drawing/2014/main" id="{CA2ADE70-F3F9-21DF-33F1-FEAD05610FB9}"/>
+              </a:ext>
+            </a:extLst>
+          </p:cNvPr>
+          <p:cNvPicPr>
+            <a:picLocks noChangeAspect="1"/>
+          </p:cNvPicPr>
+          <p:nvPr/>
+        </p:nvPicPr>
+        <p:blipFill>
+          <a:blip r:embed="rId3"/>
+          <a:stretch>
+            <a:fillRect/>
+          </a:stretch>
+        </p:blipFill>
+        <p:spPr>
+          <a:xfrm>
+            <a:off x="6930207" y="1695675"/>
+            <a:ext cx="2400000" cy="1800000"/>
+          </a:xfrm>
+          <a:prstGeom prst="rect">
+            <a:avLst/>
+          </a:prstGeom>
+        </p:spPr>
+      </p:pic>
+      <p:pic>
+        <p:nvPicPr>
+          <p:cNvPr id="9" name="Imagem 8" descr="Uma imagem contendo Logotipo&#10;&#10;Descrição gerada automaticamente">
+            <a:extLst>
+              <a:ext uri="{FF2B5EF4-FFF2-40B4-BE49-F238E27FC236}">
+                <a16:creationId xmlns:a16="http://schemas.microsoft.com/office/drawing/2014/main" id="{CD1B1291-2F63-72C5-54A2-F53A3A97BC5B}"/>
+              </a:ext>
+            </a:extLst>
+          </p:cNvPr>
+          <p:cNvPicPr>
+            <a:picLocks noChangeAspect="1"/>
+          </p:cNvPicPr>
+          <p:nvPr/>
+        </p:nvPicPr>
+        <p:blipFill>
+          <a:blip r:embed="rId4"/>
+          <a:stretch>
+            <a:fillRect/>
+          </a:stretch>
+        </p:blipFill>
+        <p:spPr>
+          <a:xfrm>
+            <a:off x="1869269" y="1629000"/>
+            <a:ext cx="2400000" cy="1800000"/>
+          </a:xfrm>
+          <a:prstGeom prst="rect">
+            <a:avLst/>
+          </a:prstGeom>
+        </p:spPr>
+      </p:pic>
+      <p:pic>
+        <p:nvPicPr>
+          <p:cNvPr id="11" name="Imagem 10" descr="Texto&#10;&#10;Descrição gerada automaticamente com confiança baixa">
+            <a:extLst>
+              <a:ext uri="{FF2B5EF4-FFF2-40B4-BE49-F238E27FC236}">
+                <a16:creationId xmlns:a16="http://schemas.microsoft.com/office/drawing/2014/main" id="{C69B8A18-0AD1-242B-1C8A-5B2254AE65F8}"/>
+              </a:ext>
+            </a:extLst>
+          </p:cNvPr>
+          <p:cNvPicPr>
+            <a:picLocks noChangeAspect="1"/>
+          </p:cNvPicPr>
+          <p:nvPr/>
+        </p:nvPicPr>
+        <p:blipFill>
+          <a:blip r:embed="rId5"/>
+          <a:stretch>
+            <a:fillRect/>
+          </a:stretch>
+        </p:blipFill>
+        <p:spPr>
+          <a:xfrm>
+            <a:off x="1869269" y="4111056"/>
+            <a:ext cx="2400000" cy="1800000"/>
+          </a:xfrm>
+          <a:prstGeom prst="rect">
+            <a:avLst/>
+          </a:prstGeom>
+        </p:spPr>
+      </p:pic>
+      <p:sp>
+        <p:nvSpPr>
+          <p:cNvPr id="12" name="CaixaDeTexto 11">
+            <a:extLst>
+              <a:ext uri="{FF2B5EF4-FFF2-40B4-BE49-F238E27FC236}">
+                <a16:creationId xmlns:a16="http://schemas.microsoft.com/office/drawing/2014/main" id="{AEB70764-5741-EF15-A385-8B5151C25A9F}"/>
+              </a:ext>
+            </a:extLst>
+          </p:cNvPr>
+          <p:cNvSpPr txBox="1"/>
+          <p:nvPr/>
+        </p:nvSpPr>
+        <p:spPr>
+          <a:xfrm>
+            <a:off x="994846" y="485279"/>
+            <a:ext cx="5015305" cy="461665"/>
+          </a:xfrm>
+          <a:prstGeom prst="rect">
+            <a:avLst/>
+          </a:prstGeom>
+          <a:noFill/>
+        </p:spPr>
+        <p:txBody>
+          <a:bodyPr wrap="square" rtlCol="0">
+            <a:spAutoFit/>
+          </a:bodyPr>
+          <a:lstStyle/>
+          <a:p>
+            <a:r>
+              <a:rPr lang="pt-BR" sz="2400" dirty="0">
+                <a:solidFill>
+                  <a:schemeClr val="bg1"/>
+                </a:solidFill>
+                <a:latin typeface="Uber Move" panose="02010803030201060303" pitchFamily="50" charset="0"/>
+              </a:rPr>
+              <a:t>Data </a:t>
+            </a:r>
+            <a:r>
+              <a:rPr lang="pt-BR" sz="2400" dirty="0" err="1">
+                <a:solidFill>
+                  <a:schemeClr val="bg1"/>
+                </a:solidFill>
+                <a:latin typeface="Uber Move" panose="02010803030201060303" pitchFamily="50" charset="0"/>
+              </a:rPr>
+              <a:t>analysis</a:t>
+            </a:r>
+            <a:r>
+              <a:rPr lang="pt-BR" sz="2400" dirty="0">
+                <a:solidFill>
+                  <a:schemeClr val="bg1"/>
+                </a:solidFill>
+                <a:latin typeface="Uber Move" panose="02010803030201060303" pitchFamily="50" charset="0"/>
+              </a:rPr>
+              <a:t> for </a:t>
+            </a:r>
+            <a:r>
+              <a:rPr lang="pt-BR" sz="2400" dirty="0" err="1">
+                <a:solidFill>
+                  <a:schemeClr val="bg1"/>
+                </a:solidFill>
+                <a:latin typeface="Uber Move" panose="02010803030201060303" pitchFamily="50" charset="0"/>
+              </a:rPr>
+              <a:t>datetime</a:t>
+            </a:r>
+            <a:r>
+              <a:rPr lang="pt-BR" sz="2400" dirty="0">
+                <a:solidFill>
+                  <a:schemeClr val="bg1"/>
+                </a:solidFill>
+                <a:latin typeface="Uber Move" panose="02010803030201060303" pitchFamily="50" charset="0"/>
+              </a:rPr>
+              <a:t> </a:t>
+            </a:r>
+            <a:r>
+              <a:rPr lang="pt-BR" sz="2400" dirty="0" err="1">
+                <a:solidFill>
+                  <a:schemeClr val="bg1"/>
+                </a:solidFill>
+                <a:latin typeface="Uber Move" panose="02010803030201060303" pitchFamily="50" charset="0"/>
+              </a:rPr>
+              <a:t>pickup</a:t>
+            </a:r>
+            <a:endParaRPr lang="pt-BR" sz="2400" dirty="0">
+              <a:solidFill>
+                <a:schemeClr val="bg1"/>
+              </a:solidFill>
+              <a:latin typeface="Uber Move" panose="02010803030201060303" pitchFamily="50" charset="0"/>
+            </a:endParaRPr>
+          </a:p>
+        </p:txBody>
+      </p:sp>
+    </p:spTree>
+    <p:extLst>
+      <p:ext uri="{BB962C8B-B14F-4D97-AF65-F5344CB8AC3E}">
+        <p14:creationId xmlns:p14="http://schemas.microsoft.com/office/powerpoint/2010/main" val="255552952"/>
+      </p:ext>
+    </p:extLst>
+  </p:cSld>
+  <p:clrMapOvr>
+    <a:masterClrMapping/>
+  </p:clrMapOvr>
+  <mc:AlternateContent xmlns:mc="http://schemas.openxmlformats.org/markup-compatibility/2006">
+    <mc:Choice xmlns:p159="http://schemas.microsoft.com/office/powerpoint/2015/09/main" Requires="p159">
+      <p:transition spd="slow" advClick="0">
+        <p159:morph option="byObject"/>
+      </p:transition>
+    </mc:Choice>
+    <mc:Fallback>
+      <p:transition spd="slow" advClick="0">
+        <p:fade/>
+      </p:transition>
+    </mc:Fallback>
+  </mc:AlternateContent>
+</p:sld>
+</file>
+
+<file path=ppt/slides/slide11.xml><?xml version="1.0" encoding="utf-8"?>
+<p:sld xmlns:a="http://schemas.openxmlformats.org/drawingml/2006/main" xmlns:r="http://schemas.openxmlformats.org/officeDocument/2006/relationships" xmlns:p="http://schemas.openxmlformats.org/presentationml/2006/main">
+  <p:cSld>
+    <p:spTree>
+      <p:nvGrpSpPr>
+        <p:cNvPr id="1" name="">
+          <a:extLst>
+            <a:ext uri="{FF2B5EF4-FFF2-40B4-BE49-F238E27FC236}">
+              <a16:creationId xmlns:a16="http://schemas.microsoft.com/office/drawing/2014/main" id="{0AD44174-DD00-BBAE-5DBE-E3877E8281C0}"/>
+            </a:ext>
+          </a:extLst>
+        </p:cNvPr>
+        <p:cNvGrpSpPr/>
+        <p:nvPr/>
+      </p:nvGrpSpPr>
+      <p:grpSpPr>
+        <a:xfrm>
+          <a:off x="0" y="0"/>
+          <a:ext cx="0" cy="0"/>
+          <a:chOff x="0" y="0"/>
+          <a:chExt cx="0" cy="0"/>
+        </a:xfrm>
+      </p:grpSpPr>
+      <p:sp>
+        <p:nvSpPr>
+          <p:cNvPr id="4" name="Retângulo Arredondado 3">
+            <a:extLst>
+              <a:ext uri="{FF2B5EF4-FFF2-40B4-BE49-F238E27FC236}">
+                <a16:creationId xmlns:a16="http://schemas.microsoft.com/office/drawing/2014/main" id="{04EFBE86-49E0-4643-3AEF-C883E0C25887}"/>
+              </a:ext>
+            </a:extLst>
+          </p:cNvPr>
+          <p:cNvSpPr/>
+          <p:nvPr/>
+        </p:nvSpPr>
+        <p:spPr>
+          <a:xfrm>
+            <a:off x="11332028" y="-234043"/>
+            <a:ext cx="859972" cy="7326086"/>
+          </a:xfrm>
+          <a:prstGeom prst="roundRect">
+            <a:avLst/>
+          </a:prstGeom>
+          <a:solidFill>
+            <a:schemeClr val="bg1"/>
+          </a:solidFill>
+          <a:ln>
+            <a:noFill/>
+          </a:ln>
+        </p:spPr>
+        <p:style>
+          <a:lnRef idx="0">
+            <a:scrgbClr r="0" g="0" b="0"/>
+          </a:lnRef>
+          <a:fillRef idx="0">
+            <a:scrgbClr r="0" g="0" b="0"/>
+          </a:fillRef>
+          <a:effectRef idx="0">
+            <a:scrgbClr r="0" g="0" b="0"/>
+          </a:effectRef>
+          <a:fontRef idx="minor">
+            <a:schemeClr val="lt1"/>
+          </a:fontRef>
+        </p:style>
+        <p:txBody>
+          <a:bodyPr rtlCol="0" anchor="ctr"/>
+          <a:lstStyle/>
+          <a:p>
+            <a:pPr algn="ctr"/>
+            <a:endParaRPr lang="pt-BR" dirty="0"/>
+          </a:p>
+        </p:txBody>
+      </p:sp>
+      <p:sp>
+        <p:nvSpPr>
+          <p:cNvPr id="2" name="Título 1">
+            <a:extLst>
+              <a:ext uri="{FF2B5EF4-FFF2-40B4-BE49-F238E27FC236}">
+                <a16:creationId xmlns:a16="http://schemas.microsoft.com/office/drawing/2014/main" id="{27B5E116-FA4C-DF24-AE78-AA1B9AFAD0DD}"/>
+              </a:ext>
+            </a:extLst>
+          </p:cNvPr>
+          <p:cNvSpPr>
+            <a:spLocks noGrp="1"/>
+          </p:cNvSpPr>
+          <p:nvPr>
+            <p:ph type="ctrTitle"/>
+          </p:nvPr>
+        </p:nvSpPr>
+        <p:spPr>
+          <a:xfrm rot="16200000">
+            <a:off x="10501539" y="3412122"/>
+            <a:ext cx="2520950" cy="508000"/>
+          </a:xfrm>
+        </p:spPr>
+        <p:txBody>
+          <a:bodyPr>
+            <a:normAutofit fontScale="90000"/>
+          </a:bodyPr>
+          <a:lstStyle/>
+          <a:p>
+            <a:r>
+              <a:rPr lang="pt-BR" sz="3200" dirty="0" err="1">
+                <a:latin typeface="Uber Move" panose="02010803030201060303" pitchFamily="50" charset="0"/>
+              </a:rPr>
+              <a:t>Assumptions</a:t>
+            </a:r>
+            <a:endParaRPr lang="pt-BR" sz="3200" b="1" dirty="0">
+              <a:latin typeface="Uber Move" panose="02010803030201060303" pitchFamily="50" charset="0"/>
+            </a:endParaRPr>
+          </a:p>
+        </p:txBody>
+      </p:sp>
+      <p:pic>
+        <p:nvPicPr>
+          <p:cNvPr id="5" name="Imagem 4" descr="Gráfico, Histograma&#10;&#10;Descrição gerada automaticamente">
+            <a:extLst>
+              <a:ext uri="{FF2B5EF4-FFF2-40B4-BE49-F238E27FC236}">
+                <a16:creationId xmlns:a16="http://schemas.microsoft.com/office/drawing/2014/main" id="{2D02AAF9-3671-60D4-5225-D29A9839FD83}"/>
+              </a:ext>
+            </a:extLst>
+          </p:cNvPr>
+          <p:cNvPicPr>
+            <a:picLocks noChangeAspect="1"/>
+          </p:cNvPicPr>
+          <p:nvPr/>
+        </p:nvPicPr>
+        <p:blipFill>
+          <a:blip r:embed="rId2"/>
+          <a:stretch>
+            <a:fillRect/>
+          </a:stretch>
+        </p:blipFill>
+        <p:spPr>
+          <a:xfrm>
+            <a:off x="3130151" y="1506122"/>
+            <a:ext cx="5760000" cy="4320000"/>
+          </a:xfrm>
+          <a:prstGeom prst="rect">
+            <a:avLst/>
+          </a:prstGeom>
+        </p:spPr>
+      </p:pic>
+      <p:sp>
+        <p:nvSpPr>
+          <p:cNvPr id="12" name="CaixaDeTexto 11">
+            <a:extLst>
+              <a:ext uri="{FF2B5EF4-FFF2-40B4-BE49-F238E27FC236}">
+                <a16:creationId xmlns:a16="http://schemas.microsoft.com/office/drawing/2014/main" id="{D225928A-CD80-9C2A-BA26-DE15A4AB6E05}"/>
+              </a:ext>
+            </a:extLst>
+          </p:cNvPr>
+          <p:cNvSpPr txBox="1"/>
+          <p:nvPr/>
+        </p:nvSpPr>
+        <p:spPr>
+          <a:xfrm>
+            <a:off x="994846" y="485279"/>
+            <a:ext cx="5015305" cy="461665"/>
+          </a:xfrm>
+          <a:prstGeom prst="rect">
+            <a:avLst/>
+          </a:prstGeom>
+          <a:noFill/>
+        </p:spPr>
+        <p:txBody>
+          <a:bodyPr wrap="square" rtlCol="0">
+            <a:spAutoFit/>
+          </a:bodyPr>
+          <a:lstStyle/>
+          <a:p>
+            <a:r>
+              <a:rPr lang="pt-BR" sz="2400" dirty="0">
+                <a:solidFill>
+                  <a:schemeClr val="bg1"/>
+                </a:solidFill>
+                <a:latin typeface="Uber Move" panose="02010803030201060303" pitchFamily="50" charset="0"/>
+              </a:rPr>
+              <a:t>Data </a:t>
+            </a:r>
+            <a:r>
+              <a:rPr lang="pt-BR" sz="2400" dirty="0" err="1">
+                <a:solidFill>
+                  <a:schemeClr val="bg1"/>
+                </a:solidFill>
+                <a:latin typeface="Uber Move" panose="02010803030201060303" pitchFamily="50" charset="0"/>
+              </a:rPr>
+              <a:t>analysis</a:t>
+            </a:r>
+            <a:r>
+              <a:rPr lang="pt-BR" sz="2400" dirty="0">
+                <a:solidFill>
+                  <a:schemeClr val="bg1"/>
+                </a:solidFill>
+                <a:latin typeface="Uber Move" panose="02010803030201060303" pitchFamily="50" charset="0"/>
+              </a:rPr>
+              <a:t> for </a:t>
+            </a:r>
+            <a:r>
+              <a:rPr lang="pt-BR" sz="2400" dirty="0" err="1">
+                <a:solidFill>
+                  <a:schemeClr val="bg1"/>
+                </a:solidFill>
+                <a:latin typeface="Uber Move" panose="02010803030201060303" pitchFamily="50" charset="0"/>
+              </a:rPr>
+              <a:t>datetime</a:t>
+            </a:r>
+            <a:r>
+              <a:rPr lang="pt-BR" sz="2400" dirty="0">
+                <a:solidFill>
+                  <a:schemeClr val="bg1"/>
+                </a:solidFill>
+                <a:latin typeface="Uber Move" panose="02010803030201060303" pitchFamily="50" charset="0"/>
+              </a:rPr>
+              <a:t> </a:t>
+            </a:r>
+            <a:r>
+              <a:rPr lang="pt-BR" sz="2400" dirty="0" err="1">
+                <a:solidFill>
+                  <a:schemeClr val="bg1"/>
+                </a:solidFill>
+                <a:latin typeface="Uber Move" panose="02010803030201060303" pitchFamily="50" charset="0"/>
+              </a:rPr>
+              <a:t>pickup</a:t>
+            </a:r>
+            <a:endParaRPr lang="pt-BR" sz="2400" dirty="0">
+              <a:solidFill>
+                <a:schemeClr val="bg1"/>
+              </a:solidFill>
+              <a:latin typeface="Uber Move" panose="02010803030201060303" pitchFamily="50" charset="0"/>
+            </a:endParaRPr>
+          </a:p>
+        </p:txBody>
+      </p:sp>
+    </p:spTree>
+    <p:extLst>
+      <p:ext uri="{BB962C8B-B14F-4D97-AF65-F5344CB8AC3E}">
+        <p14:creationId xmlns:p14="http://schemas.microsoft.com/office/powerpoint/2010/main" val="65733357"/>
+      </p:ext>
+    </p:extLst>
+  </p:cSld>
+  <p:clrMapOvr>
+    <a:masterClrMapping/>
+  </p:clrMapOvr>
+  <mc:AlternateContent xmlns:mc="http://schemas.openxmlformats.org/markup-compatibility/2006">
+    <mc:Choice xmlns:p159="http://schemas.microsoft.com/office/powerpoint/2015/09/main" Requires="p159">
+      <p:transition spd="slow" advClick="0">
+        <p159:morph option="byObject"/>
+      </p:transition>
+    </mc:Choice>
+    <mc:Fallback>
+      <p:transition spd="slow" advClick="0">
+        <p:fade/>
+      </p:transition>
+    </mc:Fallback>
+  </mc:AlternateContent>
+</p:sld>
+</file>
+
+<file path=ppt/slides/slide12.xml><?xml version="1.0" encoding="utf-8"?>
+<p:sld xmlns:a="http://schemas.openxmlformats.org/drawingml/2006/main" xmlns:r="http://schemas.openxmlformats.org/officeDocument/2006/relationships" xmlns:p="http://schemas.openxmlformats.org/presentationml/2006/main">
+  <p:cSld>
+    <p:spTree>
+      <p:nvGrpSpPr>
+        <p:cNvPr id="1" name="">
+          <a:extLst>
+            <a:ext uri="{FF2B5EF4-FFF2-40B4-BE49-F238E27FC236}">
+              <a16:creationId xmlns:a16="http://schemas.microsoft.com/office/drawing/2014/main" id="{8FED7CB6-5E14-0005-F926-8DAFC98DC239}"/>
+            </a:ext>
+          </a:extLst>
+        </p:cNvPr>
+        <p:cNvGrpSpPr/>
+        <p:nvPr/>
+      </p:nvGrpSpPr>
+      <p:grpSpPr>
+        <a:xfrm>
+          <a:off x="0" y="0"/>
+          <a:ext cx="0" cy="0"/>
+          <a:chOff x="0" y="0"/>
+          <a:chExt cx="0" cy="0"/>
+        </a:xfrm>
+      </p:grpSpPr>
+      <p:sp>
+        <p:nvSpPr>
+          <p:cNvPr id="4" name="Retângulo Arredondado 3">
+            <a:extLst>
+              <a:ext uri="{FF2B5EF4-FFF2-40B4-BE49-F238E27FC236}">
+                <a16:creationId xmlns:a16="http://schemas.microsoft.com/office/drawing/2014/main" id="{FF157ED4-2208-3509-674C-6D8E0FEA05CC}"/>
+              </a:ext>
+            </a:extLst>
+          </p:cNvPr>
+          <p:cNvSpPr/>
+          <p:nvPr/>
+        </p:nvSpPr>
+        <p:spPr>
+          <a:xfrm>
+            <a:off x="11332028" y="-234043"/>
+            <a:ext cx="859972" cy="7326086"/>
+          </a:xfrm>
+          <a:prstGeom prst="roundRect">
+            <a:avLst/>
+          </a:prstGeom>
+          <a:solidFill>
+            <a:schemeClr val="bg1"/>
+          </a:solidFill>
+          <a:ln>
+            <a:noFill/>
+          </a:ln>
+        </p:spPr>
+        <p:style>
+          <a:lnRef idx="0">
+            <a:scrgbClr r="0" g="0" b="0"/>
+          </a:lnRef>
+          <a:fillRef idx="0">
+            <a:scrgbClr r="0" g="0" b="0"/>
+          </a:fillRef>
+          <a:effectRef idx="0">
+            <a:scrgbClr r="0" g="0" b="0"/>
+          </a:effectRef>
+          <a:fontRef idx="minor">
+            <a:schemeClr val="lt1"/>
+          </a:fontRef>
+        </p:style>
+        <p:txBody>
+          <a:bodyPr rtlCol="0" anchor="ctr"/>
+          <a:lstStyle/>
+          <a:p>
+            <a:pPr algn="ctr"/>
+            <a:endParaRPr lang="pt-BR" dirty="0"/>
+          </a:p>
+        </p:txBody>
+      </p:sp>
+      <p:sp>
+        <p:nvSpPr>
+          <p:cNvPr id="2" name="Título 1">
+            <a:extLst>
+              <a:ext uri="{FF2B5EF4-FFF2-40B4-BE49-F238E27FC236}">
+                <a16:creationId xmlns:a16="http://schemas.microsoft.com/office/drawing/2014/main" id="{B2980D83-5B00-5747-33BE-3246F77926F0}"/>
+              </a:ext>
+            </a:extLst>
+          </p:cNvPr>
+          <p:cNvSpPr>
+            <a:spLocks noGrp="1"/>
+          </p:cNvSpPr>
+          <p:nvPr>
+            <p:ph type="ctrTitle"/>
+          </p:nvPr>
+        </p:nvSpPr>
+        <p:spPr>
+          <a:xfrm rot="16200000">
+            <a:off x="10501539" y="3412122"/>
+            <a:ext cx="2520950" cy="508000"/>
+          </a:xfrm>
+        </p:spPr>
+        <p:txBody>
+          <a:bodyPr>
+            <a:normAutofit fontScale="90000"/>
+          </a:bodyPr>
+          <a:lstStyle/>
+          <a:p>
+            <a:r>
+              <a:rPr lang="pt-BR" sz="3200" dirty="0" err="1">
+                <a:latin typeface="Uber Move" panose="02010803030201060303" pitchFamily="50" charset="0"/>
+              </a:rPr>
+              <a:t>Assumptions</a:t>
+            </a:r>
+            <a:endParaRPr lang="pt-BR" sz="3200" b="1" dirty="0">
+              <a:latin typeface="Uber Move" panose="02010803030201060303" pitchFamily="50" charset="0"/>
+            </a:endParaRPr>
+          </a:p>
+        </p:txBody>
+      </p:sp>
+      <p:pic>
+        <p:nvPicPr>
+          <p:cNvPr id="7" name="Imagem 6" descr="Uma imagem contendo Texto&#10;&#10;Descrição gerada automaticamente">
+            <a:extLst>
+              <a:ext uri="{FF2B5EF4-FFF2-40B4-BE49-F238E27FC236}">
+                <a16:creationId xmlns:a16="http://schemas.microsoft.com/office/drawing/2014/main" id="{D2ABF249-EBB5-4745-E1B0-FF4D0C8FAEB4}"/>
+              </a:ext>
+            </a:extLst>
+          </p:cNvPr>
+          <p:cNvPicPr>
+            <a:picLocks noChangeAspect="1"/>
+          </p:cNvPicPr>
+          <p:nvPr/>
+        </p:nvPicPr>
+        <p:blipFill>
+          <a:blip r:embed="rId2"/>
+          <a:stretch>
+            <a:fillRect/>
+          </a:stretch>
+        </p:blipFill>
+        <p:spPr>
+          <a:xfrm>
+            <a:off x="2307017" y="587263"/>
+            <a:ext cx="7577966" cy="5683474"/>
+          </a:xfrm>
+          <a:prstGeom prst="rect">
+            <a:avLst/>
+          </a:prstGeom>
+        </p:spPr>
+      </p:pic>
+      <p:sp>
+        <p:nvSpPr>
+          <p:cNvPr id="3" name="CaixaDeTexto 2">
+            <a:extLst>
+              <a:ext uri="{FF2B5EF4-FFF2-40B4-BE49-F238E27FC236}">
+                <a16:creationId xmlns:a16="http://schemas.microsoft.com/office/drawing/2014/main" id="{138B790E-F51D-F333-9F19-2FAA8DFD446A}"/>
+              </a:ext>
+            </a:extLst>
+          </p:cNvPr>
+          <p:cNvSpPr txBox="1"/>
+          <p:nvPr/>
+        </p:nvSpPr>
+        <p:spPr>
+          <a:xfrm>
+            <a:off x="397043" y="217931"/>
+            <a:ext cx="4032747" cy="369332"/>
+          </a:xfrm>
+          <a:prstGeom prst="rect">
+            <a:avLst/>
+          </a:prstGeom>
+          <a:noFill/>
+        </p:spPr>
+        <p:txBody>
+          <a:bodyPr wrap="square" rtlCol="0">
+            <a:spAutoFit/>
+          </a:bodyPr>
+          <a:lstStyle/>
+          <a:p>
+            <a:r>
+              <a:rPr lang="pt-BR" dirty="0" err="1">
+                <a:solidFill>
+                  <a:schemeClr val="bg1"/>
+                </a:solidFill>
+                <a:latin typeface="Uber Move" panose="02010803030201060303" pitchFamily="50" charset="0"/>
+              </a:rPr>
+              <a:t>Importance</a:t>
+            </a:r>
+            <a:r>
+              <a:rPr lang="pt-BR" dirty="0">
+                <a:solidFill>
+                  <a:schemeClr val="bg1"/>
+                </a:solidFill>
+                <a:latin typeface="Uber Move" panose="02010803030201060303" pitchFamily="50" charset="0"/>
+              </a:rPr>
+              <a:t> for </a:t>
+            </a:r>
+            <a:r>
+              <a:rPr lang="pt-BR" dirty="0" err="1">
+                <a:solidFill>
+                  <a:schemeClr val="bg1"/>
+                </a:solidFill>
+                <a:latin typeface="Uber Move" panose="02010803030201060303" pitchFamily="50" charset="0"/>
+              </a:rPr>
+              <a:t>each</a:t>
+            </a:r>
+            <a:r>
+              <a:rPr lang="pt-BR" dirty="0">
+                <a:solidFill>
+                  <a:schemeClr val="bg1"/>
+                </a:solidFill>
+                <a:latin typeface="Uber Move" panose="02010803030201060303" pitchFamily="50" charset="0"/>
+              </a:rPr>
+              <a:t> feature</a:t>
+            </a:r>
+          </a:p>
+        </p:txBody>
+      </p:sp>
+    </p:spTree>
+    <p:extLst>
+      <p:ext uri="{BB962C8B-B14F-4D97-AF65-F5344CB8AC3E}">
+        <p14:creationId xmlns:p14="http://schemas.microsoft.com/office/powerpoint/2010/main" val="1361207640"/>
+      </p:ext>
+    </p:extLst>
+  </p:cSld>
+  <p:clrMapOvr>
+    <a:masterClrMapping/>
+  </p:clrMapOvr>
+  <p:transition spd="slow"/>
 </p:sld>
 </file>
 
@@ -3541,7 +4391,7 @@
         </p:nvSpPr>
         <p:spPr>
           <a:xfrm>
-            <a:off x="2508250" y="1429471"/>
+            <a:off x="2508250" y="1238971"/>
             <a:ext cx="7175500" cy="957263"/>
           </a:xfrm>
         </p:spPr>
@@ -3603,18 +4453,18 @@
         </p:nvSpPr>
         <p:spPr>
           <a:xfrm>
-            <a:off x="1524000" y="2992438"/>
-            <a:ext cx="9144000" cy="1655762"/>
+            <a:off x="1076326" y="2706687"/>
+            <a:ext cx="9315450" cy="2912341"/>
           </a:xfrm>
         </p:spPr>
         <p:txBody>
           <a:bodyPr>
-            <a:normAutofit fontScale="85000" lnSpcReduction="20000"/>
+            <a:noAutofit/>
           </a:bodyPr>
           <a:lstStyle/>
           <a:p>
             <a:r>
-              <a:rPr>
+              <a:rPr dirty="0">
                 <a:solidFill>
                   <a:srgbClr val="FFFFFF"/>
                 </a:solidFill>
@@ -3624,7 +4474,7 @@
           </a:p>
           <a:p>
             <a:r>
-              <a:rPr>
+              <a:rPr dirty="0">
                 <a:solidFill>
                   <a:srgbClr val="FFFFFF"/>
                 </a:solidFill>
@@ -3634,7 +4484,7 @@
           </a:p>
           <a:p>
             <a:r>
-              <a:rPr>
+              <a:rPr dirty="0">
                 <a:solidFill>
                   <a:srgbClr val="FFFFFF"/>
                 </a:solidFill>
@@ -3748,7 +4598,7 @@
         </p:nvSpPr>
         <p:spPr>
           <a:xfrm>
-            <a:off x="2508250" y="1429471"/>
+            <a:off x="2508250" y="1172296"/>
             <a:ext cx="7175500" cy="957263"/>
           </a:xfrm>
         </p:spPr>
@@ -3792,8 +4642,8 @@
         </p:nvSpPr>
         <p:spPr>
           <a:xfrm>
-            <a:off x="1524000" y="2992438"/>
-            <a:ext cx="9144000" cy="1655762"/>
+            <a:off x="1047750" y="2735263"/>
+            <a:ext cx="9372600" cy="1655762"/>
           </a:xfrm>
         </p:spPr>
         <p:txBody>
@@ -4011,8 +4861,8 @@
         </p:blipFill>
         <p:spPr>
           <a:xfrm>
-            <a:off x="5744301" y="302674"/>
-            <a:ext cx="4101962" cy="3076471"/>
+            <a:off x="6930207" y="4111056"/>
+            <a:ext cx="2400000" cy="1800000"/>
           </a:xfrm>
           <a:prstGeom prst="rect">
             <a:avLst/>
@@ -4041,8 +4891,8 @@
         </p:blipFill>
         <p:spPr>
           <a:xfrm>
-            <a:off x="-287224" y="3432070"/>
-            <a:ext cx="4032747" cy="3024560"/>
+            <a:off x="6930207" y="1695675"/>
+            <a:ext cx="2400000" cy="1800000"/>
           </a:xfrm>
           <a:prstGeom prst="rect">
             <a:avLst/>
@@ -4071,8 +4921,8 @@
         </p:blipFill>
         <p:spPr>
           <a:xfrm>
-            <a:off x="5726720" y="3666122"/>
-            <a:ext cx="3165239" cy="2373929"/>
+            <a:off x="1869269" y="1629000"/>
+            <a:ext cx="2400000" cy="1800000"/>
           </a:xfrm>
           <a:prstGeom prst="rect">
             <a:avLst/>
@@ -4101,8 +4951,8 @@
         </p:blipFill>
         <p:spPr>
           <a:xfrm>
-            <a:off x="686992" y="1329998"/>
-            <a:ext cx="2868397" cy="2151298"/>
+            <a:off x="1869269" y="4111056"/>
+            <a:ext cx="2400000" cy="1800000"/>
           </a:xfrm>
           <a:prstGeom prst="rect">
             <a:avLst/>
@@ -4123,8 +4973,8 @@
         </p:nvSpPr>
         <p:spPr>
           <a:xfrm>
-            <a:off x="674883" y="314783"/>
-            <a:ext cx="4032747" cy="369332"/>
+            <a:off x="994846" y="485279"/>
+            <a:ext cx="5015305" cy="461665"/>
           </a:xfrm>
           <a:prstGeom prst="rect">
             <a:avLst/>
@@ -4138,7 +4988,7 @@
           <a:lstStyle/>
           <a:p>
             <a:r>
-              <a:rPr lang="pt-BR" dirty="0">
+              <a:rPr lang="pt-BR" sz="2400" dirty="0">
                 <a:solidFill>
                   <a:schemeClr val="bg1"/>
                 </a:solidFill>
@@ -4147,7 +4997,7 @@
               <a:t>Data </a:t>
             </a:r>
             <a:r>
-              <a:rPr lang="pt-BR" dirty="0" err="1">
+              <a:rPr lang="pt-BR" sz="2400" dirty="0" err="1">
                 <a:solidFill>
                   <a:schemeClr val="bg1"/>
                 </a:solidFill>
@@ -4156,7 +5006,7 @@
               <a:t>analysis</a:t>
             </a:r>
             <a:r>
-              <a:rPr lang="pt-BR" dirty="0">
+              <a:rPr lang="pt-BR" sz="2400" dirty="0">
                 <a:solidFill>
                   <a:schemeClr val="bg1"/>
                 </a:solidFill>
@@ -4165,7 +5015,7 @@
               <a:t> for </a:t>
             </a:r>
             <a:r>
-              <a:rPr lang="pt-BR" dirty="0" err="1">
+              <a:rPr lang="pt-BR" sz="2400" dirty="0" err="1">
                 <a:solidFill>
                   <a:schemeClr val="bg1"/>
                 </a:solidFill>
@@ -4174,7 +5024,7 @@
               <a:t>datetime</a:t>
             </a:r>
             <a:r>
-              <a:rPr lang="pt-BR" dirty="0">
+              <a:rPr lang="pt-BR" sz="2400" dirty="0">
                 <a:solidFill>
                   <a:schemeClr val="bg1"/>
                 </a:solidFill>
@@ -4183,7 +5033,7 @@
               <a:t> </a:t>
             </a:r>
             <a:r>
-              <a:rPr lang="pt-BR" dirty="0" err="1">
+              <a:rPr lang="pt-BR" sz="2400" dirty="0" err="1">
                 <a:solidFill>
                   <a:schemeClr val="bg1"/>
                 </a:solidFill>
@@ -4191,7 +5041,7 @@
               </a:rPr>
               <a:t>pickup</a:t>
             </a:r>
-            <a:endParaRPr lang="pt-BR" dirty="0">
+            <a:endParaRPr lang="pt-BR" sz="2400" dirty="0">
               <a:solidFill>
                 <a:schemeClr val="bg1"/>
               </a:solidFill>
@@ -4210,6 +5060,18 @@
   <p:clrMapOvr>
     <a:masterClrMapping/>
   </p:clrMapOvr>
+  <mc:AlternateContent xmlns:mc="http://schemas.openxmlformats.org/markup-compatibility/2006">
+    <mc:Choice xmlns:p159="http://schemas.microsoft.com/office/powerpoint/2015/09/main" Requires="p159">
+      <p:transition xmlns:p14="http://schemas.microsoft.com/office/powerpoint/2010/main" spd="slow" p14:dur="1250" advClick="0">
+        <p159:morph option="byObject"/>
+      </p:transition>
+    </mc:Choice>
+    <mc:Fallback>
+      <p:transition spd="slow" advClick="0">
+        <p:fade/>
+      </p:transition>
+    </mc:Fallback>
+  </mc:AlternateContent>
 </p:sld>
 </file>
 
@@ -4221,7 +5083,7 @@
         <p:cNvPr id="1" name="">
           <a:extLst>
             <a:ext uri="{FF2B5EF4-FFF2-40B4-BE49-F238E27FC236}">
-              <a16:creationId xmlns:a16="http://schemas.microsoft.com/office/drawing/2014/main" id="{8FED7CB6-5E14-0005-F926-8DAFC98DC239}"/>
+              <a16:creationId xmlns:a16="http://schemas.microsoft.com/office/drawing/2014/main" id="{B4F20FE2-7CB7-4C40-BF2F-88EB6AA47C23}"/>
             </a:ext>
           </a:extLst>
         </p:cNvPr>
@@ -4241,7 +5103,7 @@
           <p:cNvPr id="4" name="Retângulo Arredondado 3">
             <a:extLst>
               <a:ext uri="{FF2B5EF4-FFF2-40B4-BE49-F238E27FC236}">
-                <a16:creationId xmlns:a16="http://schemas.microsoft.com/office/drawing/2014/main" id="{FF157ED4-2208-3509-674C-6D8E0FEA05CC}"/>
+                <a16:creationId xmlns:a16="http://schemas.microsoft.com/office/drawing/2014/main" id="{CDE263D6-B854-C6F0-60B5-0B4D594075C1}"/>
               </a:ext>
             </a:extLst>
           </p:cNvPr>
@@ -4291,7 +5153,7 @@
           <p:cNvPr id="2" name="Título 1">
             <a:extLst>
               <a:ext uri="{FF2B5EF4-FFF2-40B4-BE49-F238E27FC236}">
-                <a16:creationId xmlns:a16="http://schemas.microsoft.com/office/drawing/2014/main" id="{B2980D83-5B00-5747-33BE-3246F77926F0}"/>
+                <a16:creationId xmlns:a16="http://schemas.microsoft.com/office/drawing/2014/main" id="{D51FE2F4-1A11-5C96-DB26-A7B4F26A9AC9}"/>
               </a:ext>
             </a:extLst>
           </p:cNvPr>
@@ -4328,10 +5190,10 @@
       </p:sp>
       <p:pic>
         <p:nvPicPr>
-          <p:cNvPr id="7" name="Imagem 6" descr="Uma imagem contendo Texto&#10;&#10;Descrição gerada automaticamente">
-            <a:extLst>
-              <a:ext uri="{FF2B5EF4-FFF2-40B4-BE49-F238E27FC236}">
-                <a16:creationId xmlns:a16="http://schemas.microsoft.com/office/drawing/2014/main" id="{D2ABF249-EBB5-4745-E1B0-FF4D0C8FAEB4}"/>
+          <p:cNvPr id="9" name="Imagem 8" descr="Uma imagem contendo Logotipo&#10;&#10;Descrição gerada automaticamente">
+            <a:extLst>
+              <a:ext uri="{FF2B5EF4-FFF2-40B4-BE49-F238E27FC236}">
+                <a16:creationId xmlns:a16="http://schemas.microsoft.com/office/drawing/2014/main" id="{6C241B36-B31B-60D6-5095-E8204BC9C1C5}"/>
               </a:ext>
             </a:extLst>
           </p:cNvPr>
@@ -4348,8 +5210,8 @@
         </p:blipFill>
         <p:spPr>
           <a:xfrm>
-            <a:off x="2307017" y="587263"/>
-            <a:ext cx="7577966" cy="5683474"/>
+            <a:off x="3186057" y="1310928"/>
+            <a:ext cx="5760000" cy="4320000"/>
           </a:xfrm>
           <a:prstGeom prst="rect">
             <a:avLst/>
@@ -4358,10 +5220,10 @@
       </p:pic>
       <p:sp>
         <p:nvSpPr>
-          <p:cNvPr id="3" name="CaixaDeTexto 2">
-            <a:extLst>
-              <a:ext uri="{FF2B5EF4-FFF2-40B4-BE49-F238E27FC236}">
-                <a16:creationId xmlns:a16="http://schemas.microsoft.com/office/drawing/2014/main" id="{138B790E-F51D-F333-9F19-2FAA8DFD446A}"/>
+          <p:cNvPr id="12" name="CaixaDeTexto 11">
+            <a:extLst>
+              <a:ext uri="{FF2B5EF4-FFF2-40B4-BE49-F238E27FC236}">
+                <a16:creationId xmlns:a16="http://schemas.microsoft.com/office/drawing/2014/main" id="{5028BCF3-2B33-6982-A786-1BF07B0F1D90}"/>
               </a:ext>
             </a:extLst>
           </p:cNvPr>
@@ -4370,8 +5232,8 @@
         </p:nvSpPr>
         <p:spPr>
           <a:xfrm>
-            <a:off x="397043" y="217931"/>
-            <a:ext cx="4032747" cy="369332"/>
+            <a:off x="994846" y="485279"/>
+            <a:ext cx="5015305" cy="461665"/>
           </a:xfrm>
           <a:prstGeom prst="rect">
             <a:avLst/>
@@ -4385,54 +5247,1306 @@
           <a:lstStyle/>
           <a:p>
             <a:r>
-              <a:rPr lang="pt-BR" dirty="0" err="1">
+              <a:rPr lang="pt-BR" sz="2400" dirty="0">
                 <a:solidFill>
                   <a:schemeClr val="bg1"/>
                 </a:solidFill>
                 <a:latin typeface="Uber Move" panose="02010803030201060303" pitchFamily="50" charset="0"/>
               </a:rPr>
-              <a:t>Importance</a:t>
-            </a:r>
-            <a:r>
-              <a:rPr lang="pt-BR" dirty="0">
+              <a:t>Data </a:t>
+            </a:r>
+            <a:r>
+              <a:rPr lang="pt-BR" sz="2400" dirty="0" err="1">
                 <a:solidFill>
                   <a:schemeClr val="bg1"/>
                 </a:solidFill>
                 <a:latin typeface="Uber Move" panose="02010803030201060303" pitchFamily="50" charset="0"/>
               </a:rPr>
+              <a:t>analysis</a:t>
+            </a:r>
+            <a:r>
+              <a:rPr lang="pt-BR" sz="2400" dirty="0">
+                <a:solidFill>
+                  <a:schemeClr val="bg1"/>
+                </a:solidFill>
+                <a:latin typeface="Uber Move" panose="02010803030201060303" pitchFamily="50" charset="0"/>
+              </a:rPr>
               <a:t> for </a:t>
             </a:r>
             <a:r>
-              <a:rPr lang="pt-BR" dirty="0" err="1">
+              <a:rPr lang="pt-BR" sz="2400" dirty="0" err="1">
                 <a:solidFill>
                   <a:schemeClr val="bg1"/>
                 </a:solidFill>
                 <a:latin typeface="Uber Move" panose="02010803030201060303" pitchFamily="50" charset="0"/>
               </a:rPr>
-              <a:t>each</a:t>
-            </a:r>
-            <a:r>
-              <a:rPr lang="pt-BR" dirty="0">
+              <a:t>datetime</a:t>
+            </a:r>
+            <a:r>
+              <a:rPr lang="pt-BR" sz="2400" dirty="0">
                 <a:solidFill>
                   <a:schemeClr val="bg1"/>
                 </a:solidFill>
                 <a:latin typeface="Uber Move" panose="02010803030201060303" pitchFamily="50" charset="0"/>
               </a:rPr>
-              <a:t> feature</a:t>
-            </a:r>
+              <a:t> </a:t>
+            </a:r>
+            <a:r>
+              <a:rPr lang="pt-BR" sz="2400" dirty="0" err="1">
+                <a:solidFill>
+                  <a:schemeClr val="bg1"/>
+                </a:solidFill>
+                <a:latin typeface="Uber Move" panose="02010803030201060303" pitchFamily="50" charset="0"/>
+              </a:rPr>
+              <a:t>pickup</a:t>
+            </a:r>
+            <a:endParaRPr lang="pt-BR" sz="2400" dirty="0">
+              <a:solidFill>
+                <a:schemeClr val="bg1"/>
+              </a:solidFill>
+              <a:latin typeface="Uber Move" panose="02010803030201060303" pitchFamily="50" charset="0"/>
+            </a:endParaRPr>
           </a:p>
         </p:txBody>
       </p:sp>
     </p:spTree>
     <p:extLst>
       <p:ext uri="{BB962C8B-B14F-4D97-AF65-F5344CB8AC3E}">
-        <p14:creationId xmlns:p14="http://schemas.microsoft.com/office/powerpoint/2010/main" val="1361207640"/>
+        <p14:creationId xmlns:p14="http://schemas.microsoft.com/office/powerpoint/2010/main" val="2477983840"/>
       </p:ext>
     </p:extLst>
   </p:cSld>
   <p:clrMapOvr>
     <a:masterClrMapping/>
   </p:clrMapOvr>
+  <mc:AlternateContent xmlns:mc="http://schemas.openxmlformats.org/markup-compatibility/2006">
+    <mc:Choice xmlns:p159="http://schemas.microsoft.com/office/powerpoint/2015/09/main" Requires="p159">
+      <p:transition spd="slow" advClick="0">
+        <p159:morph option="byObject"/>
+      </p:transition>
+    </mc:Choice>
+    <mc:Fallback>
+      <p:transition spd="slow" advClick="0">
+        <p:fade/>
+      </p:transition>
+    </mc:Fallback>
+  </mc:AlternateContent>
+</p:sld>
+</file>
+
+<file path=ppt/slides/slide6.xml><?xml version="1.0" encoding="utf-8"?>
+<p:sld xmlns:a="http://schemas.openxmlformats.org/drawingml/2006/main" xmlns:r="http://schemas.openxmlformats.org/officeDocument/2006/relationships" xmlns:p="http://schemas.openxmlformats.org/presentationml/2006/main">
+  <p:cSld>
+    <p:spTree>
+      <p:nvGrpSpPr>
+        <p:cNvPr id="1" name="">
+          <a:extLst>
+            <a:ext uri="{FF2B5EF4-FFF2-40B4-BE49-F238E27FC236}">
+              <a16:creationId xmlns:a16="http://schemas.microsoft.com/office/drawing/2014/main" id="{21893D53-9E39-BDCC-5064-78E4E761FAB1}"/>
+            </a:ext>
+          </a:extLst>
+        </p:cNvPr>
+        <p:cNvGrpSpPr/>
+        <p:nvPr/>
+      </p:nvGrpSpPr>
+      <p:grpSpPr>
+        <a:xfrm>
+          <a:off x="0" y="0"/>
+          <a:ext cx="0" cy="0"/>
+          <a:chOff x="0" y="0"/>
+          <a:chExt cx="0" cy="0"/>
+        </a:xfrm>
+      </p:grpSpPr>
+      <p:sp>
+        <p:nvSpPr>
+          <p:cNvPr id="4" name="Retângulo Arredondado 3">
+            <a:extLst>
+              <a:ext uri="{FF2B5EF4-FFF2-40B4-BE49-F238E27FC236}">
+                <a16:creationId xmlns:a16="http://schemas.microsoft.com/office/drawing/2014/main" id="{7C453DF1-5527-4CE6-92CE-F6786E29E6B2}"/>
+              </a:ext>
+            </a:extLst>
+          </p:cNvPr>
+          <p:cNvSpPr/>
+          <p:nvPr/>
+        </p:nvSpPr>
+        <p:spPr>
+          <a:xfrm>
+            <a:off x="11332028" y="-234043"/>
+            <a:ext cx="859972" cy="7326086"/>
+          </a:xfrm>
+          <a:prstGeom prst="roundRect">
+            <a:avLst/>
+          </a:prstGeom>
+          <a:solidFill>
+            <a:schemeClr val="bg1"/>
+          </a:solidFill>
+          <a:ln>
+            <a:noFill/>
+          </a:ln>
+        </p:spPr>
+        <p:style>
+          <a:lnRef idx="0">
+            <a:scrgbClr r="0" g="0" b="0"/>
+          </a:lnRef>
+          <a:fillRef idx="0">
+            <a:scrgbClr r="0" g="0" b="0"/>
+          </a:fillRef>
+          <a:effectRef idx="0">
+            <a:scrgbClr r="0" g="0" b="0"/>
+          </a:effectRef>
+          <a:fontRef idx="minor">
+            <a:schemeClr val="lt1"/>
+          </a:fontRef>
+        </p:style>
+        <p:txBody>
+          <a:bodyPr rtlCol="0" anchor="ctr"/>
+          <a:lstStyle/>
+          <a:p>
+            <a:pPr algn="ctr"/>
+            <a:endParaRPr lang="pt-BR" dirty="0"/>
+          </a:p>
+        </p:txBody>
+      </p:sp>
+      <p:sp>
+        <p:nvSpPr>
+          <p:cNvPr id="2" name="Título 1">
+            <a:extLst>
+              <a:ext uri="{FF2B5EF4-FFF2-40B4-BE49-F238E27FC236}">
+                <a16:creationId xmlns:a16="http://schemas.microsoft.com/office/drawing/2014/main" id="{5C061766-2720-6C21-F7DA-1A67E551107F}"/>
+              </a:ext>
+            </a:extLst>
+          </p:cNvPr>
+          <p:cNvSpPr>
+            <a:spLocks noGrp="1"/>
+          </p:cNvSpPr>
+          <p:nvPr>
+            <p:ph type="ctrTitle"/>
+          </p:nvPr>
+        </p:nvSpPr>
+        <p:spPr>
+          <a:xfrm rot="16200000">
+            <a:off x="10501539" y="3412122"/>
+            <a:ext cx="2520950" cy="508000"/>
+          </a:xfrm>
+        </p:spPr>
+        <p:txBody>
+          <a:bodyPr>
+            <a:normAutofit fontScale="90000"/>
+          </a:bodyPr>
+          <a:lstStyle/>
+          <a:p>
+            <a:r>
+              <a:rPr lang="pt-BR" sz="3200" dirty="0" err="1">
+                <a:latin typeface="Uber Move" panose="02010803030201060303" pitchFamily="50" charset="0"/>
+              </a:rPr>
+              <a:t>Assumptions</a:t>
+            </a:r>
+            <a:endParaRPr lang="pt-BR" sz="3200" b="1" dirty="0">
+              <a:latin typeface="Uber Move" panose="02010803030201060303" pitchFamily="50" charset="0"/>
+            </a:endParaRPr>
+          </a:p>
+        </p:txBody>
+      </p:sp>
+      <p:pic>
+        <p:nvPicPr>
+          <p:cNvPr id="5" name="Imagem 4" descr="Gráfico, Histograma&#10;&#10;Descrição gerada automaticamente">
+            <a:extLst>
+              <a:ext uri="{FF2B5EF4-FFF2-40B4-BE49-F238E27FC236}">
+                <a16:creationId xmlns:a16="http://schemas.microsoft.com/office/drawing/2014/main" id="{9AEF80B3-5192-327E-AD4F-B49945484743}"/>
+              </a:ext>
+            </a:extLst>
+          </p:cNvPr>
+          <p:cNvPicPr>
+            <a:picLocks noChangeAspect="1"/>
+          </p:cNvPicPr>
+          <p:nvPr/>
+        </p:nvPicPr>
+        <p:blipFill>
+          <a:blip r:embed="rId2"/>
+          <a:stretch>
+            <a:fillRect/>
+          </a:stretch>
+        </p:blipFill>
+        <p:spPr>
+          <a:xfrm>
+            <a:off x="6930207" y="4111056"/>
+            <a:ext cx="2400000" cy="1800000"/>
+          </a:xfrm>
+          <a:prstGeom prst="rect">
+            <a:avLst/>
+          </a:prstGeom>
+        </p:spPr>
+      </p:pic>
+      <p:pic>
+        <p:nvPicPr>
+          <p:cNvPr id="7" name="Imagem 6" descr="Uma imagem contendo Logotipo&#10;&#10;Descrição gerada automaticamente">
+            <a:extLst>
+              <a:ext uri="{FF2B5EF4-FFF2-40B4-BE49-F238E27FC236}">
+                <a16:creationId xmlns:a16="http://schemas.microsoft.com/office/drawing/2014/main" id="{A2B60BC4-6D5C-1A48-D45D-47563E95D036}"/>
+              </a:ext>
+            </a:extLst>
+          </p:cNvPr>
+          <p:cNvPicPr>
+            <a:picLocks noChangeAspect="1"/>
+          </p:cNvPicPr>
+          <p:nvPr/>
+        </p:nvPicPr>
+        <p:blipFill>
+          <a:blip r:embed="rId3"/>
+          <a:stretch>
+            <a:fillRect/>
+          </a:stretch>
+        </p:blipFill>
+        <p:spPr>
+          <a:xfrm>
+            <a:off x="6930207" y="1695675"/>
+            <a:ext cx="2400000" cy="1800000"/>
+          </a:xfrm>
+          <a:prstGeom prst="rect">
+            <a:avLst/>
+          </a:prstGeom>
+        </p:spPr>
+      </p:pic>
+      <p:pic>
+        <p:nvPicPr>
+          <p:cNvPr id="9" name="Imagem 8" descr="Uma imagem contendo Logotipo&#10;&#10;Descrição gerada automaticamente">
+            <a:extLst>
+              <a:ext uri="{FF2B5EF4-FFF2-40B4-BE49-F238E27FC236}">
+                <a16:creationId xmlns:a16="http://schemas.microsoft.com/office/drawing/2014/main" id="{41D5E59D-F207-A172-BEF2-1D753FC40F2C}"/>
+              </a:ext>
+            </a:extLst>
+          </p:cNvPr>
+          <p:cNvPicPr>
+            <a:picLocks noChangeAspect="1"/>
+          </p:cNvPicPr>
+          <p:nvPr/>
+        </p:nvPicPr>
+        <p:blipFill>
+          <a:blip r:embed="rId4"/>
+          <a:stretch>
+            <a:fillRect/>
+          </a:stretch>
+        </p:blipFill>
+        <p:spPr>
+          <a:xfrm>
+            <a:off x="1869269" y="1629000"/>
+            <a:ext cx="2400000" cy="1800000"/>
+          </a:xfrm>
+          <a:prstGeom prst="rect">
+            <a:avLst/>
+          </a:prstGeom>
+        </p:spPr>
+      </p:pic>
+      <p:pic>
+        <p:nvPicPr>
+          <p:cNvPr id="11" name="Imagem 10" descr="Texto&#10;&#10;Descrição gerada automaticamente com confiança baixa">
+            <a:extLst>
+              <a:ext uri="{FF2B5EF4-FFF2-40B4-BE49-F238E27FC236}">
+                <a16:creationId xmlns:a16="http://schemas.microsoft.com/office/drawing/2014/main" id="{8A1794BB-E9EF-8E9E-EA92-04A142AD7D84}"/>
+              </a:ext>
+            </a:extLst>
+          </p:cNvPr>
+          <p:cNvPicPr>
+            <a:picLocks noChangeAspect="1"/>
+          </p:cNvPicPr>
+          <p:nvPr/>
+        </p:nvPicPr>
+        <p:blipFill>
+          <a:blip r:embed="rId5"/>
+          <a:stretch>
+            <a:fillRect/>
+          </a:stretch>
+        </p:blipFill>
+        <p:spPr>
+          <a:xfrm>
+            <a:off x="1869269" y="4111056"/>
+            <a:ext cx="2400000" cy="1800000"/>
+          </a:xfrm>
+          <a:prstGeom prst="rect">
+            <a:avLst/>
+          </a:prstGeom>
+        </p:spPr>
+      </p:pic>
+      <p:sp>
+        <p:nvSpPr>
+          <p:cNvPr id="12" name="CaixaDeTexto 11">
+            <a:extLst>
+              <a:ext uri="{FF2B5EF4-FFF2-40B4-BE49-F238E27FC236}">
+                <a16:creationId xmlns:a16="http://schemas.microsoft.com/office/drawing/2014/main" id="{4B75CD16-198C-CEB4-3677-7AF429141505}"/>
+              </a:ext>
+            </a:extLst>
+          </p:cNvPr>
+          <p:cNvSpPr txBox="1"/>
+          <p:nvPr/>
+        </p:nvSpPr>
+        <p:spPr>
+          <a:xfrm>
+            <a:off x="994846" y="485279"/>
+            <a:ext cx="5015305" cy="461665"/>
+          </a:xfrm>
+          <a:prstGeom prst="rect">
+            <a:avLst/>
+          </a:prstGeom>
+          <a:noFill/>
+        </p:spPr>
+        <p:txBody>
+          <a:bodyPr wrap="square" rtlCol="0">
+            <a:spAutoFit/>
+          </a:bodyPr>
+          <a:lstStyle/>
+          <a:p>
+            <a:r>
+              <a:rPr lang="pt-BR" sz="2400" dirty="0">
+                <a:solidFill>
+                  <a:schemeClr val="bg1"/>
+                </a:solidFill>
+                <a:latin typeface="Uber Move" panose="02010803030201060303" pitchFamily="50" charset="0"/>
+              </a:rPr>
+              <a:t>Data </a:t>
+            </a:r>
+            <a:r>
+              <a:rPr lang="pt-BR" sz="2400" dirty="0" err="1">
+                <a:solidFill>
+                  <a:schemeClr val="bg1"/>
+                </a:solidFill>
+                <a:latin typeface="Uber Move" panose="02010803030201060303" pitchFamily="50" charset="0"/>
+              </a:rPr>
+              <a:t>analysis</a:t>
+            </a:r>
+            <a:r>
+              <a:rPr lang="pt-BR" sz="2400" dirty="0">
+                <a:solidFill>
+                  <a:schemeClr val="bg1"/>
+                </a:solidFill>
+                <a:latin typeface="Uber Move" panose="02010803030201060303" pitchFamily="50" charset="0"/>
+              </a:rPr>
+              <a:t> for </a:t>
+            </a:r>
+            <a:r>
+              <a:rPr lang="pt-BR" sz="2400" dirty="0" err="1">
+                <a:solidFill>
+                  <a:schemeClr val="bg1"/>
+                </a:solidFill>
+                <a:latin typeface="Uber Move" panose="02010803030201060303" pitchFamily="50" charset="0"/>
+              </a:rPr>
+              <a:t>datetime</a:t>
+            </a:r>
+            <a:r>
+              <a:rPr lang="pt-BR" sz="2400" dirty="0">
+                <a:solidFill>
+                  <a:schemeClr val="bg1"/>
+                </a:solidFill>
+                <a:latin typeface="Uber Move" panose="02010803030201060303" pitchFamily="50" charset="0"/>
+              </a:rPr>
+              <a:t> </a:t>
+            </a:r>
+            <a:r>
+              <a:rPr lang="pt-BR" sz="2400" dirty="0" err="1">
+                <a:solidFill>
+                  <a:schemeClr val="bg1"/>
+                </a:solidFill>
+                <a:latin typeface="Uber Move" panose="02010803030201060303" pitchFamily="50" charset="0"/>
+              </a:rPr>
+              <a:t>pickup</a:t>
+            </a:r>
+            <a:endParaRPr lang="pt-BR" sz="2400" dirty="0">
+              <a:solidFill>
+                <a:schemeClr val="bg1"/>
+              </a:solidFill>
+              <a:latin typeface="Uber Move" panose="02010803030201060303" pitchFamily="50" charset="0"/>
+            </a:endParaRPr>
+          </a:p>
+        </p:txBody>
+      </p:sp>
+    </p:spTree>
+    <p:extLst>
+      <p:ext uri="{BB962C8B-B14F-4D97-AF65-F5344CB8AC3E}">
+        <p14:creationId xmlns:p14="http://schemas.microsoft.com/office/powerpoint/2010/main" val="3276286486"/>
+      </p:ext>
+    </p:extLst>
+  </p:cSld>
+  <p:clrMapOvr>
+    <a:masterClrMapping/>
+  </p:clrMapOvr>
+  <mc:AlternateContent xmlns:mc="http://schemas.openxmlformats.org/markup-compatibility/2006">
+    <mc:Choice xmlns:p159="http://schemas.microsoft.com/office/powerpoint/2015/09/main" Requires="p159">
+      <p:transition spd="slow" advClick="0">
+        <p159:morph option="byObject"/>
+      </p:transition>
+    </mc:Choice>
+    <mc:Fallback>
+      <p:transition spd="slow" advClick="0">
+        <p:fade/>
+      </p:transition>
+    </mc:Fallback>
+  </mc:AlternateContent>
+</p:sld>
+</file>
+
+<file path=ppt/slides/slide7.xml><?xml version="1.0" encoding="utf-8"?>
+<p:sld xmlns:a="http://schemas.openxmlformats.org/drawingml/2006/main" xmlns:r="http://schemas.openxmlformats.org/officeDocument/2006/relationships" xmlns:p="http://schemas.openxmlformats.org/presentationml/2006/main">
+  <p:cSld>
+    <p:spTree>
+      <p:nvGrpSpPr>
+        <p:cNvPr id="1" name="">
+          <a:extLst>
+            <a:ext uri="{FF2B5EF4-FFF2-40B4-BE49-F238E27FC236}">
+              <a16:creationId xmlns:a16="http://schemas.microsoft.com/office/drawing/2014/main" id="{65E12467-CF7C-4723-AB60-7B0338DD894C}"/>
+            </a:ext>
+          </a:extLst>
+        </p:cNvPr>
+        <p:cNvGrpSpPr/>
+        <p:nvPr/>
+      </p:nvGrpSpPr>
+      <p:grpSpPr>
+        <a:xfrm>
+          <a:off x="0" y="0"/>
+          <a:ext cx="0" cy="0"/>
+          <a:chOff x="0" y="0"/>
+          <a:chExt cx="0" cy="0"/>
+        </a:xfrm>
+      </p:grpSpPr>
+      <p:sp>
+        <p:nvSpPr>
+          <p:cNvPr id="4" name="Retângulo Arredondado 3">
+            <a:extLst>
+              <a:ext uri="{FF2B5EF4-FFF2-40B4-BE49-F238E27FC236}">
+                <a16:creationId xmlns:a16="http://schemas.microsoft.com/office/drawing/2014/main" id="{529BED18-5A6C-77A2-A05D-8FC61568BBF0}"/>
+              </a:ext>
+            </a:extLst>
+          </p:cNvPr>
+          <p:cNvSpPr/>
+          <p:nvPr/>
+        </p:nvSpPr>
+        <p:spPr>
+          <a:xfrm>
+            <a:off x="11332028" y="-234043"/>
+            <a:ext cx="859972" cy="7326086"/>
+          </a:xfrm>
+          <a:prstGeom prst="roundRect">
+            <a:avLst/>
+          </a:prstGeom>
+          <a:solidFill>
+            <a:schemeClr val="bg1"/>
+          </a:solidFill>
+          <a:ln>
+            <a:noFill/>
+          </a:ln>
+        </p:spPr>
+        <p:style>
+          <a:lnRef idx="0">
+            <a:scrgbClr r="0" g="0" b="0"/>
+          </a:lnRef>
+          <a:fillRef idx="0">
+            <a:scrgbClr r="0" g="0" b="0"/>
+          </a:fillRef>
+          <a:effectRef idx="0">
+            <a:scrgbClr r="0" g="0" b="0"/>
+          </a:effectRef>
+          <a:fontRef idx="minor">
+            <a:schemeClr val="lt1"/>
+          </a:fontRef>
+        </p:style>
+        <p:txBody>
+          <a:bodyPr rtlCol="0" anchor="ctr"/>
+          <a:lstStyle/>
+          <a:p>
+            <a:pPr algn="ctr"/>
+            <a:endParaRPr lang="pt-BR" dirty="0"/>
+          </a:p>
+        </p:txBody>
+      </p:sp>
+      <p:sp>
+        <p:nvSpPr>
+          <p:cNvPr id="2" name="Título 1">
+            <a:extLst>
+              <a:ext uri="{FF2B5EF4-FFF2-40B4-BE49-F238E27FC236}">
+                <a16:creationId xmlns:a16="http://schemas.microsoft.com/office/drawing/2014/main" id="{C2123BA1-BD40-6374-2E53-859755B9E112}"/>
+              </a:ext>
+            </a:extLst>
+          </p:cNvPr>
+          <p:cNvSpPr>
+            <a:spLocks noGrp="1"/>
+          </p:cNvSpPr>
+          <p:nvPr>
+            <p:ph type="ctrTitle"/>
+          </p:nvPr>
+        </p:nvSpPr>
+        <p:spPr>
+          <a:xfrm rot="16200000">
+            <a:off x="10501539" y="3412122"/>
+            <a:ext cx="2520950" cy="508000"/>
+          </a:xfrm>
+        </p:spPr>
+        <p:txBody>
+          <a:bodyPr>
+            <a:normAutofit fontScale="90000"/>
+          </a:bodyPr>
+          <a:lstStyle/>
+          <a:p>
+            <a:r>
+              <a:rPr lang="pt-BR" sz="3200" dirty="0" err="1">
+                <a:latin typeface="Uber Move" panose="02010803030201060303" pitchFamily="50" charset="0"/>
+              </a:rPr>
+              <a:t>Assumptions</a:t>
+            </a:r>
+            <a:endParaRPr lang="pt-BR" sz="3200" b="1" dirty="0">
+              <a:latin typeface="Uber Move" panose="02010803030201060303" pitchFamily="50" charset="0"/>
+            </a:endParaRPr>
+          </a:p>
+        </p:txBody>
+      </p:sp>
+      <p:pic>
+        <p:nvPicPr>
+          <p:cNvPr id="7" name="Imagem 6" descr="Uma imagem contendo Logotipo&#10;&#10;Descrição gerada automaticamente">
+            <a:extLst>
+              <a:ext uri="{FF2B5EF4-FFF2-40B4-BE49-F238E27FC236}">
+                <a16:creationId xmlns:a16="http://schemas.microsoft.com/office/drawing/2014/main" id="{3F5D7651-98A2-4E8F-ABE2-05D9328F1B4C}"/>
+              </a:ext>
+            </a:extLst>
+          </p:cNvPr>
+          <p:cNvPicPr>
+            <a:picLocks noChangeAspect="1"/>
+          </p:cNvPicPr>
+          <p:nvPr/>
+        </p:nvPicPr>
+        <p:blipFill>
+          <a:blip r:embed="rId2"/>
+          <a:stretch>
+            <a:fillRect/>
+          </a:stretch>
+        </p:blipFill>
+        <p:spPr>
+          <a:xfrm>
+            <a:off x="3130151" y="1269000"/>
+            <a:ext cx="5760000" cy="4320000"/>
+          </a:xfrm>
+          <a:prstGeom prst="rect">
+            <a:avLst/>
+          </a:prstGeom>
+        </p:spPr>
+      </p:pic>
+      <p:sp>
+        <p:nvSpPr>
+          <p:cNvPr id="12" name="CaixaDeTexto 11">
+            <a:extLst>
+              <a:ext uri="{FF2B5EF4-FFF2-40B4-BE49-F238E27FC236}">
+                <a16:creationId xmlns:a16="http://schemas.microsoft.com/office/drawing/2014/main" id="{D323D554-2621-BD1E-2F86-F3A364AD6E45}"/>
+              </a:ext>
+            </a:extLst>
+          </p:cNvPr>
+          <p:cNvSpPr txBox="1"/>
+          <p:nvPr/>
+        </p:nvSpPr>
+        <p:spPr>
+          <a:xfrm>
+            <a:off x="994846" y="485279"/>
+            <a:ext cx="5015305" cy="461665"/>
+          </a:xfrm>
+          <a:prstGeom prst="rect">
+            <a:avLst/>
+          </a:prstGeom>
+          <a:noFill/>
+        </p:spPr>
+        <p:txBody>
+          <a:bodyPr wrap="square" rtlCol="0">
+            <a:spAutoFit/>
+          </a:bodyPr>
+          <a:lstStyle/>
+          <a:p>
+            <a:r>
+              <a:rPr lang="pt-BR" sz="2400" dirty="0">
+                <a:solidFill>
+                  <a:schemeClr val="bg1"/>
+                </a:solidFill>
+                <a:latin typeface="Uber Move" panose="02010803030201060303" pitchFamily="50" charset="0"/>
+              </a:rPr>
+              <a:t>Data </a:t>
+            </a:r>
+            <a:r>
+              <a:rPr lang="pt-BR" sz="2400" dirty="0" err="1">
+                <a:solidFill>
+                  <a:schemeClr val="bg1"/>
+                </a:solidFill>
+                <a:latin typeface="Uber Move" panose="02010803030201060303" pitchFamily="50" charset="0"/>
+              </a:rPr>
+              <a:t>analysis</a:t>
+            </a:r>
+            <a:r>
+              <a:rPr lang="pt-BR" sz="2400" dirty="0">
+                <a:solidFill>
+                  <a:schemeClr val="bg1"/>
+                </a:solidFill>
+                <a:latin typeface="Uber Move" panose="02010803030201060303" pitchFamily="50" charset="0"/>
+              </a:rPr>
+              <a:t> for </a:t>
+            </a:r>
+            <a:r>
+              <a:rPr lang="pt-BR" sz="2400" dirty="0" err="1">
+                <a:solidFill>
+                  <a:schemeClr val="bg1"/>
+                </a:solidFill>
+                <a:latin typeface="Uber Move" panose="02010803030201060303" pitchFamily="50" charset="0"/>
+              </a:rPr>
+              <a:t>datetime</a:t>
+            </a:r>
+            <a:r>
+              <a:rPr lang="pt-BR" sz="2400" dirty="0">
+                <a:solidFill>
+                  <a:schemeClr val="bg1"/>
+                </a:solidFill>
+                <a:latin typeface="Uber Move" panose="02010803030201060303" pitchFamily="50" charset="0"/>
+              </a:rPr>
+              <a:t> </a:t>
+            </a:r>
+            <a:r>
+              <a:rPr lang="pt-BR" sz="2400" dirty="0" err="1">
+                <a:solidFill>
+                  <a:schemeClr val="bg1"/>
+                </a:solidFill>
+                <a:latin typeface="Uber Move" panose="02010803030201060303" pitchFamily="50" charset="0"/>
+              </a:rPr>
+              <a:t>pickup</a:t>
+            </a:r>
+            <a:endParaRPr lang="pt-BR" sz="2400" dirty="0">
+              <a:solidFill>
+                <a:schemeClr val="bg1"/>
+              </a:solidFill>
+              <a:latin typeface="Uber Move" panose="02010803030201060303" pitchFamily="50" charset="0"/>
+            </a:endParaRPr>
+          </a:p>
+        </p:txBody>
+      </p:sp>
+    </p:spTree>
+    <p:extLst>
+      <p:ext uri="{BB962C8B-B14F-4D97-AF65-F5344CB8AC3E}">
+        <p14:creationId xmlns:p14="http://schemas.microsoft.com/office/powerpoint/2010/main" val="673568557"/>
+      </p:ext>
+    </p:extLst>
+  </p:cSld>
+  <p:clrMapOvr>
+    <a:masterClrMapping/>
+  </p:clrMapOvr>
+  <mc:AlternateContent xmlns:mc="http://schemas.openxmlformats.org/markup-compatibility/2006">
+    <mc:Choice xmlns:p159="http://schemas.microsoft.com/office/powerpoint/2015/09/main" Requires="p159">
+      <p:transition spd="slow" advClick="0">
+        <p159:morph option="byObject"/>
+      </p:transition>
+    </mc:Choice>
+    <mc:Fallback>
+      <p:transition spd="slow" advClick="0">
+        <p:fade/>
+      </p:transition>
+    </mc:Fallback>
+  </mc:AlternateContent>
+</p:sld>
+</file>
+
+<file path=ppt/slides/slide8.xml><?xml version="1.0" encoding="utf-8"?>
+<p:sld xmlns:a="http://schemas.openxmlformats.org/drawingml/2006/main" xmlns:r="http://schemas.openxmlformats.org/officeDocument/2006/relationships" xmlns:p="http://schemas.openxmlformats.org/presentationml/2006/main">
+  <p:cSld>
+    <p:spTree>
+      <p:nvGrpSpPr>
+        <p:cNvPr id="1" name="">
+          <a:extLst>
+            <a:ext uri="{FF2B5EF4-FFF2-40B4-BE49-F238E27FC236}">
+              <a16:creationId xmlns:a16="http://schemas.microsoft.com/office/drawing/2014/main" id="{CF4C7742-DA57-A2BE-6866-C4443731AE41}"/>
+            </a:ext>
+          </a:extLst>
+        </p:cNvPr>
+        <p:cNvGrpSpPr/>
+        <p:nvPr/>
+      </p:nvGrpSpPr>
+      <p:grpSpPr>
+        <a:xfrm>
+          <a:off x="0" y="0"/>
+          <a:ext cx="0" cy="0"/>
+          <a:chOff x="0" y="0"/>
+          <a:chExt cx="0" cy="0"/>
+        </a:xfrm>
+      </p:grpSpPr>
+      <p:sp>
+        <p:nvSpPr>
+          <p:cNvPr id="4" name="Retângulo Arredondado 3">
+            <a:extLst>
+              <a:ext uri="{FF2B5EF4-FFF2-40B4-BE49-F238E27FC236}">
+                <a16:creationId xmlns:a16="http://schemas.microsoft.com/office/drawing/2014/main" id="{04D83348-968C-BD3E-8E48-47EE505843C0}"/>
+              </a:ext>
+            </a:extLst>
+          </p:cNvPr>
+          <p:cNvSpPr/>
+          <p:nvPr/>
+        </p:nvSpPr>
+        <p:spPr>
+          <a:xfrm>
+            <a:off x="11332028" y="-234043"/>
+            <a:ext cx="859972" cy="7326086"/>
+          </a:xfrm>
+          <a:prstGeom prst="roundRect">
+            <a:avLst/>
+          </a:prstGeom>
+          <a:solidFill>
+            <a:schemeClr val="bg1"/>
+          </a:solidFill>
+          <a:ln>
+            <a:noFill/>
+          </a:ln>
+        </p:spPr>
+        <p:style>
+          <a:lnRef idx="0">
+            <a:scrgbClr r="0" g="0" b="0"/>
+          </a:lnRef>
+          <a:fillRef idx="0">
+            <a:scrgbClr r="0" g="0" b="0"/>
+          </a:fillRef>
+          <a:effectRef idx="0">
+            <a:scrgbClr r="0" g="0" b="0"/>
+          </a:effectRef>
+          <a:fontRef idx="minor">
+            <a:schemeClr val="lt1"/>
+          </a:fontRef>
+        </p:style>
+        <p:txBody>
+          <a:bodyPr rtlCol="0" anchor="ctr"/>
+          <a:lstStyle/>
+          <a:p>
+            <a:pPr algn="ctr"/>
+            <a:endParaRPr lang="pt-BR" dirty="0"/>
+          </a:p>
+        </p:txBody>
+      </p:sp>
+      <p:sp>
+        <p:nvSpPr>
+          <p:cNvPr id="2" name="Título 1">
+            <a:extLst>
+              <a:ext uri="{FF2B5EF4-FFF2-40B4-BE49-F238E27FC236}">
+                <a16:creationId xmlns:a16="http://schemas.microsoft.com/office/drawing/2014/main" id="{10A4E5AF-90FD-76EF-83AF-EA164EA2E73A}"/>
+              </a:ext>
+            </a:extLst>
+          </p:cNvPr>
+          <p:cNvSpPr>
+            <a:spLocks noGrp="1"/>
+          </p:cNvSpPr>
+          <p:nvPr>
+            <p:ph type="ctrTitle"/>
+          </p:nvPr>
+        </p:nvSpPr>
+        <p:spPr>
+          <a:xfrm rot="16200000">
+            <a:off x="10501539" y="3412122"/>
+            <a:ext cx="2520950" cy="508000"/>
+          </a:xfrm>
+        </p:spPr>
+        <p:txBody>
+          <a:bodyPr>
+            <a:normAutofit fontScale="90000"/>
+          </a:bodyPr>
+          <a:lstStyle/>
+          <a:p>
+            <a:r>
+              <a:rPr lang="pt-BR" sz="3200" dirty="0" err="1">
+                <a:latin typeface="Uber Move" panose="02010803030201060303" pitchFamily="50" charset="0"/>
+              </a:rPr>
+              <a:t>Assumptions</a:t>
+            </a:r>
+            <a:endParaRPr lang="pt-BR" sz="3200" b="1" dirty="0">
+              <a:latin typeface="Uber Move" panose="02010803030201060303" pitchFamily="50" charset="0"/>
+            </a:endParaRPr>
+          </a:p>
+        </p:txBody>
+      </p:sp>
+      <p:pic>
+        <p:nvPicPr>
+          <p:cNvPr id="5" name="Imagem 4" descr="Gráfico, Histograma&#10;&#10;Descrição gerada automaticamente">
+            <a:extLst>
+              <a:ext uri="{FF2B5EF4-FFF2-40B4-BE49-F238E27FC236}">
+                <a16:creationId xmlns:a16="http://schemas.microsoft.com/office/drawing/2014/main" id="{61C15C08-D8DB-8515-38FA-15E3824EB77E}"/>
+              </a:ext>
+            </a:extLst>
+          </p:cNvPr>
+          <p:cNvPicPr>
+            <a:picLocks noChangeAspect="1"/>
+          </p:cNvPicPr>
+          <p:nvPr/>
+        </p:nvPicPr>
+        <p:blipFill>
+          <a:blip r:embed="rId2"/>
+          <a:stretch>
+            <a:fillRect/>
+          </a:stretch>
+        </p:blipFill>
+        <p:spPr>
+          <a:xfrm>
+            <a:off x="6930207" y="4111056"/>
+            <a:ext cx="2400000" cy="1800000"/>
+          </a:xfrm>
+          <a:prstGeom prst="rect">
+            <a:avLst/>
+          </a:prstGeom>
+        </p:spPr>
+      </p:pic>
+      <p:pic>
+        <p:nvPicPr>
+          <p:cNvPr id="7" name="Imagem 6" descr="Uma imagem contendo Logotipo&#10;&#10;Descrição gerada automaticamente">
+            <a:extLst>
+              <a:ext uri="{FF2B5EF4-FFF2-40B4-BE49-F238E27FC236}">
+                <a16:creationId xmlns:a16="http://schemas.microsoft.com/office/drawing/2014/main" id="{27F4E6D5-7662-DA2C-97BB-BBB52E090627}"/>
+              </a:ext>
+            </a:extLst>
+          </p:cNvPr>
+          <p:cNvPicPr>
+            <a:picLocks noChangeAspect="1"/>
+          </p:cNvPicPr>
+          <p:nvPr/>
+        </p:nvPicPr>
+        <p:blipFill>
+          <a:blip r:embed="rId3"/>
+          <a:stretch>
+            <a:fillRect/>
+          </a:stretch>
+        </p:blipFill>
+        <p:spPr>
+          <a:xfrm>
+            <a:off x="6930207" y="1695675"/>
+            <a:ext cx="2400000" cy="1800000"/>
+          </a:xfrm>
+          <a:prstGeom prst="rect">
+            <a:avLst/>
+          </a:prstGeom>
+        </p:spPr>
+      </p:pic>
+      <p:pic>
+        <p:nvPicPr>
+          <p:cNvPr id="9" name="Imagem 8" descr="Uma imagem contendo Logotipo&#10;&#10;Descrição gerada automaticamente">
+            <a:extLst>
+              <a:ext uri="{FF2B5EF4-FFF2-40B4-BE49-F238E27FC236}">
+                <a16:creationId xmlns:a16="http://schemas.microsoft.com/office/drawing/2014/main" id="{7B5CC9D0-06A2-1AC0-F17E-F3083400FD87}"/>
+              </a:ext>
+            </a:extLst>
+          </p:cNvPr>
+          <p:cNvPicPr>
+            <a:picLocks noChangeAspect="1"/>
+          </p:cNvPicPr>
+          <p:nvPr/>
+        </p:nvPicPr>
+        <p:blipFill>
+          <a:blip r:embed="rId4"/>
+          <a:stretch>
+            <a:fillRect/>
+          </a:stretch>
+        </p:blipFill>
+        <p:spPr>
+          <a:xfrm>
+            <a:off x="1869269" y="1629000"/>
+            <a:ext cx="2400000" cy="1800000"/>
+          </a:xfrm>
+          <a:prstGeom prst="rect">
+            <a:avLst/>
+          </a:prstGeom>
+        </p:spPr>
+      </p:pic>
+      <p:pic>
+        <p:nvPicPr>
+          <p:cNvPr id="11" name="Imagem 10" descr="Texto&#10;&#10;Descrição gerada automaticamente com confiança baixa">
+            <a:extLst>
+              <a:ext uri="{FF2B5EF4-FFF2-40B4-BE49-F238E27FC236}">
+                <a16:creationId xmlns:a16="http://schemas.microsoft.com/office/drawing/2014/main" id="{F2A90EEE-2845-E84B-3B4E-D51B0893CAD6}"/>
+              </a:ext>
+            </a:extLst>
+          </p:cNvPr>
+          <p:cNvPicPr>
+            <a:picLocks noChangeAspect="1"/>
+          </p:cNvPicPr>
+          <p:nvPr/>
+        </p:nvPicPr>
+        <p:blipFill>
+          <a:blip r:embed="rId5"/>
+          <a:stretch>
+            <a:fillRect/>
+          </a:stretch>
+        </p:blipFill>
+        <p:spPr>
+          <a:xfrm>
+            <a:off x="1869269" y="4111056"/>
+            <a:ext cx="2400000" cy="1800000"/>
+          </a:xfrm>
+          <a:prstGeom prst="rect">
+            <a:avLst/>
+          </a:prstGeom>
+        </p:spPr>
+      </p:pic>
+      <p:sp>
+        <p:nvSpPr>
+          <p:cNvPr id="12" name="CaixaDeTexto 11">
+            <a:extLst>
+              <a:ext uri="{FF2B5EF4-FFF2-40B4-BE49-F238E27FC236}">
+                <a16:creationId xmlns:a16="http://schemas.microsoft.com/office/drawing/2014/main" id="{0F0442D7-D3A7-063E-5840-6DA261928041}"/>
+              </a:ext>
+            </a:extLst>
+          </p:cNvPr>
+          <p:cNvSpPr txBox="1"/>
+          <p:nvPr/>
+        </p:nvSpPr>
+        <p:spPr>
+          <a:xfrm>
+            <a:off x="994846" y="485279"/>
+            <a:ext cx="5015305" cy="461665"/>
+          </a:xfrm>
+          <a:prstGeom prst="rect">
+            <a:avLst/>
+          </a:prstGeom>
+          <a:noFill/>
+        </p:spPr>
+        <p:txBody>
+          <a:bodyPr wrap="square" rtlCol="0">
+            <a:spAutoFit/>
+          </a:bodyPr>
+          <a:lstStyle/>
+          <a:p>
+            <a:r>
+              <a:rPr lang="pt-BR" sz="2400" dirty="0">
+                <a:solidFill>
+                  <a:schemeClr val="bg1"/>
+                </a:solidFill>
+                <a:latin typeface="Uber Move" panose="02010803030201060303" pitchFamily="50" charset="0"/>
+              </a:rPr>
+              <a:t>Data </a:t>
+            </a:r>
+            <a:r>
+              <a:rPr lang="pt-BR" sz="2400" dirty="0" err="1">
+                <a:solidFill>
+                  <a:schemeClr val="bg1"/>
+                </a:solidFill>
+                <a:latin typeface="Uber Move" panose="02010803030201060303" pitchFamily="50" charset="0"/>
+              </a:rPr>
+              <a:t>analysis</a:t>
+            </a:r>
+            <a:r>
+              <a:rPr lang="pt-BR" sz="2400" dirty="0">
+                <a:solidFill>
+                  <a:schemeClr val="bg1"/>
+                </a:solidFill>
+                <a:latin typeface="Uber Move" panose="02010803030201060303" pitchFamily="50" charset="0"/>
+              </a:rPr>
+              <a:t> for </a:t>
+            </a:r>
+            <a:r>
+              <a:rPr lang="pt-BR" sz="2400" dirty="0" err="1">
+                <a:solidFill>
+                  <a:schemeClr val="bg1"/>
+                </a:solidFill>
+                <a:latin typeface="Uber Move" panose="02010803030201060303" pitchFamily="50" charset="0"/>
+              </a:rPr>
+              <a:t>datetime</a:t>
+            </a:r>
+            <a:r>
+              <a:rPr lang="pt-BR" sz="2400" dirty="0">
+                <a:solidFill>
+                  <a:schemeClr val="bg1"/>
+                </a:solidFill>
+                <a:latin typeface="Uber Move" panose="02010803030201060303" pitchFamily="50" charset="0"/>
+              </a:rPr>
+              <a:t> </a:t>
+            </a:r>
+            <a:r>
+              <a:rPr lang="pt-BR" sz="2400" dirty="0" err="1">
+                <a:solidFill>
+                  <a:schemeClr val="bg1"/>
+                </a:solidFill>
+                <a:latin typeface="Uber Move" panose="02010803030201060303" pitchFamily="50" charset="0"/>
+              </a:rPr>
+              <a:t>pickup</a:t>
+            </a:r>
+            <a:endParaRPr lang="pt-BR" sz="2400" dirty="0">
+              <a:solidFill>
+                <a:schemeClr val="bg1"/>
+              </a:solidFill>
+              <a:latin typeface="Uber Move" panose="02010803030201060303" pitchFamily="50" charset="0"/>
+            </a:endParaRPr>
+          </a:p>
+        </p:txBody>
+      </p:sp>
+    </p:spTree>
+    <p:extLst>
+      <p:ext uri="{BB962C8B-B14F-4D97-AF65-F5344CB8AC3E}">
+        <p14:creationId xmlns:p14="http://schemas.microsoft.com/office/powerpoint/2010/main" val="3433901012"/>
+      </p:ext>
+    </p:extLst>
+  </p:cSld>
+  <p:clrMapOvr>
+    <a:masterClrMapping/>
+  </p:clrMapOvr>
+  <mc:AlternateContent xmlns:mc="http://schemas.openxmlformats.org/markup-compatibility/2006">
+    <mc:Choice xmlns:p159="http://schemas.microsoft.com/office/powerpoint/2015/09/main" Requires="p159">
+      <p:transition spd="slow" advClick="0">
+        <p159:morph option="byObject"/>
+      </p:transition>
+    </mc:Choice>
+    <mc:Fallback>
+      <p:transition spd="slow" advClick="0">
+        <p:fade/>
+      </p:transition>
+    </mc:Fallback>
+  </mc:AlternateContent>
+</p:sld>
+</file>
+
+<file path=ppt/slides/slide9.xml><?xml version="1.0" encoding="utf-8"?>
+<p:sld xmlns:a="http://schemas.openxmlformats.org/drawingml/2006/main" xmlns:r="http://schemas.openxmlformats.org/officeDocument/2006/relationships" xmlns:p="http://schemas.openxmlformats.org/presentationml/2006/main">
+  <p:cSld>
+    <p:spTree>
+      <p:nvGrpSpPr>
+        <p:cNvPr id="1" name="">
+          <a:extLst>
+            <a:ext uri="{FF2B5EF4-FFF2-40B4-BE49-F238E27FC236}">
+              <a16:creationId xmlns:a16="http://schemas.microsoft.com/office/drawing/2014/main" id="{A76C60B8-E6C6-FAC2-ECF2-AF18E1EDB03C}"/>
+            </a:ext>
+          </a:extLst>
+        </p:cNvPr>
+        <p:cNvGrpSpPr/>
+        <p:nvPr/>
+      </p:nvGrpSpPr>
+      <p:grpSpPr>
+        <a:xfrm>
+          <a:off x="0" y="0"/>
+          <a:ext cx="0" cy="0"/>
+          <a:chOff x="0" y="0"/>
+          <a:chExt cx="0" cy="0"/>
+        </a:xfrm>
+      </p:grpSpPr>
+      <p:sp>
+        <p:nvSpPr>
+          <p:cNvPr id="4" name="Retângulo Arredondado 3">
+            <a:extLst>
+              <a:ext uri="{FF2B5EF4-FFF2-40B4-BE49-F238E27FC236}">
+                <a16:creationId xmlns:a16="http://schemas.microsoft.com/office/drawing/2014/main" id="{BE0A5CAB-62DC-FA09-A017-92FB8ED36A18}"/>
+              </a:ext>
+            </a:extLst>
+          </p:cNvPr>
+          <p:cNvSpPr/>
+          <p:nvPr/>
+        </p:nvSpPr>
+        <p:spPr>
+          <a:xfrm>
+            <a:off x="11332028" y="-234043"/>
+            <a:ext cx="859972" cy="7326086"/>
+          </a:xfrm>
+          <a:prstGeom prst="roundRect">
+            <a:avLst/>
+          </a:prstGeom>
+          <a:solidFill>
+            <a:schemeClr val="bg1"/>
+          </a:solidFill>
+          <a:ln>
+            <a:noFill/>
+          </a:ln>
+        </p:spPr>
+        <p:style>
+          <a:lnRef idx="0">
+            <a:scrgbClr r="0" g="0" b="0"/>
+          </a:lnRef>
+          <a:fillRef idx="0">
+            <a:scrgbClr r="0" g="0" b="0"/>
+          </a:fillRef>
+          <a:effectRef idx="0">
+            <a:scrgbClr r="0" g="0" b="0"/>
+          </a:effectRef>
+          <a:fontRef idx="minor">
+            <a:schemeClr val="lt1"/>
+          </a:fontRef>
+        </p:style>
+        <p:txBody>
+          <a:bodyPr rtlCol="0" anchor="ctr"/>
+          <a:lstStyle/>
+          <a:p>
+            <a:pPr algn="ctr"/>
+            <a:endParaRPr lang="pt-BR" dirty="0"/>
+          </a:p>
+        </p:txBody>
+      </p:sp>
+      <p:sp>
+        <p:nvSpPr>
+          <p:cNvPr id="2" name="Título 1">
+            <a:extLst>
+              <a:ext uri="{FF2B5EF4-FFF2-40B4-BE49-F238E27FC236}">
+                <a16:creationId xmlns:a16="http://schemas.microsoft.com/office/drawing/2014/main" id="{74B662FD-F3D0-7D13-A590-1BB14E38FF56}"/>
+              </a:ext>
+            </a:extLst>
+          </p:cNvPr>
+          <p:cNvSpPr>
+            <a:spLocks noGrp="1"/>
+          </p:cNvSpPr>
+          <p:nvPr>
+            <p:ph type="ctrTitle"/>
+          </p:nvPr>
+        </p:nvSpPr>
+        <p:spPr>
+          <a:xfrm rot="16200000">
+            <a:off x="10501539" y="3412122"/>
+            <a:ext cx="2520950" cy="508000"/>
+          </a:xfrm>
+        </p:spPr>
+        <p:txBody>
+          <a:bodyPr>
+            <a:normAutofit fontScale="90000"/>
+          </a:bodyPr>
+          <a:lstStyle/>
+          <a:p>
+            <a:r>
+              <a:rPr lang="pt-BR" sz="3200" dirty="0" err="1">
+                <a:latin typeface="Uber Move" panose="02010803030201060303" pitchFamily="50" charset="0"/>
+              </a:rPr>
+              <a:t>Assumptions</a:t>
+            </a:r>
+            <a:endParaRPr lang="pt-BR" sz="3200" b="1" dirty="0">
+              <a:latin typeface="Uber Move" panose="02010803030201060303" pitchFamily="50" charset="0"/>
+            </a:endParaRPr>
+          </a:p>
+        </p:txBody>
+      </p:sp>
+      <p:pic>
+        <p:nvPicPr>
+          <p:cNvPr id="11" name="Imagem 10" descr="Texto&#10;&#10;Descrição gerada automaticamente com confiança baixa">
+            <a:extLst>
+              <a:ext uri="{FF2B5EF4-FFF2-40B4-BE49-F238E27FC236}">
+                <a16:creationId xmlns:a16="http://schemas.microsoft.com/office/drawing/2014/main" id="{D2A82290-940A-2158-DD80-5AA6236A75B6}"/>
+              </a:ext>
+            </a:extLst>
+          </p:cNvPr>
+          <p:cNvPicPr>
+            <a:picLocks noChangeAspect="1"/>
+          </p:cNvPicPr>
+          <p:nvPr/>
+        </p:nvPicPr>
+        <p:blipFill>
+          <a:blip r:embed="rId2"/>
+          <a:stretch>
+            <a:fillRect/>
+          </a:stretch>
+        </p:blipFill>
+        <p:spPr>
+          <a:xfrm>
+            <a:off x="2911090" y="1348806"/>
+            <a:ext cx="5760000" cy="4320000"/>
+          </a:xfrm>
+          <a:prstGeom prst="rect">
+            <a:avLst/>
+          </a:prstGeom>
+        </p:spPr>
+      </p:pic>
+      <p:sp>
+        <p:nvSpPr>
+          <p:cNvPr id="12" name="CaixaDeTexto 11">
+            <a:extLst>
+              <a:ext uri="{FF2B5EF4-FFF2-40B4-BE49-F238E27FC236}">
+                <a16:creationId xmlns:a16="http://schemas.microsoft.com/office/drawing/2014/main" id="{A3869ED5-F35D-BAF8-04A5-1C8D76F4F10D}"/>
+              </a:ext>
+            </a:extLst>
+          </p:cNvPr>
+          <p:cNvSpPr txBox="1"/>
+          <p:nvPr/>
+        </p:nvSpPr>
+        <p:spPr>
+          <a:xfrm>
+            <a:off x="994846" y="485279"/>
+            <a:ext cx="5015305" cy="461665"/>
+          </a:xfrm>
+          <a:prstGeom prst="rect">
+            <a:avLst/>
+          </a:prstGeom>
+          <a:noFill/>
+        </p:spPr>
+        <p:txBody>
+          <a:bodyPr wrap="square" rtlCol="0">
+            <a:spAutoFit/>
+          </a:bodyPr>
+          <a:lstStyle/>
+          <a:p>
+            <a:r>
+              <a:rPr lang="pt-BR" sz="2400" dirty="0">
+                <a:solidFill>
+                  <a:schemeClr val="bg1"/>
+                </a:solidFill>
+                <a:latin typeface="Uber Move" panose="02010803030201060303" pitchFamily="50" charset="0"/>
+              </a:rPr>
+              <a:t>Data </a:t>
+            </a:r>
+            <a:r>
+              <a:rPr lang="pt-BR" sz="2400" dirty="0" err="1">
+                <a:solidFill>
+                  <a:schemeClr val="bg1"/>
+                </a:solidFill>
+                <a:latin typeface="Uber Move" panose="02010803030201060303" pitchFamily="50" charset="0"/>
+              </a:rPr>
+              <a:t>analysis</a:t>
+            </a:r>
+            <a:r>
+              <a:rPr lang="pt-BR" sz="2400" dirty="0">
+                <a:solidFill>
+                  <a:schemeClr val="bg1"/>
+                </a:solidFill>
+                <a:latin typeface="Uber Move" panose="02010803030201060303" pitchFamily="50" charset="0"/>
+              </a:rPr>
+              <a:t> for </a:t>
+            </a:r>
+            <a:r>
+              <a:rPr lang="pt-BR" sz="2400" dirty="0" err="1">
+                <a:solidFill>
+                  <a:schemeClr val="bg1"/>
+                </a:solidFill>
+                <a:latin typeface="Uber Move" panose="02010803030201060303" pitchFamily="50" charset="0"/>
+              </a:rPr>
+              <a:t>datetime</a:t>
+            </a:r>
+            <a:r>
+              <a:rPr lang="pt-BR" sz="2400" dirty="0">
+                <a:solidFill>
+                  <a:schemeClr val="bg1"/>
+                </a:solidFill>
+                <a:latin typeface="Uber Move" panose="02010803030201060303" pitchFamily="50" charset="0"/>
+              </a:rPr>
+              <a:t> </a:t>
+            </a:r>
+            <a:r>
+              <a:rPr lang="pt-BR" sz="2400" dirty="0" err="1">
+                <a:solidFill>
+                  <a:schemeClr val="bg1"/>
+                </a:solidFill>
+                <a:latin typeface="Uber Move" panose="02010803030201060303" pitchFamily="50" charset="0"/>
+              </a:rPr>
+              <a:t>pickup</a:t>
+            </a:r>
+            <a:endParaRPr lang="pt-BR" sz="2400" dirty="0">
+              <a:solidFill>
+                <a:schemeClr val="bg1"/>
+              </a:solidFill>
+              <a:latin typeface="Uber Move" panose="02010803030201060303" pitchFamily="50" charset="0"/>
+            </a:endParaRPr>
+          </a:p>
+        </p:txBody>
+      </p:sp>
+    </p:spTree>
+    <p:extLst>
+      <p:ext uri="{BB962C8B-B14F-4D97-AF65-F5344CB8AC3E}">
+        <p14:creationId xmlns:p14="http://schemas.microsoft.com/office/powerpoint/2010/main" val="866176171"/>
+      </p:ext>
+    </p:extLst>
+  </p:cSld>
+  <p:clrMapOvr>
+    <a:masterClrMapping/>
+  </p:clrMapOvr>
+  <mc:AlternateContent xmlns:mc="http://schemas.openxmlformats.org/markup-compatibility/2006">
+    <mc:Choice xmlns:p159="http://schemas.microsoft.com/office/powerpoint/2015/09/main" Requires="p159">
+      <p:transition spd="slow" advClick="0">
+        <p159:morph option="byObject"/>
+      </p:transition>
+    </mc:Choice>
+    <mc:Fallback>
+      <p:transition spd="slow" advClick="0">
+        <p:fade/>
+      </p:transition>
+    </mc:Fallback>
+  </mc:AlternateContent>
 </p:sld>
 </file>
 

</xml_diff>

<commit_message>
- removing weather stuff
</commit_message>
<xml_diff>
--- a/PowerPoint/Updated_Presentation_Uber.pptx
+++ b/PowerPoint/Updated_Presentation_Uber.pptx
@@ -4261,8 +4261,8 @@
         </p:blipFill>
         <p:spPr>
           <a:xfrm>
-            <a:off x="2307017" y="587263"/>
-            <a:ext cx="7577966" cy="5683474"/>
+            <a:off x="2916618" y="1506122"/>
+            <a:ext cx="5760001" cy="4320000"/>
           </a:xfrm>
           <a:prstGeom prst="rect">
             <a:avLst/>
@@ -4283,8 +4283,8 @@
         </p:nvSpPr>
         <p:spPr>
           <a:xfrm>
-            <a:off x="397043" y="217931"/>
-            <a:ext cx="4032747" cy="369332"/>
+            <a:off x="959018" y="475106"/>
+            <a:ext cx="5136982" cy="461665"/>
           </a:xfrm>
           <a:prstGeom prst="rect">
             <a:avLst/>
@@ -4298,7 +4298,7 @@
           <a:lstStyle/>
           <a:p>
             <a:r>
-              <a:rPr lang="pt-BR" dirty="0" err="1">
+              <a:rPr lang="pt-BR" sz="2400" dirty="0" err="1">
                 <a:solidFill>
                   <a:schemeClr val="bg1"/>
                 </a:solidFill>
@@ -4307,7 +4307,7 @@
               <a:t>Importance</a:t>
             </a:r>
             <a:r>
-              <a:rPr lang="pt-BR" dirty="0">
+              <a:rPr lang="pt-BR" sz="2400" dirty="0">
                 <a:solidFill>
                   <a:schemeClr val="bg1"/>
                 </a:solidFill>
@@ -4316,7 +4316,7 @@
               <a:t> for </a:t>
             </a:r>
             <a:r>
-              <a:rPr lang="pt-BR" dirty="0" err="1">
+              <a:rPr lang="pt-BR" sz="2400" dirty="0" err="1">
                 <a:solidFill>
                   <a:schemeClr val="bg1"/>
                 </a:solidFill>
@@ -4325,7 +4325,7 @@
               <a:t>each</a:t>
             </a:r>
             <a:r>
-              <a:rPr lang="pt-BR" dirty="0">
+              <a:rPr lang="pt-BR" sz="2400" dirty="0">
                 <a:solidFill>
                   <a:schemeClr val="bg1"/>
                 </a:solidFill>
@@ -4346,7 +4346,18 @@
   <p:clrMapOvr>
     <a:masterClrMapping/>
   </p:clrMapOvr>
-  <p:transition spd="slow"/>
+  <mc:AlternateContent xmlns:mc="http://schemas.openxmlformats.org/markup-compatibility/2006">
+    <mc:Choice xmlns:p159="http://schemas.microsoft.com/office/powerpoint/2015/09/main" Requires="p159">
+      <p:transition spd="slow">
+        <p159:morph option="byObject"/>
+      </p:transition>
+    </mc:Choice>
+    <mc:Fallback>
+      <p:transition spd="slow">
+        <p:fade/>
+      </p:transition>
+    </mc:Fallback>
+  </mc:AlternateContent>
 </p:sld>
 </file>
 

</xml_diff>

<commit_message>
- Forgot from last commit
</commit_message>
<xml_diff>
--- a/PowerPoint/Updated_Presentation_Uber.pptx
+++ b/PowerPoint/Updated_Presentation_Uber.pptx
@@ -4,19 +4,25 @@
   <p:sldMasterIdLst>
     <p:sldMasterId id="2147483648" r:id="rId1"/>
   </p:sldMasterIdLst>
+  <p:notesMasterIdLst>
+    <p:notesMasterId r:id="rId17"/>
+  </p:notesMasterIdLst>
   <p:sldIdLst>
     <p:sldId id="256" r:id="rId2"/>
     <p:sldId id="257" r:id="rId3"/>
     <p:sldId id="258" r:id="rId4"/>
     <p:sldId id="261" r:id="rId5"/>
     <p:sldId id="263" r:id="rId6"/>
-    <p:sldId id="264" r:id="rId7"/>
+    <p:sldId id="272" r:id="rId7"/>
     <p:sldId id="265" r:id="rId8"/>
-    <p:sldId id="267" r:id="rId9"/>
+    <p:sldId id="273" r:id="rId9"/>
     <p:sldId id="266" r:id="rId10"/>
-    <p:sldId id="268" r:id="rId11"/>
+    <p:sldId id="274" r:id="rId11"/>
     <p:sldId id="269" r:id="rId12"/>
-    <p:sldId id="262" r:id="rId13"/>
+    <p:sldId id="270" r:id="rId13"/>
+    <p:sldId id="275" r:id="rId14"/>
+    <p:sldId id="276" r:id="rId15"/>
+    <p:sldId id="271" r:id="rId16"/>
   </p:sldIdLst>
   <p:sldSz cx="12192000" cy="6858000"/>
   <p:notesSz cx="6858000" cy="9144000"/>
@@ -134,6 +140,763 @@
 </p:presentation>
 </file>
 
+<file path=ppt/notesMasters/notesMaster1.xml><?xml version="1.0" encoding="utf-8"?>
+<p:notesMaster xmlns:a="http://schemas.openxmlformats.org/drawingml/2006/main" xmlns:r="http://schemas.openxmlformats.org/officeDocument/2006/relationships" xmlns:p="http://schemas.openxmlformats.org/presentationml/2006/main">
+  <p:cSld>
+    <p:bg>
+      <p:bgRef idx="1001">
+        <a:schemeClr val="bg1"/>
+      </p:bgRef>
+    </p:bg>
+    <p:spTree>
+      <p:nvGrpSpPr>
+        <p:cNvPr id="1" name=""/>
+        <p:cNvGrpSpPr/>
+        <p:nvPr/>
+      </p:nvGrpSpPr>
+      <p:grpSpPr>
+        <a:xfrm>
+          <a:off x="0" y="0"/>
+          <a:ext cx="0" cy="0"/>
+          <a:chOff x="0" y="0"/>
+          <a:chExt cx="0" cy="0"/>
+        </a:xfrm>
+      </p:grpSpPr>
+      <p:sp>
+        <p:nvSpPr>
+          <p:cNvPr id="2" name="Espaço Reservado para Cabeçalho 1"/>
+          <p:cNvSpPr>
+            <a:spLocks noGrp="1"/>
+          </p:cNvSpPr>
+          <p:nvPr>
+            <p:ph type="hdr" sz="quarter"/>
+          </p:nvPr>
+        </p:nvSpPr>
+        <p:spPr>
+          <a:xfrm>
+            <a:off x="0" y="0"/>
+            <a:ext cx="2971800" cy="458788"/>
+          </a:xfrm>
+          <a:prstGeom prst="rect">
+            <a:avLst/>
+          </a:prstGeom>
+        </p:spPr>
+        <p:txBody>
+          <a:bodyPr vert="horz" lIns="91440" tIns="45720" rIns="91440" bIns="45720" rtlCol="0"/>
+          <a:lstStyle>
+            <a:lvl1pPr algn="l">
+              <a:defRPr sz="1200"/>
+            </a:lvl1pPr>
+          </a:lstStyle>
+          <a:p>
+            <a:endParaRPr lang="pt-BR"/>
+          </a:p>
+        </p:txBody>
+      </p:sp>
+      <p:sp>
+        <p:nvSpPr>
+          <p:cNvPr id="3" name="Espaço Reservado para Data 2"/>
+          <p:cNvSpPr>
+            <a:spLocks noGrp="1"/>
+          </p:cNvSpPr>
+          <p:nvPr>
+            <p:ph type="dt" idx="1"/>
+          </p:nvPr>
+        </p:nvSpPr>
+        <p:spPr>
+          <a:xfrm>
+            <a:off x="3884613" y="0"/>
+            <a:ext cx="2971800" cy="458788"/>
+          </a:xfrm>
+          <a:prstGeom prst="rect">
+            <a:avLst/>
+          </a:prstGeom>
+        </p:spPr>
+        <p:txBody>
+          <a:bodyPr vert="horz" lIns="91440" tIns="45720" rIns="91440" bIns="45720" rtlCol="0"/>
+          <a:lstStyle>
+            <a:lvl1pPr algn="r">
+              <a:defRPr sz="1200"/>
+            </a:lvl1pPr>
+          </a:lstStyle>
+          <a:p>
+            <a:fld id="{3BA07921-8515-41CD-AB3F-A59CABDABD1B}" type="datetimeFigureOut">
+              <a:rPr lang="pt-BR" smtClean="0"/>
+              <a:t>22/10/2024</a:t>
+            </a:fld>
+            <a:endParaRPr lang="pt-BR"/>
+          </a:p>
+        </p:txBody>
+      </p:sp>
+      <p:sp>
+        <p:nvSpPr>
+          <p:cNvPr id="4" name="Espaço Reservado para Imagem de Slide 3"/>
+          <p:cNvSpPr>
+            <a:spLocks noGrp="1" noRot="1" noChangeAspect="1"/>
+          </p:cNvSpPr>
+          <p:nvPr>
+            <p:ph type="sldImg" idx="2"/>
+          </p:nvPr>
+        </p:nvSpPr>
+        <p:spPr>
+          <a:xfrm>
+            <a:off x="685800" y="1143000"/>
+            <a:ext cx="5486400" cy="3086100"/>
+          </a:xfrm>
+          <a:prstGeom prst="rect">
+            <a:avLst/>
+          </a:prstGeom>
+          <a:noFill/>
+          <a:ln w="12700">
+            <a:solidFill>
+              <a:prstClr val="black"/>
+            </a:solidFill>
+          </a:ln>
+        </p:spPr>
+        <p:txBody>
+          <a:bodyPr vert="horz" lIns="91440" tIns="45720" rIns="91440" bIns="45720" rtlCol="0" anchor="ctr"/>
+          <a:lstStyle/>
+          <a:p>
+            <a:endParaRPr lang="pt-BR"/>
+          </a:p>
+        </p:txBody>
+      </p:sp>
+      <p:sp>
+        <p:nvSpPr>
+          <p:cNvPr id="5" name="Espaço Reservado para Anotações 4"/>
+          <p:cNvSpPr>
+            <a:spLocks noGrp="1"/>
+          </p:cNvSpPr>
+          <p:nvPr>
+            <p:ph type="body" sz="quarter" idx="3"/>
+          </p:nvPr>
+        </p:nvSpPr>
+        <p:spPr>
+          <a:xfrm>
+            <a:off x="685800" y="4400550"/>
+            <a:ext cx="5486400" cy="3600450"/>
+          </a:xfrm>
+          <a:prstGeom prst="rect">
+            <a:avLst/>
+          </a:prstGeom>
+        </p:spPr>
+        <p:txBody>
+          <a:bodyPr vert="horz" lIns="91440" tIns="45720" rIns="91440" bIns="45720" rtlCol="0"/>
+          <a:lstStyle/>
+          <a:p>
+            <a:pPr lvl="0"/>
+            <a:r>
+              <a:rPr lang="pt-BR"/>
+              <a:t>Clique para editar os estilos de texto Mestres</a:t>
+            </a:r>
+          </a:p>
+          <a:p>
+            <a:pPr lvl="1"/>
+            <a:r>
+              <a:rPr lang="pt-BR"/>
+              <a:t>Segundo nível</a:t>
+            </a:r>
+          </a:p>
+          <a:p>
+            <a:pPr lvl="2"/>
+            <a:r>
+              <a:rPr lang="pt-BR"/>
+              <a:t>Terceiro nível</a:t>
+            </a:r>
+          </a:p>
+          <a:p>
+            <a:pPr lvl="3"/>
+            <a:r>
+              <a:rPr lang="pt-BR"/>
+              <a:t>Quarto nível</a:t>
+            </a:r>
+          </a:p>
+          <a:p>
+            <a:pPr lvl="4"/>
+            <a:r>
+              <a:rPr lang="pt-BR"/>
+              <a:t>Quinto nível</a:t>
+            </a:r>
+          </a:p>
+        </p:txBody>
+      </p:sp>
+      <p:sp>
+        <p:nvSpPr>
+          <p:cNvPr id="6" name="Espaço Reservado para Rodapé 5"/>
+          <p:cNvSpPr>
+            <a:spLocks noGrp="1"/>
+          </p:cNvSpPr>
+          <p:nvPr>
+            <p:ph type="ftr" sz="quarter" idx="4"/>
+          </p:nvPr>
+        </p:nvSpPr>
+        <p:spPr>
+          <a:xfrm>
+            <a:off x="0" y="8685213"/>
+            <a:ext cx="2971800" cy="458787"/>
+          </a:xfrm>
+          <a:prstGeom prst="rect">
+            <a:avLst/>
+          </a:prstGeom>
+        </p:spPr>
+        <p:txBody>
+          <a:bodyPr vert="horz" lIns="91440" tIns="45720" rIns="91440" bIns="45720" rtlCol="0" anchor="b"/>
+          <a:lstStyle>
+            <a:lvl1pPr algn="l">
+              <a:defRPr sz="1200"/>
+            </a:lvl1pPr>
+          </a:lstStyle>
+          <a:p>
+            <a:endParaRPr lang="pt-BR"/>
+          </a:p>
+        </p:txBody>
+      </p:sp>
+      <p:sp>
+        <p:nvSpPr>
+          <p:cNvPr id="7" name="Espaço Reservado para Número de Slide 6"/>
+          <p:cNvSpPr>
+            <a:spLocks noGrp="1"/>
+          </p:cNvSpPr>
+          <p:nvPr>
+            <p:ph type="sldNum" sz="quarter" idx="5"/>
+          </p:nvPr>
+        </p:nvSpPr>
+        <p:spPr>
+          <a:xfrm>
+            <a:off x="3884613" y="8685213"/>
+            <a:ext cx="2971800" cy="458787"/>
+          </a:xfrm>
+          <a:prstGeom prst="rect">
+            <a:avLst/>
+          </a:prstGeom>
+        </p:spPr>
+        <p:txBody>
+          <a:bodyPr vert="horz" lIns="91440" tIns="45720" rIns="91440" bIns="45720" rtlCol="0" anchor="b"/>
+          <a:lstStyle>
+            <a:lvl1pPr algn="r">
+              <a:defRPr sz="1200"/>
+            </a:lvl1pPr>
+          </a:lstStyle>
+          <a:p>
+            <a:fld id="{49ACFF8A-74B9-4864-A803-F6BCF2D1735C}" type="slidenum">
+              <a:rPr lang="pt-BR" smtClean="0"/>
+              <a:t>‹nº›</a:t>
+            </a:fld>
+            <a:endParaRPr lang="pt-BR"/>
+          </a:p>
+        </p:txBody>
+      </p:sp>
+    </p:spTree>
+    <p:extLst>
+      <p:ext uri="{BB962C8B-B14F-4D97-AF65-F5344CB8AC3E}">
+        <p14:creationId xmlns:p14="http://schemas.microsoft.com/office/powerpoint/2010/main" val="1265205441"/>
+      </p:ext>
+    </p:extLst>
+  </p:cSld>
+  <p:clrMap bg1="lt1" tx1="dk1" bg2="lt2" tx2="dk2" accent1="accent1" accent2="accent2" accent3="accent3" accent4="accent4" accent5="accent5" accent6="accent6" hlink="hlink" folHlink="folHlink"/>
+  <p:notesStyle>
+    <a:lvl1pPr marL="0" algn="l" defTabSz="914400" rtl="0" eaLnBrk="1" latinLnBrk="0" hangingPunct="1">
+      <a:defRPr sz="1200" kern="1200">
+        <a:solidFill>
+          <a:schemeClr val="tx1"/>
+        </a:solidFill>
+        <a:latin typeface="+mn-lt"/>
+        <a:ea typeface="+mn-ea"/>
+        <a:cs typeface="+mn-cs"/>
+      </a:defRPr>
+    </a:lvl1pPr>
+    <a:lvl2pPr marL="457200" algn="l" defTabSz="914400" rtl="0" eaLnBrk="1" latinLnBrk="0" hangingPunct="1">
+      <a:defRPr sz="1200" kern="1200">
+        <a:solidFill>
+          <a:schemeClr val="tx1"/>
+        </a:solidFill>
+        <a:latin typeface="+mn-lt"/>
+        <a:ea typeface="+mn-ea"/>
+        <a:cs typeface="+mn-cs"/>
+      </a:defRPr>
+    </a:lvl2pPr>
+    <a:lvl3pPr marL="914400" algn="l" defTabSz="914400" rtl="0" eaLnBrk="1" latinLnBrk="0" hangingPunct="1">
+      <a:defRPr sz="1200" kern="1200">
+        <a:solidFill>
+          <a:schemeClr val="tx1"/>
+        </a:solidFill>
+        <a:latin typeface="+mn-lt"/>
+        <a:ea typeface="+mn-ea"/>
+        <a:cs typeface="+mn-cs"/>
+      </a:defRPr>
+    </a:lvl3pPr>
+    <a:lvl4pPr marL="1371600" algn="l" defTabSz="914400" rtl="0" eaLnBrk="1" latinLnBrk="0" hangingPunct="1">
+      <a:defRPr sz="1200" kern="1200">
+        <a:solidFill>
+          <a:schemeClr val="tx1"/>
+        </a:solidFill>
+        <a:latin typeface="+mn-lt"/>
+        <a:ea typeface="+mn-ea"/>
+        <a:cs typeface="+mn-cs"/>
+      </a:defRPr>
+    </a:lvl4pPr>
+    <a:lvl5pPr marL="1828800" algn="l" defTabSz="914400" rtl="0" eaLnBrk="1" latinLnBrk="0" hangingPunct="1">
+      <a:defRPr sz="1200" kern="1200">
+        <a:solidFill>
+          <a:schemeClr val="tx1"/>
+        </a:solidFill>
+        <a:latin typeface="+mn-lt"/>
+        <a:ea typeface="+mn-ea"/>
+        <a:cs typeface="+mn-cs"/>
+      </a:defRPr>
+    </a:lvl5pPr>
+    <a:lvl6pPr marL="2286000" algn="l" defTabSz="914400" rtl="0" eaLnBrk="1" latinLnBrk="0" hangingPunct="1">
+      <a:defRPr sz="1200" kern="1200">
+        <a:solidFill>
+          <a:schemeClr val="tx1"/>
+        </a:solidFill>
+        <a:latin typeface="+mn-lt"/>
+        <a:ea typeface="+mn-ea"/>
+        <a:cs typeface="+mn-cs"/>
+      </a:defRPr>
+    </a:lvl6pPr>
+    <a:lvl7pPr marL="2743200" algn="l" defTabSz="914400" rtl="0" eaLnBrk="1" latinLnBrk="0" hangingPunct="1">
+      <a:defRPr sz="1200" kern="1200">
+        <a:solidFill>
+          <a:schemeClr val="tx1"/>
+        </a:solidFill>
+        <a:latin typeface="+mn-lt"/>
+        <a:ea typeface="+mn-ea"/>
+        <a:cs typeface="+mn-cs"/>
+      </a:defRPr>
+    </a:lvl7pPr>
+    <a:lvl8pPr marL="3200400" algn="l" defTabSz="914400" rtl="0" eaLnBrk="1" latinLnBrk="0" hangingPunct="1">
+      <a:defRPr sz="1200" kern="1200">
+        <a:solidFill>
+          <a:schemeClr val="tx1"/>
+        </a:solidFill>
+        <a:latin typeface="+mn-lt"/>
+        <a:ea typeface="+mn-ea"/>
+        <a:cs typeface="+mn-cs"/>
+      </a:defRPr>
+    </a:lvl8pPr>
+    <a:lvl9pPr marL="3657600" algn="l" defTabSz="914400" rtl="0" eaLnBrk="1" latinLnBrk="0" hangingPunct="1">
+      <a:defRPr sz="1200" kern="1200">
+        <a:solidFill>
+          <a:schemeClr val="tx1"/>
+        </a:solidFill>
+        <a:latin typeface="+mn-lt"/>
+        <a:ea typeface="+mn-ea"/>
+        <a:cs typeface="+mn-cs"/>
+      </a:defRPr>
+    </a:lvl9pPr>
+  </p:notesStyle>
+</p:notesMaster>
+</file>
+
+<file path=ppt/notesSlides/notesSlide1.xml><?xml version="1.0" encoding="utf-8"?>
+<p:notes xmlns:a="http://schemas.openxmlformats.org/drawingml/2006/main" xmlns:r="http://schemas.openxmlformats.org/officeDocument/2006/relationships" xmlns:p="http://schemas.openxmlformats.org/presentationml/2006/main">
+  <p:cSld>
+    <p:spTree>
+      <p:nvGrpSpPr>
+        <p:cNvPr id="1" name=""/>
+        <p:cNvGrpSpPr/>
+        <p:nvPr/>
+      </p:nvGrpSpPr>
+      <p:grpSpPr>
+        <a:xfrm>
+          <a:off x="0" y="0"/>
+          <a:ext cx="0" cy="0"/>
+          <a:chOff x="0" y="0"/>
+          <a:chExt cx="0" cy="0"/>
+        </a:xfrm>
+      </p:grpSpPr>
+      <p:sp>
+        <p:nvSpPr>
+          <p:cNvPr id="2" name="Espaço Reservado para Imagem de Slide 1"/>
+          <p:cNvSpPr>
+            <a:spLocks noGrp="1" noRot="1" noChangeAspect="1"/>
+          </p:cNvSpPr>
+          <p:nvPr>
+            <p:ph type="sldImg"/>
+          </p:nvPr>
+        </p:nvSpPr>
+        <p:spPr/>
+      </p:sp>
+      <p:sp>
+        <p:nvSpPr>
+          <p:cNvPr id="3" name="Espaço Reservado para Anotações 2"/>
+          <p:cNvSpPr>
+            <a:spLocks noGrp="1"/>
+          </p:cNvSpPr>
+          <p:nvPr>
+            <p:ph type="body" idx="1"/>
+          </p:nvPr>
+        </p:nvSpPr>
+        <p:spPr/>
+        <p:txBody>
+          <a:bodyPr/>
+          <a:lstStyle/>
+          <a:p>
+            <a:endParaRPr lang="pt-BR" dirty="0"/>
+          </a:p>
+        </p:txBody>
+      </p:sp>
+      <p:sp>
+        <p:nvSpPr>
+          <p:cNvPr id="4" name="Espaço Reservado para Número de Slide 3"/>
+          <p:cNvSpPr>
+            <a:spLocks noGrp="1"/>
+          </p:cNvSpPr>
+          <p:nvPr>
+            <p:ph type="sldNum" sz="quarter" idx="5"/>
+          </p:nvPr>
+        </p:nvSpPr>
+        <p:spPr/>
+        <p:txBody>
+          <a:bodyPr/>
+          <a:lstStyle/>
+          <a:p>
+            <a:fld id="{49ACFF8A-74B9-4864-A803-F6BCF2D1735C}" type="slidenum">
+              <a:rPr lang="pt-BR" smtClean="0"/>
+              <a:t>11</a:t>
+            </a:fld>
+            <a:endParaRPr lang="pt-BR"/>
+          </a:p>
+        </p:txBody>
+      </p:sp>
+    </p:spTree>
+    <p:extLst>
+      <p:ext uri="{BB962C8B-B14F-4D97-AF65-F5344CB8AC3E}">
+        <p14:creationId xmlns:p14="http://schemas.microsoft.com/office/powerpoint/2010/main" val="862744514"/>
+      </p:ext>
+    </p:extLst>
+  </p:cSld>
+  <p:clrMapOvr>
+    <a:masterClrMapping/>
+  </p:clrMapOvr>
+</p:notes>
+</file>
+
+<file path=ppt/notesSlides/notesSlide2.xml><?xml version="1.0" encoding="utf-8"?>
+<p:notes xmlns:a="http://schemas.openxmlformats.org/drawingml/2006/main" xmlns:r="http://schemas.openxmlformats.org/officeDocument/2006/relationships" xmlns:p="http://schemas.openxmlformats.org/presentationml/2006/main">
+  <p:cSld>
+    <p:spTree>
+      <p:nvGrpSpPr>
+        <p:cNvPr id="1" name="">
+          <a:extLst>
+            <a:ext uri="{FF2B5EF4-FFF2-40B4-BE49-F238E27FC236}">
+              <a16:creationId xmlns:a16="http://schemas.microsoft.com/office/drawing/2014/main" id="{386F02D6-FCE0-A63E-5729-EA4FAF07A533}"/>
+            </a:ext>
+          </a:extLst>
+        </p:cNvPr>
+        <p:cNvGrpSpPr/>
+        <p:nvPr/>
+      </p:nvGrpSpPr>
+      <p:grpSpPr>
+        <a:xfrm>
+          <a:off x="0" y="0"/>
+          <a:ext cx="0" cy="0"/>
+          <a:chOff x="0" y="0"/>
+          <a:chExt cx="0" cy="0"/>
+        </a:xfrm>
+      </p:grpSpPr>
+      <p:sp>
+        <p:nvSpPr>
+          <p:cNvPr id="2" name="Espaço Reservado para Imagem de Slide 1">
+            <a:extLst>
+              <a:ext uri="{FF2B5EF4-FFF2-40B4-BE49-F238E27FC236}">
+                <a16:creationId xmlns:a16="http://schemas.microsoft.com/office/drawing/2014/main" id="{2E099B5B-F69B-D18A-DA53-B93DD4D3B893}"/>
+              </a:ext>
+            </a:extLst>
+          </p:cNvPr>
+          <p:cNvSpPr>
+            <a:spLocks noGrp="1" noRot="1" noChangeAspect="1"/>
+          </p:cNvSpPr>
+          <p:nvPr>
+            <p:ph type="sldImg"/>
+          </p:nvPr>
+        </p:nvSpPr>
+        <p:spPr/>
+      </p:sp>
+      <p:sp>
+        <p:nvSpPr>
+          <p:cNvPr id="3" name="Espaço Reservado para Anotações 2">
+            <a:extLst>
+              <a:ext uri="{FF2B5EF4-FFF2-40B4-BE49-F238E27FC236}">
+                <a16:creationId xmlns:a16="http://schemas.microsoft.com/office/drawing/2014/main" id="{DF36341F-11F2-8EEA-207C-1E6624A3A699}"/>
+              </a:ext>
+            </a:extLst>
+          </p:cNvPr>
+          <p:cNvSpPr>
+            <a:spLocks noGrp="1"/>
+          </p:cNvSpPr>
+          <p:nvPr>
+            <p:ph type="body" idx="1"/>
+          </p:nvPr>
+        </p:nvSpPr>
+        <p:spPr/>
+        <p:txBody>
+          <a:bodyPr/>
+          <a:lstStyle/>
+          <a:p>
+            <a:endParaRPr lang="pt-BR" dirty="0"/>
+          </a:p>
+        </p:txBody>
+      </p:sp>
+      <p:sp>
+        <p:nvSpPr>
+          <p:cNvPr id="4" name="Espaço Reservado para Número de Slide 3">
+            <a:extLst>
+              <a:ext uri="{FF2B5EF4-FFF2-40B4-BE49-F238E27FC236}">
+                <a16:creationId xmlns:a16="http://schemas.microsoft.com/office/drawing/2014/main" id="{F42C378D-FB9A-AF45-7ED2-F8B6FFACF893}"/>
+              </a:ext>
+            </a:extLst>
+          </p:cNvPr>
+          <p:cNvSpPr>
+            <a:spLocks noGrp="1"/>
+          </p:cNvSpPr>
+          <p:nvPr>
+            <p:ph type="sldNum" sz="quarter" idx="5"/>
+          </p:nvPr>
+        </p:nvSpPr>
+        <p:spPr/>
+        <p:txBody>
+          <a:bodyPr/>
+          <a:lstStyle/>
+          <a:p>
+            <a:fld id="{49ACFF8A-74B9-4864-A803-F6BCF2D1735C}" type="slidenum">
+              <a:rPr lang="pt-BR" smtClean="0"/>
+              <a:t>12</a:t>
+            </a:fld>
+            <a:endParaRPr lang="pt-BR"/>
+          </a:p>
+        </p:txBody>
+      </p:sp>
+    </p:spTree>
+    <p:extLst>
+      <p:ext uri="{BB962C8B-B14F-4D97-AF65-F5344CB8AC3E}">
+        <p14:creationId xmlns:p14="http://schemas.microsoft.com/office/powerpoint/2010/main" val="3614820854"/>
+      </p:ext>
+    </p:extLst>
+  </p:cSld>
+  <p:clrMapOvr>
+    <a:masterClrMapping/>
+  </p:clrMapOvr>
+</p:notes>
+</file>
+
+<file path=ppt/notesSlides/notesSlide3.xml><?xml version="1.0" encoding="utf-8"?>
+<p:notes xmlns:a="http://schemas.openxmlformats.org/drawingml/2006/main" xmlns:r="http://schemas.openxmlformats.org/officeDocument/2006/relationships" xmlns:p="http://schemas.openxmlformats.org/presentationml/2006/main">
+  <p:cSld>
+    <p:spTree>
+      <p:nvGrpSpPr>
+        <p:cNvPr id="1" name="">
+          <a:extLst>
+            <a:ext uri="{FF2B5EF4-FFF2-40B4-BE49-F238E27FC236}">
+              <a16:creationId xmlns:a16="http://schemas.microsoft.com/office/drawing/2014/main" id="{DB2849FD-78D4-6F11-B926-88F5B96015F0}"/>
+            </a:ext>
+          </a:extLst>
+        </p:cNvPr>
+        <p:cNvGrpSpPr/>
+        <p:nvPr/>
+      </p:nvGrpSpPr>
+      <p:grpSpPr>
+        <a:xfrm>
+          <a:off x="0" y="0"/>
+          <a:ext cx="0" cy="0"/>
+          <a:chOff x="0" y="0"/>
+          <a:chExt cx="0" cy="0"/>
+        </a:xfrm>
+      </p:grpSpPr>
+      <p:sp>
+        <p:nvSpPr>
+          <p:cNvPr id="2" name="Espaço Reservado para Imagem de Slide 1">
+            <a:extLst>
+              <a:ext uri="{FF2B5EF4-FFF2-40B4-BE49-F238E27FC236}">
+                <a16:creationId xmlns:a16="http://schemas.microsoft.com/office/drawing/2014/main" id="{7E373804-C3EC-B309-22EB-83A24CA8A595}"/>
+              </a:ext>
+            </a:extLst>
+          </p:cNvPr>
+          <p:cNvSpPr>
+            <a:spLocks noGrp="1" noRot="1" noChangeAspect="1"/>
+          </p:cNvSpPr>
+          <p:nvPr>
+            <p:ph type="sldImg"/>
+          </p:nvPr>
+        </p:nvSpPr>
+        <p:spPr/>
+      </p:sp>
+      <p:sp>
+        <p:nvSpPr>
+          <p:cNvPr id="3" name="Espaço Reservado para Anotações 2">
+            <a:extLst>
+              <a:ext uri="{FF2B5EF4-FFF2-40B4-BE49-F238E27FC236}">
+                <a16:creationId xmlns:a16="http://schemas.microsoft.com/office/drawing/2014/main" id="{8D7A7F48-C683-4078-C4F3-0AD833182C7C}"/>
+              </a:ext>
+            </a:extLst>
+          </p:cNvPr>
+          <p:cNvSpPr>
+            <a:spLocks noGrp="1"/>
+          </p:cNvSpPr>
+          <p:nvPr>
+            <p:ph type="body" idx="1"/>
+          </p:nvPr>
+        </p:nvSpPr>
+        <p:spPr/>
+        <p:txBody>
+          <a:bodyPr/>
+          <a:lstStyle/>
+          <a:p>
+            <a:endParaRPr lang="pt-BR" dirty="0"/>
+          </a:p>
+        </p:txBody>
+      </p:sp>
+      <p:sp>
+        <p:nvSpPr>
+          <p:cNvPr id="4" name="Espaço Reservado para Número de Slide 3">
+            <a:extLst>
+              <a:ext uri="{FF2B5EF4-FFF2-40B4-BE49-F238E27FC236}">
+                <a16:creationId xmlns:a16="http://schemas.microsoft.com/office/drawing/2014/main" id="{C3DC4284-B393-2768-DD36-0FB28A058EB3}"/>
+              </a:ext>
+            </a:extLst>
+          </p:cNvPr>
+          <p:cNvSpPr>
+            <a:spLocks noGrp="1"/>
+          </p:cNvSpPr>
+          <p:nvPr>
+            <p:ph type="sldNum" sz="quarter" idx="5"/>
+          </p:nvPr>
+        </p:nvSpPr>
+        <p:spPr/>
+        <p:txBody>
+          <a:bodyPr/>
+          <a:lstStyle/>
+          <a:p>
+            <a:fld id="{49ACFF8A-74B9-4864-A803-F6BCF2D1735C}" type="slidenum">
+              <a:rPr lang="pt-BR" smtClean="0"/>
+              <a:t>13</a:t>
+            </a:fld>
+            <a:endParaRPr lang="pt-BR"/>
+          </a:p>
+        </p:txBody>
+      </p:sp>
+    </p:spTree>
+    <p:extLst>
+      <p:ext uri="{BB962C8B-B14F-4D97-AF65-F5344CB8AC3E}">
+        <p14:creationId xmlns:p14="http://schemas.microsoft.com/office/powerpoint/2010/main" val="2878077944"/>
+      </p:ext>
+    </p:extLst>
+  </p:cSld>
+  <p:clrMapOvr>
+    <a:masterClrMapping/>
+  </p:clrMapOvr>
+</p:notes>
+</file>
+
+<file path=ppt/notesSlides/notesSlide4.xml><?xml version="1.0" encoding="utf-8"?>
+<p:notes xmlns:a="http://schemas.openxmlformats.org/drawingml/2006/main" xmlns:r="http://schemas.openxmlformats.org/officeDocument/2006/relationships" xmlns:p="http://schemas.openxmlformats.org/presentationml/2006/main">
+  <p:cSld>
+    <p:spTree>
+      <p:nvGrpSpPr>
+        <p:cNvPr id="1" name="">
+          <a:extLst>
+            <a:ext uri="{FF2B5EF4-FFF2-40B4-BE49-F238E27FC236}">
+              <a16:creationId xmlns:a16="http://schemas.microsoft.com/office/drawing/2014/main" id="{EB2B636D-2A0C-2C17-7E05-FE1CAC908539}"/>
+            </a:ext>
+          </a:extLst>
+        </p:cNvPr>
+        <p:cNvGrpSpPr/>
+        <p:nvPr/>
+      </p:nvGrpSpPr>
+      <p:grpSpPr>
+        <a:xfrm>
+          <a:off x="0" y="0"/>
+          <a:ext cx="0" cy="0"/>
+          <a:chOff x="0" y="0"/>
+          <a:chExt cx="0" cy="0"/>
+        </a:xfrm>
+      </p:grpSpPr>
+      <p:sp>
+        <p:nvSpPr>
+          <p:cNvPr id="2" name="Espaço Reservado para Imagem de Slide 1">
+            <a:extLst>
+              <a:ext uri="{FF2B5EF4-FFF2-40B4-BE49-F238E27FC236}">
+                <a16:creationId xmlns:a16="http://schemas.microsoft.com/office/drawing/2014/main" id="{E573C317-37A4-E6A5-6EBC-EE7E684AD05E}"/>
+              </a:ext>
+            </a:extLst>
+          </p:cNvPr>
+          <p:cNvSpPr>
+            <a:spLocks noGrp="1" noRot="1" noChangeAspect="1"/>
+          </p:cNvSpPr>
+          <p:nvPr>
+            <p:ph type="sldImg"/>
+          </p:nvPr>
+        </p:nvSpPr>
+        <p:spPr/>
+      </p:sp>
+      <p:sp>
+        <p:nvSpPr>
+          <p:cNvPr id="3" name="Espaço Reservado para Anotações 2">
+            <a:extLst>
+              <a:ext uri="{FF2B5EF4-FFF2-40B4-BE49-F238E27FC236}">
+                <a16:creationId xmlns:a16="http://schemas.microsoft.com/office/drawing/2014/main" id="{299E60A8-D7A6-A6E2-8A5F-58AC8335CE36}"/>
+              </a:ext>
+            </a:extLst>
+          </p:cNvPr>
+          <p:cNvSpPr>
+            <a:spLocks noGrp="1"/>
+          </p:cNvSpPr>
+          <p:nvPr>
+            <p:ph type="body" idx="1"/>
+          </p:nvPr>
+        </p:nvSpPr>
+        <p:spPr/>
+        <p:txBody>
+          <a:bodyPr/>
+          <a:lstStyle/>
+          <a:p>
+            <a:endParaRPr lang="pt-BR" dirty="0"/>
+          </a:p>
+        </p:txBody>
+      </p:sp>
+      <p:sp>
+        <p:nvSpPr>
+          <p:cNvPr id="4" name="Espaço Reservado para Número de Slide 3">
+            <a:extLst>
+              <a:ext uri="{FF2B5EF4-FFF2-40B4-BE49-F238E27FC236}">
+                <a16:creationId xmlns:a16="http://schemas.microsoft.com/office/drawing/2014/main" id="{AE4373B4-227F-E4FE-1A5F-F8661322D79F}"/>
+              </a:ext>
+            </a:extLst>
+          </p:cNvPr>
+          <p:cNvSpPr>
+            <a:spLocks noGrp="1"/>
+          </p:cNvSpPr>
+          <p:nvPr>
+            <p:ph type="sldNum" sz="quarter" idx="5"/>
+          </p:nvPr>
+        </p:nvSpPr>
+        <p:spPr/>
+        <p:txBody>
+          <a:bodyPr/>
+          <a:lstStyle/>
+          <a:p>
+            <a:fld id="{49ACFF8A-74B9-4864-A803-F6BCF2D1735C}" type="slidenum">
+              <a:rPr lang="pt-BR" smtClean="0"/>
+              <a:t>15</a:t>
+            </a:fld>
+            <a:endParaRPr lang="pt-BR"/>
+          </a:p>
+        </p:txBody>
+      </p:sp>
+    </p:spTree>
+    <p:extLst>
+      <p:ext uri="{BB962C8B-B14F-4D97-AF65-F5344CB8AC3E}">
+        <p14:creationId xmlns:p14="http://schemas.microsoft.com/office/powerpoint/2010/main" val="1343267436"/>
+      </p:ext>
+    </p:extLst>
+  </p:cSld>
+  <p:clrMapOvr>
+    <a:masterClrMapping/>
+  </p:clrMapOvr>
+</p:notes>
+</file>
+
 <file path=ppt/slideLayouts/slideLayout1.xml><?xml version="1.0" encoding="utf-8"?>
 <p:sldLayout xmlns:a="http://schemas.openxmlformats.org/drawingml/2006/main" xmlns:r="http://schemas.openxmlformats.org/officeDocument/2006/relationships" xmlns:p="http://schemas.openxmlformats.org/presentationml/2006/main" type="title" preserve="1">
   <p:cSld name="Slide de Título">
@@ -281,7 +1044,7 @@
           <a:p>
             <a:fld id="{BEA5DFCF-40E3-3E47-8BF1-F87A0069E078}" type="datetimeFigureOut">
               <a:rPr lang="pt-BR" smtClean="0"/>
-              <a:t>21/10/2024</a:t>
+              <a:t>22/10/2024</a:t>
             </a:fld>
             <a:endParaRPr lang="pt-BR"/>
           </a:p>
@@ -479,7 +1242,7 @@
           <a:p>
             <a:fld id="{BEA5DFCF-40E3-3E47-8BF1-F87A0069E078}" type="datetimeFigureOut">
               <a:rPr lang="pt-BR" smtClean="0"/>
-              <a:t>21/10/2024</a:t>
+              <a:t>22/10/2024</a:t>
             </a:fld>
             <a:endParaRPr lang="pt-BR"/>
           </a:p>
@@ -687,7 +1450,7 @@
           <a:p>
             <a:fld id="{BEA5DFCF-40E3-3E47-8BF1-F87A0069E078}" type="datetimeFigureOut">
               <a:rPr lang="pt-BR" smtClean="0"/>
-              <a:t>21/10/2024</a:t>
+              <a:t>22/10/2024</a:t>
             </a:fld>
             <a:endParaRPr lang="pt-BR"/>
           </a:p>
@@ -885,7 +1648,7 @@
           <a:p>
             <a:fld id="{BEA5DFCF-40E3-3E47-8BF1-F87A0069E078}" type="datetimeFigureOut">
               <a:rPr lang="pt-BR" smtClean="0"/>
-              <a:t>21/10/2024</a:t>
+              <a:t>22/10/2024</a:t>
             </a:fld>
             <a:endParaRPr lang="pt-BR"/>
           </a:p>
@@ -1160,7 +1923,7 @@
           <a:p>
             <a:fld id="{BEA5DFCF-40E3-3E47-8BF1-F87A0069E078}" type="datetimeFigureOut">
               <a:rPr lang="pt-BR" smtClean="0"/>
-              <a:t>21/10/2024</a:t>
+              <a:t>22/10/2024</a:t>
             </a:fld>
             <a:endParaRPr lang="pt-BR"/>
           </a:p>
@@ -1425,7 +2188,7 @@
           <a:p>
             <a:fld id="{BEA5DFCF-40E3-3E47-8BF1-F87A0069E078}" type="datetimeFigureOut">
               <a:rPr lang="pt-BR" smtClean="0"/>
-              <a:t>21/10/2024</a:t>
+              <a:t>22/10/2024</a:t>
             </a:fld>
             <a:endParaRPr lang="pt-BR"/>
           </a:p>
@@ -1837,7 +2600,7 @@
           <a:p>
             <a:fld id="{BEA5DFCF-40E3-3E47-8BF1-F87A0069E078}" type="datetimeFigureOut">
               <a:rPr lang="pt-BR" smtClean="0"/>
-              <a:t>21/10/2024</a:t>
+              <a:t>22/10/2024</a:t>
             </a:fld>
             <a:endParaRPr lang="pt-BR"/>
           </a:p>
@@ -1978,7 +2741,7 @@
           <a:p>
             <a:fld id="{BEA5DFCF-40E3-3E47-8BF1-F87A0069E078}" type="datetimeFigureOut">
               <a:rPr lang="pt-BR" smtClean="0"/>
-              <a:t>21/10/2024</a:t>
+              <a:t>22/10/2024</a:t>
             </a:fld>
             <a:endParaRPr lang="pt-BR"/>
           </a:p>
@@ -2091,7 +2854,7 @@
           <a:p>
             <a:fld id="{BEA5DFCF-40E3-3E47-8BF1-F87A0069E078}" type="datetimeFigureOut">
               <a:rPr lang="pt-BR" smtClean="0"/>
-              <a:t>21/10/2024</a:t>
+              <a:t>22/10/2024</a:t>
             </a:fld>
             <a:endParaRPr lang="pt-BR"/>
           </a:p>
@@ -2402,7 +3165,7 @@
           <a:p>
             <a:fld id="{BEA5DFCF-40E3-3E47-8BF1-F87A0069E078}" type="datetimeFigureOut">
               <a:rPr lang="pt-BR" smtClean="0"/>
-              <a:t>21/10/2024</a:t>
+              <a:t>22/10/2024</a:t>
             </a:fld>
             <a:endParaRPr lang="pt-BR"/>
           </a:p>
@@ -2690,7 +3453,7 @@
           <a:p>
             <a:fld id="{BEA5DFCF-40E3-3E47-8BF1-F87A0069E078}" type="datetimeFigureOut">
               <a:rPr lang="pt-BR" smtClean="0"/>
-              <a:t>21/10/2024</a:t>
+              <a:t>22/10/2024</a:t>
             </a:fld>
             <a:endParaRPr lang="pt-BR"/>
           </a:p>
@@ -2934,7 +3697,7 @@
           <a:p>
             <a:fld id="{BEA5DFCF-40E3-3E47-8BF1-F87A0069E078}" type="datetimeFigureOut">
               <a:rPr lang="pt-BR" smtClean="0"/>
-              <a:t>21/10/2024</a:t>
+              <a:t>22/10/2024</a:t>
             </a:fld>
             <a:endParaRPr lang="pt-BR"/>
           </a:p>
@@ -3526,7 +4289,7 @@
         <p:cNvPr id="1" name="">
           <a:extLst>
             <a:ext uri="{FF2B5EF4-FFF2-40B4-BE49-F238E27FC236}">
-              <a16:creationId xmlns:a16="http://schemas.microsoft.com/office/drawing/2014/main" id="{0C2E2F90-CA87-911B-91AF-78580F999755}"/>
+              <a16:creationId xmlns:a16="http://schemas.microsoft.com/office/drawing/2014/main" id="{B188E4D1-D779-B367-1C24-DC56D3DC1F72}"/>
             </a:ext>
           </a:extLst>
         </p:cNvPr>
@@ -3546,7 +4309,7 @@
           <p:cNvPr id="4" name="Retângulo Arredondado 3">
             <a:extLst>
               <a:ext uri="{FF2B5EF4-FFF2-40B4-BE49-F238E27FC236}">
-                <a16:creationId xmlns:a16="http://schemas.microsoft.com/office/drawing/2014/main" id="{DE8F909E-2628-57A4-AB09-43A35A119885}"/>
+                <a16:creationId xmlns:a16="http://schemas.microsoft.com/office/drawing/2014/main" id="{D3387DD8-BD3D-78F3-D0C0-BBFD58968F99}"/>
               </a:ext>
             </a:extLst>
           </p:cNvPr>
@@ -3596,7 +4359,7 @@
           <p:cNvPr id="2" name="Título 1">
             <a:extLst>
               <a:ext uri="{FF2B5EF4-FFF2-40B4-BE49-F238E27FC236}">
-                <a16:creationId xmlns:a16="http://schemas.microsoft.com/office/drawing/2014/main" id="{B9F6D251-CCC9-05EB-F0E5-9332247B9EB5}"/>
+                <a16:creationId xmlns:a16="http://schemas.microsoft.com/office/drawing/2014/main" id="{FE0A43E8-50B0-DA08-171B-E9A361563EB8}"/>
               </a:ext>
             </a:extLst>
           </p:cNvPr>
@@ -3636,7 +4399,7 @@
           <p:cNvPr id="5" name="Imagem 4" descr="Gráfico, Histograma&#10;&#10;Descrição gerada automaticamente">
             <a:extLst>
               <a:ext uri="{FF2B5EF4-FFF2-40B4-BE49-F238E27FC236}">
-                <a16:creationId xmlns:a16="http://schemas.microsoft.com/office/drawing/2014/main" id="{7A104058-8FA4-39D2-5BDA-8E24FCF8CC6E}"/>
+                <a16:creationId xmlns:a16="http://schemas.microsoft.com/office/drawing/2014/main" id="{EB390C7F-BE76-1EB4-F306-29884C1C042F}"/>
               </a:ext>
             </a:extLst>
           </p:cNvPr>
@@ -3661,12 +4424,103 @@
           </a:prstGeom>
         </p:spPr>
       </p:pic>
+      <p:sp>
+        <p:nvSpPr>
+          <p:cNvPr id="12" name="CaixaDeTexto 11">
+            <a:extLst>
+              <a:ext uri="{FF2B5EF4-FFF2-40B4-BE49-F238E27FC236}">
+                <a16:creationId xmlns:a16="http://schemas.microsoft.com/office/drawing/2014/main" id="{86FBC613-3ADC-C627-E481-EAF03A0D583D}"/>
+              </a:ext>
+            </a:extLst>
+          </p:cNvPr>
+          <p:cNvSpPr txBox="1"/>
+          <p:nvPr/>
+        </p:nvSpPr>
+        <p:spPr>
+          <a:xfrm>
+            <a:off x="994846" y="485279"/>
+            <a:ext cx="5015305" cy="461665"/>
+          </a:xfrm>
+          <a:prstGeom prst="rect">
+            <a:avLst/>
+          </a:prstGeom>
+          <a:noFill/>
+        </p:spPr>
+        <p:txBody>
+          <a:bodyPr wrap="square" rtlCol="0">
+            <a:spAutoFit/>
+          </a:bodyPr>
+          <a:lstStyle/>
+          <a:p>
+            <a:r>
+              <a:rPr lang="pt-BR" sz="2400" dirty="0">
+                <a:solidFill>
+                  <a:schemeClr val="bg1"/>
+                </a:solidFill>
+                <a:latin typeface="Uber Move" panose="02010803030201060303" pitchFamily="50" charset="0"/>
+              </a:rPr>
+              <a:t>Data </a:t>
+            </a:r>
+            <a:r>
+              <a:rPr lang="pt-BR" sz="2400" dirty="0" err="1">
+                <a:solidFill>
+                  <a:schemeClr val="bg1"/>
+                </a:solidFill>
+                <a:latin typeface="Uber Move" panose="02010803030201060303" pitchFamily="50" charset="0"/>
+              </a:rPr>
+              <a:t>analysis</a:t>
+            </a:r>
+            <a:r>
+              <a:rPr lang="pt-BR" sz="2400" dirty="0">
+                <a:solidFill>
+                  <a:schemeClr val="bg1"/>
+                </a:solidFill>
+                <a:latin typeface="Uber Move" panose="02010803030201060303" pitchFamily="50" charset="0"/>
+              </a:rPr>
+              <a:t> for </a:t>
+            </a:r>
+            <a:r>
+              <a:rPr lang="pt-BR" sz="2400" dirty="0" err="1">
+                <a:solidFill>
+                  <a:schemeClr val="bg1"/>
+                </a:solidFill>
+                <a:latin typeface="Uber Move" panose="02010803030201060303" pitchFamily="50" charset="0"/>
+              </a:rPr>
+              <a:t>datetime</a:t>
+            </a:r>
+            <a:r>
+              <a:rPr lang="pt-BR" sz="2400" dirty="0">
+                <a:solidFill>
+                  <a:schemeClr val="bg1"/>
+                </a:solidFill>
+                <a:latin typeface="Uber Move" panose="02010803030201060303" pitchFamily="50" charset="0"/>
+              </a:rPr>
+              <a:t> </a:t>
+            </a:r>
+            <a:r>
+              <a:rPr lang="pt-BR" sz="2400" dirty="0" err="1">
+                <a:solidFill>
+                  <a:schemeClr val="bg1"/>
+                </a:solidFill>
+                <a:latin typeface="Uber Move" panose="02010803030201060303" pitchFamily="50" charset="0"/>
+              </a:rPr>
+              <a:t>pickup</a:t>
+            </a:r>
+            <a:endParaRPr lang="pt-BR" sz="2400" dirty="0">
+              <a:solidFill>
+                <a:schemeClr val="bg1"/>
+              </a:solidFill>
+              <a:latin typeface="Uber Move" panose="02010803030201060303" pitchFamily="50" charset="0"/>
+            </a:endParaRPr>
+          </a:p>
+        </p:txBody>
+      </p:sp>
       <p:pic>
         <p:nvPicPr>
-          <p:cNvPr id="7" name="Imagem 6" descr="Uma imagem contendo Logotipo&#10;&#10;Descrição gerada automaticamente">
-            <a:extLst>
-              <a:ext uri="{FF2B5EF4-FFF2-40B4-BE49-F238E27FC236}">
-                <a16:creationId xmlns:a16="http://schemas.microsoft.com/office/drawing/2014/main" id="{CA2ADE70-F3F9-21DF-33F1-FEAD05610FB9}"/>
+          <p:cNvPr id="8" name="Imagem 7" descr="Gráfico&#10;&#10;Descrição gerada automaticamente com confiança baixa">
+            <a:extLst>
+              <a:ext uri="{FF2B5EF4-FFF2-40B4-BE49-F238E27FC236}">
+                <a16:creationId xmlns:a16="http://schemas.microsoft.com/office/drawing/2014/main" id="{E776411B-C579-3521-CB7A-B015B2C46844}"/>
               </a:ext>
             </a:extLst>
           </p:cNvPr>
@@ -3683,7 +4537,7 @@
         </p:blipFill>
         <p:spPr>
           <a:xfrm>
-            <a:off x="6930207" y="1695675"/>
+            <a:off x="1869269" y="1695675"/>
             <a:ext cx="2400000" cy="1800000"/>
           </a:xfrm>
           <a:prstGeom prst="rect">
@@ -3693,10 +4547,10 @@
       </p:pic>
       <p:pic>
         <p:nvPicPr>
-          <p:cNvPr id="9" name="Imagem 8" descr="Uma imagem contendo Logotipo&#10;&#10;Descrição gerada automaticamente">
-            <a:extLst>
-              <a:ext uri="{FF2B5EF4-FFF2-40B4-BE49-F238E27FC236}">
-                <a16:creationId xmlns:a16="http://schemas.microsoft.com/office/drawing/2014/main" id="{CD1B1291-2F63-72C5-54A2-F53A3A97BC5B}"/>
+          <p:cNvPr id="13" name="Imagem 12" descr="Uma imagem contendo Gráfico&#10;&#10;Descrição gerada automaticamente">
+            <a:extLst>
+              <a:ext uri="{FF2B5EF4-FFF2-40B4-BE49-F238E27FC236}">
+                <a16:creationId xmlns:a16="http://schemas.microsoft.com/office/drawing/2014/main" id="{04F62613-0DBE-90F8-45D8-1919957671CD}"/>
               </a:ext>
             </a:extLst>
           </p:cNvPr>
@@ -3713,7 +4567,7 @@
         </p:blipFill>
         <p:spPr>
           <a:xfrm>
-            <a:off x="1869269" y="1629000"/>
+            <a:off x="6930207" y="1693829"/>
             <a:ext cx="2400000" cy="1800000"/>
           </a:xfrm>
           <a:prstGeom prst="rect">
@@ -3723,10 +4577,10 @@
       </p:pic>
       <p:pic>
         <p:nvPicPr>
-          <p:cNvPr id="11" name="Imagem 10" descr="Texto&#10;&#10;Descrição gerada automaticamente com confiança baixa">
-            <a:extLst>
-              <a:ext uri="{FF2B5EF4-FFF2-40B4-BE49-F238E27FC236}">
-                <a16:creationId xmlns:a16="http://schemas.microsoft.com/office/drawing/2014/main" id="{C69B8A18-0AD1-242B-1C8A-5B2254AE65F8}"/>
+          <p:cNvPr id="15" name="Imagem 14" descr="Texto&#10;&#10;Descrição gerada automaticamente com confiança média">
+            <a:extLst>
+              <a:ext uri="{FF2B5EF4-FFF2-40B4-BE49-F238E27FC236}">
+                <a16:creationId xmlns:a16="http://schemas.microsoft.com/office/drawing/2014/main" id="{5FD9ABD6-9711-51D1-E2D3-4B7C1A4E9348}"/>
               </a:ext>
             </a:extLst>
           </p:cNvPr>
@@ -3751,101 +4605,10 @@
           </a:prstGeom>
         </p:spPr>
       </p:pic>
-      <p:sp>
-        <p:nvSpPr>
-          <p:cNvPr id="12" name="CaixaDeTexto 11">
-            <a:extLst>
-              <a:ext uri="{FF2B5EF4-FFF2-40B4-BE49-F238E27FC236}">
-                <a16:creationId xmlns:a16="http://schemas.microsoft.com/office/drawing/2014/main" id="{AEB70764-5741-EF15-A385-8B5151C25A9F}"/>
-              </a:ext>
-            </a:extLst>
-          </p:cNvPr>
-          <p:cNvSpPr txBox="1"/>
-          <p:nvPr/>
-        </p:nvSpPr>
-        <p:spPr>
-          <a:xfrm>
-            <a:off x="994846" y="485279"/>
-            <a:ext cx="5015305" cy="461665"/>
-          </a:xfrm>
-          <a:prstGeom prst="rect">
-            <a:avLst/>
-          </a:prstGeom>
-          <a:noFill/>
-        </p:spPr>
-        <p:txBody>
-          <a:bodyPr wrap="square" rtlCol="0">
-            <a:spAutoFit/>
-          </a:bodyPr>
-          <a:lstStyle/>
-          <a:p>
-            <a:r>
-              <a:rPr lang="pt-BR" sz="2400" dirty="0">
-                <a:solidFill>
-                  <a:schemeClr val="bg1"/>
-                </a:solidFill>
-                <a:latin typeface="Uber Move" panose="02010803030201060303" pitchFamily="50" charset="0"/>
-              </a:rPr>
-              <a:t>Data </a:t>
-            </a:r>
-            <a:r>
-              <a:rPr lang="pt-BR" sz="2400" dirty="0" err="1">
-                <a:solidFill>
-                  <a:schemeClr val="bg1"/>
-                </a:solidFill>
-                <a:latin typeface="Uber Move" panose="02010803030201060303" pitchFamily="50" charset="0"/>
-              </a:rPr>
-              <a:t>analysis</a:t>
-            </a:r>
-            <a:r>
-              <a:rPr lang="pt-BR" sz="2400" dirty="0">
-                <a:solidFill>
-                  <a:schemeClr val="bg1"/>
-                </a:solidFill>
-                <a:latin typeface="Uber Move" panose="02010803030201060303" pitchFamily="50" charset="0"/>
-              </a:rPr>
-              <a:t> for </a:t>
-            </a:r>
-            <a:r>
-              <a:rPr lang="pt-BR" sz="2400" dirty="0" err="1">
-                <a:solidFill>
-                  <a:schemeClr val="bg1"/>
-                </a:solidFill>
-                <a:latin typeface="Uber Move" panose="02010803030201060303" pitchFamily="50" charset="0"/>
-              </a:rPr>
-              <a:t>datetime</a:t>
-            </a:r>
-            <a:r>
-              <a:rPr lang="pt-BR" sz="2400" dirty="0">
-                <a:solidFill>
-                  <a:schemeClr val="bg1"/>
-                </a:solidFill>
-                <a:latin typeface="Uber Move" panose="02010803030201060303" pitchFamily="50" charset="0"/>
-              </a:rPr>
-              <a:t> </a:t>
-            </a:r>
-            <a:r>
-              <a:rPr lang="pt-BR" sz="2400" dirty="0" err="1">
-                <a:solidFill>
-                  <a:schemeClr val="bg1"/>
-                </a:solidFill>
-                <a:latin typeface="Uber Move" panose="02010803030201060303" pitchFamily="50" charset="0"/>
-              </a:rPr>
-              <a:t>pickup</a:t>
-            </a:r>
-            <a:endParaRPr lang="pt-BR" sz="2400" dirty="0">
-              <a:solidFill>
-                <a:schemeClr val="bg1"/>
-              </a:solidFill>
-              <a:latin typeface="Uber Move" panose="02010803030201060303" pitchFamily="50" charset="0"/>
-            </a:endParaRPr>
-          </a:p>
-        </p:txBody>
-      </p:sp>
     </p:spTree>
     <p:extLst>
       <p:ext uri="{BB962C8B-B14F-4D97-AF65-F5344CB8AC3E}">
-        <p14:creationId xmlns:p14="http://schemas.microsoft.com/office/powerpoint/2010/main" val="255552952"/>
+        <p14:creationId xmlns:p14="http://schemas.microsoft.com/office/powerpoint/2010/main" val="488830681"/>
       </p:ext>
     </p:extLst>
   </p:cSld>
@@ -3854,7 +4617,7 @@
   </p:clrMapOvr>
   <mc:AlternateContent xmlns:mc="http://schemas.openxmlformats.org/markup-compatibility/2006">
     <mc:Choice xmlns:p159="http://schemas.microsoft.com/office/powerpoint/2015/09/main" Requires="p159">
-      <p:transition spd="slow" advClick="0">
+      <p:transition xmlns:p14="http://schemas.microsoft.com/office/powerpoint/2010/main" spd="slow" p14:dur="1250" advClick="0">
         <p159:morph option="byObject"/>
       </p:transition>
     </mc:Choice>
@@ -3995,14 +4758,14 @@
           <p:nvPr/>
         </p:nvPicPr>
         <p:blipFill>
-          <a:blip r:embed="rId2"/>
+          <a:blip r:embed="rId3"/>
           <a:stretch>
             <a:fillRect/>
           </a:stretch>
         </p:blipFill>
         <p:spPr>
           <a:xfrm>
-            <a:off x="3130151" y="1506122"/>
+            <a:off x="3214800" y="1504800"/>
             <a:ext cx="5760000" cy="4320000"/>
           </a:xfrm>
           <a:prstGeom prst="rect">
@@ -4111,13 +4874,13 @@
   <p:clrMapOvr>
     <a:masterClrMapping/>
   </p:clrMapOvr>
-  <mc:AlternateContent xmlns:mc="http://schemas.openxmlformats.org/markup-compatibility/2006">
-    <mc:Choice xmlns:p159="http://schemas.microsoft.com/office/powerpoint/2015/09/main" Requires="p159">
+  <mc:AlternateContent xmlns:mc="http://schemas.openxmlformats.org/markup-compatibility/2006" xmlns:p159="http://schemas.microsoft.com/office/powerpoint/2015/09/main">
+    <mc:Choice Requires="p159">
       <p:transition spd="slow" advClick="0">
         <p159:morph option="byObject"/>
       </p:transition>
     </mc:Choice>
-    <mc:Fallback>
+    <mc:Fallback xmlns="">
       <p:transition spd="slow" advClick="0">
         <p:fade/>
       </p:transition>
@@ -4134,7 +4897,7 @@
         <p:cNvPr id="1" name="">
           <a:extLst>
             <a:ext uri="{FF2B5EF4-FFF2-40B4-BE49-F238E27FC236}">
-              <a16:creationId xmlns:a16="http://schemas.microsoft.com/office/drawing/2014/main" id="{8FED7CB6-5E14-0005-F926-8DAFC98DC239}"/>
+              <a16:creationId xmlns:a16="http://schemas.microsoft.com/office/drawing/2014/main" id="{30A956F6-4ABD-DA16-99DD-1856D6C8110B}"/>
             </a:ext>
           </a:extLst>
         </p:cNvPr>
@@ -4154,7 +4917,7 @@
           <p:cNvPr id="4" name="Retângulo Arredondado 3">
             <a:extLst>
               <a:ext uri="{FF2B5EF4-FFF2-40B4-BE49-F238E27FC236}">
-                <a16:creationId xmlns:a16="http://schemas.microsoft.com/office/drawing/2014/main" id="{FF157ED4-2208-3509-674C-6D8E0FEA05CC}"/>
+                <a16:creationId xmlns:a16="http://schemas.microsoft.com/office/drawing/2014/main" id="{BBBEBD48-4098-5D6C-A872-A78A256B4EEE}"/>
               </a:ext>
             </a:extLst>
           </p:cNvPr>
@@ -4204,7 +4967,7 @@
           <p:cNvPr id="2" name="Título 1">
             <a:extLst>
               <a:ext uri="{FF2B5EF4-FFF2-40B4-BE49-F238E27FC236}">
-                <a16:creationId xmlns:a16="http://schemas.microsoft.com/office/drawing/2014/main" id="{B2980D83-5B00-5747-33BE-3246F77926F0}"/>
+                <a16:creationId xmlns:a16="http://schemas.microsoft.com/office/drawing/2014/main" id="{F4CCE292-ED03-4181-74BF-001CB18E842E}"/>
               </a:ext>
             </a:extLst>
           </p:cNvPr>
@@ -4244,7 +5007,7 @@
           <p:cNvPr id="7" name="Imagem 6" descr="Uma imagem contendo Texto&#10;&#10;Descrição gerada automaticamente">
             <a:extLst>
               <a:ext uri="{FF2B5EF4-FFF2-40B4-BE49-F238E27FC236}">
-                <a16:creationId xmlns:a16="http://schemas.microsoft.com/office/drawing/2014/main" id="{D2ABF249-EBB5-4745-E1B0-FF4D0C8FAEB4}"/>
+                <a16:creationId xmlns:a16="http://schemas.microsoft.com/office/drawing/2014/main" id="{A6FF2200-4CFC-0C98-0C56-6E3908630DC9}"/>
               </a:ext>
             </a:extLst>
           </p:cNvPr>
@@ -4254,14 +5017,14 @@
           <p:nvPr/>
         </p:nvPicPr>
         <p:blipFill>
-          <a:blip r:embed="rId2"/>
+          <a:blip r:embed="rId3"/>
           <a:stretch>
             <a:fillRect/>
           </a:stretch>
         </p:blipFill>
         <p:spPr>
           <a:xfrm>
-            <a:off x="2916618" y="1506122"/>
+            <a:off x="3214800" y="1506122"/>
             <a:ext cx="5760001" cy="4320000"/>
           </a:xfrm>
           <a:prstGeom prst="rect">
@@ -4274,7 +5037,7 @@
           <p:cNvPr id="3" name="CaixaDeTexto 2">
             <a:extLst>
               <a:ext uri="{FF2B5EF4-FFF2-40B4-BE49-F238E27FC236}">
-                <a16:creationId xmlns:a16="http://schemas.microsoft.com/office/drawing/2014/main" id="{138B790E-F51D-F333-9F19-2FAA8DFD446A}"/>
+                <a16:creationId xmlns:a16="http://schemas.microsoft.com/office/drawing/2014/main" id="{A504668D-5F20-EFE3-CE78-1A4415C78DE5}"/>
               </a:ext>
             </a:extLst>
           </p:cNvPr>
@@ -4283,7 +5046,7 @@
         </p:nvSpPr>
         <p:spPr>
           <a:xfrm>
-            <a:off x="959018" y="475106"/>
+            <a:off x="993600" y="486000"/>
             <a:ext cx="5136982" cy="461665"/>
           </a:xfrm>
           <a:prstGeom prst="rect">
@@ -4339,7 +5102,658 @@
     </p:spTree>
     <p:extLst>
       <p:ext uri="{BB962C8B-B14F-4D97-AF65-F5344CB8AC3E}">
-        <p14:creationId xmlns:p14="http://schemas.microsoft.com/office/powerpoint/2010/main" val="1361207640"/>
+        <p14:creationId xmlns:p14="http://schemas.microsoft.com/office/powerpoint/2010/main" val="2268720725"/>
+      </p:ext>
+    </p:extLst>
+  </p:cSld>
+  <p:clrMapOvr>
+    <a:masterClrMapping/>
+  </p:clrMapOvr>
+  <mc:AlternateContent xmlns:mc="http://schemas.openxmlformats.org/markup-compatibility/2006">
+    <mc:Choice xmlns:p159="http://schemas.microsoft.com/office/powerpoint/2015/09/main" Requires="p159">
+      <p:transition spd="slow">
+        <p159:morph option="byObject"/>
+      </p:transition>
+    </mc:Choice>
+    <mc:Fallback>
+      <p:transition spd="slow">
+        <p:fade/>
+      </p:transition>
+    </mc:Fallback>
+  </mc:AlternateContent>
+</p:sld>
+</file>
+
+<file path=ppt/slides/slide13.xml><?xml version="1.0" encoding="utf-8"?>
+<p:sld xmlns:a="http://schemas.openxmlformats.org/drawingml/2006/main" xmlns:r="http://schemas.openxmlformats.org/officeDocument/2006/relationships" xmlns:p="http://schemas.openxmlformats.org/presentationml/2006/main">
+  <p:cSld>
+    <p:spTree>
+      <p:nvGrpSpPr>
+        <p:cNvPr id="1" name="">
+          <a:extLst>
+            <a:ext uri="{FF2B5EF4-FFF2-40B4-BE49-F238E27FC236}">
+              <a16:creationId xmlns:a16="http://schemas.microsoft.com/office/drawing/2014/main" id="{B2B3077B-899C-62C2-E802-0E9128BFBA12}"/>
+            </a:ext>
+          </a:extLst>
+        </p:cNvPr>
+        <p:cNvGrpSpPr/>
+        <p:nvPr/>
+      </p:nvGrpSpPr>
+      <p:grpSpPr>
+        <a:xfrm>
+          <a:off x="0" y="0"/>
+          <a:ext cx="0" cy="0"/>
+          <a:chOff x="0" y="0"/>
+          <a:chExt cx="0" cy="0"/>
+        </a:xfrm>
+      </p:grpSpPr>
+      <p:sp>
+        <p:nvSpPr>
+          <p:cNvPr id="4" name="Retângulo Arredondado 3">
+            <a:extLst>
+              <a:ext uri="{FF2B5EF4-FFF2-40B4-BE49-F238E27FC236}">
+                <a16:creationId xmlns:a16="http://schemas.microsoft.com/office/drawing/2014/main" id="{141F2FD3-E820-E12B-3E59-84955905E282}"/>
+              </a:ext>
+            </a:extLst>
+          </p:cNvPr>
+          <p:cNvSpPr/>
+          <p:nvPr/>
+        </p:nvSpPr>
+        <p:spPr>
+          <a:xfrm>
+            <a:off x="11332028" y="-234043"/>
+            <a:ext cx="859972" cy="7326086"/>
+          </a:xfrm>
+          <a:prstGeom prst="roundRect">
+            <a:avLst/>
+          </a:prstGeom>
+          <a:solidFill>
+            <a:schemeClr val="bg1"/>
+          </a:solidFill>
+          <a:ln>
+            <a:noFill/>
+          </a:ln>
+        </p:spPr>
+        <p:style>
+          <a:lnRef idx="0">
+            <a:scrgbClr r="0" g="0" b="0"/>
+          </a:lnRef>
+          <a:fillRef idx="0">
+            <a:scrgbClr r="0" g="0" b="0"/>
+          </a:fillRef>
+          <a:effectRef idx="0">
+            <a:scrgbClr r="0" g="0" b="0"/>
+          </a:effectRef>
+          <a:fontRef idx="minor">
+            <a:schemeClr val="lt1"/>
+          </a:fontRef>
+        </p:style>
+        <p:txBody>
+          <a:bodyPr rtlCol="0" anchor="ctr"/>
+          <a:lstStyle/>
+          <a:p>
+            <a:pPr algn="ctr"/>
+            <a:endParaRPr lang="pt-BR" dirty="0"/>
+          </a:p>
+        </p:txBody>
+      </p:sp>
+      <p:sp>
+        <p:nvSpPr>
+          <p:cNvPr id="2" name="Título 1">
+            <a:extLst>
+              <a:ext uri="{FF2B5EF4-FFF2-40B4-BE49-F238E27FC236}">
+                <a16:creationId xmlns:a16="http://schemas.microsoft.com/office/drawing/2014/main" id="{D158488B-46DE-D51C-B6E4-57E3F3A22C23}"/>
+              </a:ext>
+            </a:extLst>
+          </p:cNvPr>
+          <p:cNvSpPr>
+            <a:spLocks noGrp="1"/>
+          </p:cNvSpPr>
+          <p:nvPr>
+            <p:ph type="ctrTitle"/>
+          </p:nvPr>
+        </p:nvSpPr>
+        <p:spPr>
+          <a:xfrm rot="16200000">
+            <a:off x="10501539" y="3412122"/>
+            <a:ext cx="2520950" cy="508000"/>
+          </a:xfrm>
+        </p:spPr>
+        <p:txBody>
+          <a:bodyPr>
+            <a:normAutofit fontScale="90000"/>
+          </a:bodyPr>
+          <a:lstStyle/>
+          <a:p>
+            <a:r>
+              <a:rPr lang="pt-BR" sz="3200" dirty="0" err="1">
+                <a:latin typeface="Uber Move" panose="02010803030201060303" pitchFamily="50" charset="0"/>
+              </a:rPr>
+              <a:t>Assumptions</a:t>
+            </a:r>
+            <a:endParaRPr lang="pt-BR" sz="3200" b="1" dirty="0">
+              <a:latin typeface="Uber Move" panose="02010803030201060303" pitchFamily="50" charset="0"/>
+            </a:endParaRPr>
+          </a:p>
+        </p:txBody>
+      </p:sp>
+      <p:sp>
+        <p:nvSpPr>
+          <p:cNvPr id="3" name="CaixaDeTexto 2">
+            <a:extLst>
+              <a:ext uri="{FF2B5EF4-FFF2-40B4-BE49-F238E27FC236}">
+                <a16:creationId xmlns:a16="http://schemas.microsoft.com/office/drawing/2014/main" id="{B7CDCF08-E2ED-0BAE-6743-FF6CCDA69F8A}"/>
+              </a:ext>
+            </a:extLst>
+          </p:cNvPr>
+          <p:cNvSpPr txBox="1"/>
+          <p:nvPr/>
+        </p:nvSpPr>
+        <p:spPr>
+          <a:xfrm>
+            <a:off x="993600" y="486000"/>
+            <a:ext cx="5136982" cy="461665"/>
+          </a:xfrm>
+          <a:prstGeom prst="rect">
+            <a:avLst/>
+          </a:prstGeom>
+          <a:noFill/>
+        </p:spPr>
+        <p:txBody>
+          <a:bodyPr wrap="square" rtlCol="0">
+            <a:spAutoFit/>
+          </a:bodyPr>
+          <a:lstStyle/>
+          <a:p>
+            <a:r>
+              <a:rPr lang="pt-BR" sz="2400" dirty="0">
+                <a:solidFill>
+                  <a:schemeClr val="bg1"/>
+                </a:solidFill>
+                <a:latin typeface="Uber Move" panose="02010803030201060303" pitchFamily="50" charset="0"/>
+              </a:rPr>
+              <a:t>Weather </a:t>
+            </a:r>
+            <a:r>
+              <a:rPr lang="pt-BR" sz="2400" dirty="0" err="1">
+                <a:solidFill>
+                  <a:schemeClr val="bg1"/>
+                </a:solidFill>
+                <a:latin typeface="Uber Move" panose="02010803030201060303" pitchFamily="50" charset="0"/>
+              </a:rPr>
+              <a:t>conditions</a:t>
+            </a:r>
+            <a:endParaRPr lang="pt-BR" sz="2400" dirty="0">
+              <a:solidFill>
+                <a:schemeClr val="bg1"/>
+              </a:solidFill>
+              <a:latin typeface="Uber Move" panose="02010803030201060303" pitchFamily="50" charset="0"/>
+            </a:endParaRPr>
+          </a:p>
+        </p:txBody>
+      </p:sp>
+      <p:pic>
+        <p:nvPicPr>
+          <p:cNvPr id="5" name="Imagem 4" descr="Gráfico&#10;&#10;Descrição gerada automaticamente">
+            <a:extLst>
+              <a:ext uri="{FF2B5EF4-FFF2-40B4-BE49-F238E27FC236}">
+                <a16:creationId xmlns:a16="http://schemas.microsoft.com/office/drawing/2014/main" id="{97EFBF73-7EBA-2633-0C7F-2CA390CE5728}"/>
+              </a:ext>
+            </a:extLst>
+          </p:cNvPr>
+          <p:cNvPicPr>
+            <a:picLocks noChangeAspect="1"/>
+          </p:cNvPicPr>
+          <p:nvPr/>
+        </p:nvPicPr>
+        <p:blipFill>
+          <a:blip r:embed="rId3"/>
+          <a:srcRect t="12102" b="6913"/>
+          <a:stretch/>
+        </p:blipFill>
+        <p:spPr>
+          <a:xfrm>
+            <a:off x="3214800" y="2027582"/>
+            <a:ext cx="6388108" cy="3498575"/>
+          </a:xfrm>
+          <a:prstGeom prst="rect">
+            <a:avLst/>
+          </a:prstGeom>
+        </p:spPr>
+      </p:pic>
+    </p:spTree>
+    <p:extLst>
+      <p:ext uri="{BB962C8B-B14F-4D97-AF65-F5344CB8AC3E}">
+        <p14:creationId xmlns:p14="http://schemas.microsoft.com/office/powerpoint/2010/main" val="1722577494"/>
+      </p:ext>
+    </p:extLst>
+  </p:cSld>
+  <p:clrMapOvr>
+    <a:masterClrMapping/>
+  </p:clrMapOvr>
+  <mc:AlternateContent xmlns:mc="http://schemas.openxmlformats.org/markup-compatibility/2006">
+    <mc:Choice xmlns:p159="http://schemas.microsoft.com/office/powerpoint/2015/09/main" Requires="p159">
+      <p:transition spd="slow">
+        <p159:morph option="byObject"/>
+      </p:transition>
+    </mc:Choice>
+    <mc:Fallback>
+      <p:transition spd="slow">
+        <p:fade/>
+      </p:transition>
+    </mc:Fallback>
+  </mc:AlternateContent>
+</p:sld>
+</file>
+
+<file path=ppt/slides/slide14.xml><?xml version="1.0" encoding="utf-8"?>
+<p:sld xmlns:a="http://schemas.openxmlformats.org/drawingml/2006/main" xmlns:r="http://schemas.openxmlformats.org/officeDocument/2006/relationships" xmlns:p="http://schemas.openxmlformats.org/presentationml/2006/main">
+  <p:cSld>
+    <p:spTree>
+      <p:nvGrpSpPr>
+        <p:cNvPr id="1" name="">
+          <a:extLst>
+            <a:ext uri="{FF2B5EF4-FFF2-40B4-BE49-F238E27FC236}">
+              <a16:creationId xmlns:a16="http://schemas.microsoft.com/office/drawing/2014/main" id="{5084FC10-66CE-D01F-3807-B7BA427E061C}"/>
+            </a:ext>
+          </a:extLst>
+        </p:cNvPr>
+        <p:cNvGrpSpPr/>
+        <p:nvPr/>
+      </p:nvGrpSpPr>
+      <p:grpSpPr>
+        <a:xfrm>
+          <a:off x="0" y="0"/>
+          <a:ext cx="0" cy="0"/>
+          <a:chOff x="0" y="0"/>
+          <a:chExt cx="0" cy="0"/>
+        </a:xfrm>
+      </p:grpSpPr>
+      <p:sp>
+        <p:nvSpPr>
+          <p:cNvPr id="2" name="Título 1">
+            <a:extLst>
+              <a:ext uri="{FF2B5EF4-FFF2-40B4-BE49-F238E27FC236}">
+                <a16:creationId xmlns:a16="http://schemas.microsoft.com/office/drawing/2014/main" id="{51F560C9-6BCC-E18A-2BD2-2111B976035A}"/>
+              </a:ext>
+            </a:extLst>
+          </p:cNvPr>
+          <p:cNvSpPr>
+            <a:spLocks noGrp="1"/>
+          </p:cNvSpPr>
+          <p:nvPr>
+            <p:ph type="ctrTitle"/>
+          </p:nvPr>
+        </p:nvSpPr>
+        <p:spPr>
+          <a:xfrm>
+            <a:off x="2508250" y="1172296"/>
+            <a:ext cx="7175500" cy="957263"/>
+          </a:xfrm>
+        </p:spPr>
+        <p:txBody>
+          <a:bodyPr>
+            <a:normAutofit/>
+          </a:bodyPr>
+          <a:lstStyle/>
+          <a:p>
+            <a:r>
+              <a:rPr lang="pt-BR" dirty="0">
+                <a:solidFill>
+                  <a:schemeClr val="bg1"/>
+                </a:solidFill>
+                <a:latin typeface="Uber Move" panose="02010803030201060303" pitchFamily="50" charset="0"/>
+              </a:rPr>
+              <a:t>Final Model</a:t>
+            </a:r>
+            <a:endParaRPr lang="pt-BR" b="1" dirty="0">
+              <a:solidFill>
+                <a:schemeClr val="bg1"/>
+              </a:solidFill>
+              <a:latin typeface="Uber Move" panose="02010803030201060303" pitchFamily="50" charset="0"/>
+            </a:endParaRPr>
+          </a:p>
+        </p:txBody>
+      </p:sp>
+      <p:sp>
+        <p:nvSpPr>
+          <p:cNvPr id="3" name="Subtítulo 2">
+            <a:extLst>
+              <a:ext uri="{FF2B5EF4-FFF2-40B4-BE49-F238E27FC236}">
+                <a16:creationId xmlns:a16="http://schemas.microsoft.com/office/drawing/2014/main" id="{4474E861-2110-9B24-46E6-4ACD7D47775A}"/>
+              </a:ext>
+            </a:extLst>
+          </p:cNvPr>
+          <p:cNvSpPr>
+            <a:spLocks noGrp="1"/>
+          </p:cNvSpPr>
+          <p:nvPr>
+            <p:ph type="subTitle" idx="1"/>
+          </p:nvPr>
+        </p:nvSpPr>
+        <p:spPr>
+          <a:xfrm>
+            <a:off x="1047750" y="2735263"/>
+            <a:ext cx="9372600" cy="1655762"/>
+          </a:xfrm>
+        </p:spPr>
+        <p:txBody>
+          <a:bodyPr>
+            <a:normAutofit/>
+          </a:bodyPr>
+          <a:lstStyle/>
+          <a:p>
+            <a:r>
+              <a:rPr lang="en-US" dirty="0">
+                <a:solidFill>
+                  <a:srgbClr val="FFFFFF"/>
+                </a:solidFill>
+                <a:latin typeface="Uber Move Medium" panose="02010603030201060303" pitchFamily="50" charset="0"/>
+              </a:rPr>
+              <a:t>- In order to build a statistical model capable of predicting the duration of a trip, some adjustments need to be made, including data cleaning and adding new columns.</a:t>
+            </a:r>
+          </a:p>
+        </p:txBody>
+      </p:sp>
+      <p:sp>
+        <p:nvSpPr>
+          <p:cNvPr id="4" name="Retângulo Arredondado 3">
+            <a:extLst>
+              <a:ext uri="{FF2B5EF4-FFF2-40B4-BE49-F238E27FC236}">
+                <a16:creationId xmlns:a16="http://schemas.microsoft.com/office/drawing/2014/main" id="{B32A9A85-B944-5BA6-BE5B-B00240F8980C}"/>
+              </a:ext>
+            </a:extLst>
+          </p:cNvPr>
+          <p:cNvSpPr/>
+          <p:nvPr/>
+        </p:nvSpPr>
+        <p:spPr>
+          <a:xfrm>
+            <a:off x="11332028" y="-234043"/>
+            <a:ext cx="859972" cy="7326086"/>
+          </a:xfrm>
+          <a:prstGeom prst="roundRect">
+            <a:avLst/>
+          </a:prstGeom>
+          <a:solidFill>
+            <a:schemeClr val="bg1"/>
+          </a:solidFill>
+          <a:ln>
+            <a:noFill/>
+          </a:ln>
+        </p:spPr>
+        <p:style>
+          <a:lnRef idx="0">
+            <a:scrgbClr r="0" g="0" b="0"/>
+          </a:lnRef>
+          <a:fillRef idx="0">
+            <a:scrgbClr r="0" g="0" b="0"/>
+          </a:fillRef>
+          <a:effectRef idx="0">
+            <a:scrgbClr r="0" g="0" b="0"/>
+          </a:effectRef>
+          <a:fontRef idx="minor">
+            <a:schemeClr val="lt1"/>
+          </a:fontRef>
+        </p:style>
+        <p:txBody>
+          <a:bodyPr rtlCol="0" anchor="ctr"/>
+          <a:lstStyle/>
+          <a:p>
+            <a:pPr algn="ctr"/>
+            <a:endParaRPr lang="pt-BR"/>
+          </a:p>
+        </p:txBody>
+      </p:sp>
+    </p:spTree>
+    <p:extLst>
+      <p:ext uri="{BB962C8B-B14F-4D97-AF65-F5344CB8AC3E}">
+        <p14:creationId xmlns:p14="http://schemas.microsoft.com/office/powerpoint/2010/main" val="285479564"/>
+      </p:ext>
+    </p:extLst>
+  </p:cSld>
+  <p:clrMapOvr>
+    <a:masterClrMapping/>
+  </p:clrMapOvr>
+</p:sld>
+</file>
+
+<file path=ppt/slides/slide15.xml><?xml version="1.0" encoding="utf-8"?>
+<p:sld xmlns:a="http://schemas.openxmlformats.org/drawingml/2006/main" xmlns:r="http://schemas.openxmlformats.org/officeDocument/2006/relationships" xmlns:p="http://schemas.openxmlformats.org/presentationml/2006/main">
+  <p:cSld>
+    <p:spTree>
+      <p:nvGrpSpPr>
+        <p:cNvPr id="1" name="">
+          <a:extLst>
+            <a:ext uri="{FF2B5EF4-FFF2-40B4-BE49-F238E27FC236}">
+              <a16:creationId xmlns:a16="http://schemas.microsoft.com/office/drawing/2014/main" id="{DFC80AB3-7069-91B7-11FA-1E7A858D61A6}"/>
+            </a:ext>
+          </a:extLst>
+        </p:cNvPr>
+        <p:cNvGrpSpPr/>
+        <p:nvPr/>
+      </p:nvGrpSpPr>
+      <p:grpSpPr>
+        <a:xfrm>
+          <a:off x="0" y="0"/>
+          <a:ext cx="0" cy="0"/>
+          <a:chOff x="0" y="0"/>
+          <a:chExt cx="0" cy="0"/>
+        </a:xfrm>
+      </p:grpSpPr>
+      <p:sp>
+        <p:nvSpPr>
+          <p:cNvPr id="4" name="Retângulo Arredondado 3">
+            <a:extLst>
+              <a:ext uri="{FF2B5EF4-FFF2-40B4-BE49-F238E27FC236}">
+                <a16:creationId xmlns:a16="http://schemas.microsoft.com/office/drawing/2014/main" id="{0B3BADA3-DA0C-25B4-B270-70D08730CC85}"/>
+              </a:ext>
+            </a:extLst>
+          </p:cNvPr>
+          <p:cNvSpPr/>
+          <p:nvPr/>
+        </p:nvSpPr>
+        <p:spPr>
+          <a:xfrm>
+            <a:off x="11332028" y="-234043"/>
+            <a:ext cx="859972" cy="7326086"/>
+          </a:xfrm>
+          <a:prstGeom prst="roundRect">
+            <a:avLst/>
+          </a:prstGeom>
+          <a:solidFill>
+            <a:schemeClr val="bg1"/>
+          </a:solidFill>
+          <a:ln>
+            <a:noFill/>
+          </a:ln>
+        </p:spPr>
+        <p:style>
+          <a:lnRef idx="0">
+            <a:scrgbClr r="0" g="0" b="0"/>
+          </a:lnRef>
+          <a:fillRef idx="0">
+            <a:scrgbClr r="0" g="0" b="0"/>
+          </a:fillRef>
+          <a:effectRef idx="0">
+            <a:scrgbClr r="0" g="0" b="0"/>
+          </a:effectRef>
+          <a:fontRef idx="minor">
+            <a:schemeClr val="lt1"/>
+          </a:fontRef>
+        </p:style>
+        <p:txBody>
+          <a:bodyPr rtlCol="0" anchor="ctr"/>
+          <a:lstStyle/>
+          <a:p>
+            <a:pPr algn="ctr"/>
+            <a:endParaRPr lang="pt-BR" dirty="0"/>
+          </a:p>
+        </p:txBody>
+      </p:sp>
+      <p:sp>
+        <p:nvSpPr>
+          <p:cNvPr id="2" name="Título 1">
+            <a:extLst>
+              <a:ext uri="{FF2B5EF4-FFF2-40B4-BE49-F238E27FC236}">
+                <a16:creationId xmlns:a16="http://schemas.microsoft.com/office/drawing/2014/main" id="{DC518D6F-A929-A754-6A48-A32F3B895A4C}"/>
+              </a:ext>
+            </a:extLst>
+          </p:cNvPr>
+          <p:cNvSpPr>
+            <a:spLocks noGrp="1"/>
+          </p:cNvSpPr>
+          <p:nvPr>
+            <p:ph type="ctrTitle"/>
+          </p:nvPr>
+        </p:nvSpPr>
+        <p:spPr>
+          <a:xfrm rot="16200000">
+            <a:off x="10501539" y="3412122"/>
+            <a:ext cx="2520950" cy="508000"/>
+          </a:xfrm>
+        </p:spPr>
+        <p:txBody>
+          <a:bodyPr>
+            <a:normAutofit fontScale="90000"/>
+          </a:bodyPr>
+          <a:lstStyle/>
+          <a:p>
+            <a:r>
+              <a:rPr lang="pt-BR" sz="3200" dirty="0" err="1">
+                <a:latin typeface="Uber Move" panose="02010803030201060303" pitchFamily="50" charset="0"/>
+              </a:rPr>
+              <a:t>Assumptions</a:t>
+            </a:r>
+            <a:endParaRPr lang="pt-BR" sz="3200" b="1" dirty="0">
+              <a:latin typeface="Uber Move" panose="02010803030201060303" pitchFamily="50" charset="0"/>
+            </a:endParaRPr>
+          </a:p>
+        </p:txBody>
+      </p:sp>
+      <p:sp>
+        <p:nvSpPr>
+          <p:cNvPr id="3" name="CaixaDeTexto 2">
+            <a:extLst>
+              <a:ext uri="{FF2B5EF4-FFF2-40B4-BE49-F238E27FC236}">
+                <a16:creationId xmlns:a16="http://schemas.microsoft.com/office/drawing/2014/main" id="{8E17E89E-895C-5931-89A6-1F954FAD8CAD}"/>
+              </a:ext>
+            </a:extLst>
+          </p:cNvPr>
+          <p:cNvSpPr txBox="1"/>
+          <p:nvPr/>
+        </p:nvSpPr>
+        <p:spPr>
+          <a:xfrm>
+            <a:off x="993600" y="486000"/>
+            <a:ext cx="5136982" cy="461665"/>
+          </a:xfrm>
+          <a:prstGeom prst="rect">
+            <a:avLst/>
+          </a:prstGeom>
+          <a:noFill/>
+        </p:spPr>
+        <p:txBody>
+          <a:bodyPr wrap="square" rtlCol="0">
+            <a:spAutoFit/>
+          </a:bodyPr>
+          <a:lstStyle/>
+          <a:p>
+            <a:r>
+              <a:rPr lang="pt-BR" sz="2400" dirty="0" err="1">
+                <a:solidFill>
+                  <a:schemeClr val="bg1"/>
+                </a:solidFill>
+                <a:latin typeface="Uber Move" panose="02010803030201060303" pitchFamily="50" charset="0"/>
+              </a:rPr>
+              <a:t>Importance</a:t>
+            </a:r>
+            <a:r>
+              <a:rPr lang="pt-BR" sz="2400" dirty="0">
+                <a:solidFill>
+                  <a:schemeClr val="bg1"/>
+                </a:solidFill>
+                <a:latin typeface="Uber Move" panose="02010803030201060303" pitchFamily="50" charset="0"/>
+              </a:rPr>
+              <a:t> for </a:t>
+            </a:r>
+            <a:r>
+              <a:rPr lang="pt-BR" sz="2400" dirty="0" err="1">
+                <a:solidFill>
+                  <a:schemeClr val="bg1"/>
+                </a:solidFill>
+                <a:latin typeface="Uber Move" panose="02010803030201060303" pitchFamily="50" charset="0"/>
+              </a:rPr>
+              <a:t>each</a:t>
+            </a:r>
+            <a:r>
+              <a:rPr lang="pt-BR" sz="2400" dirty="0">
+                <a:solidFill>
+                  <a:schemeClr val="bg1"/>
+                </a:solidFill>
+                <a:latin typeface="Uber Move" panose="02010803030201060303" pitchFamily="50" charset="0"/>
+              </a:rPr>
+              <a:t> feature</a:t>
+            </a:r>
+          </a:p>
+        </p:txBody>
+      </p:sp>
+      <p:sp>
+        <p:nvSpPr>
+          <p:cNvPr id="5" name="CaixaDeTexto 4">
+            <a:extLst>
+              <a:ext uri="{FF2B5EF4-FFF2-40B4-BE49-F238E27FC236}">
+                <a16:creationId xmlns:a16="http://schemas.microsoft.com/office/drawing/2014/main" id="{5AAA1790-C443-A822-205F-825B10A9AD80}"/>
+              </a:ext>
+            </a:extLst>
+          </p:cNvPr>
+          <p:cNvSpPr txBox="1"/>
+          <p:nvPr/>
+        </p:nvSpPr>
+        <p:spPr>
+          <a:xfrm>
+            <a:off x="4286250" y="2114550"/>
+            <a:ext cx="4217670" cy="646331"/>
+          </a:xfrm>
+          <a:prstGeom prst="rect">
+            <a:avLst/>
+          </a:prstGeom>
+          <a:noFill/>
+        </p:spPr>
+        <p:txBody>
+          <a:bodyPr wrap="square" rtlCol="0">
+            <a:spAutoFit/>
+          </a:bodyPr>
+          <a:lstStyle/>
+          <a:p>
+            <a:r>
+              <a:rPr lang="pt-BR" dirty="0">
+                <a:solidFill>
+                  <a:schemeClr val="bg1"/>
+                </a:solidFill>
+              </a:rPr>
+              <a:t>Tempo que mostra para o usuário esta em minutos cheios então o </a:t>
+            </a:r>
+            <a:r>
+              <a:rPr lang="pt-BR" dirty="0" err="1">
+                <a:solidFill>
+                  <a:schemeClr val="bg1"/>
+                </a:solidFill>
+              </a:rPr>
+              <a:t>mod</a:t>
+            </a:r>
+            <a:endParaRPr lang="pt-BR" dirty="0">
+              <a:solidFill>
+                <a:schemeClr val="bg1"/>
+              </a:solidFill>
+            </a:endParaRPr>
+          </a:p>
+        </p:txBody>
+      </p:sp>
+    </p:spTree>
+    <p:extLst>
+      <p:ext uri="{BB962C8B-B14F-4D97-AF65-F5344CB8AC3E}">
+        <p14:creationId xmlns:p14="http://schemas.microsoft.com/office/powerpoint/2010/main" val="2110813009"/>
       </p:ext>
     </p:extLst>
   </p:cSld>
@@ -4479,6 +5893,7 @@
                 <a:solidFill>
                   <a:srgbClr val="FFFFFF"/>
                 </a:solidFill>
+                <a:latin typeface="Uber Move Medium" panose="02010603030201060303" pitchFamily="50" charset="0"/>
               </a:rPr>
               <a:t>- The main goal of this case study is to build a model to predict the duration of Uber rides in São Paulo, Brazil from November 2022 to March 2023.</a:t>
             </a:r>
@@ -4489,6 +5904,7 @@
                 <a:solidFill>
                   <a:srgbClr val="FFFFFF"/>
                 </a:solidFill>
+                <a:latin typeface="Uber Move Medium" panose="02010603030201060303" pitchFamily="50" charset="0"/>
               </a:rPr>
               <a:t>- The dataset consists of 2.1 million ride observations: 1.5 million training data and 600k test observations.</a:t>
             </a:r>
@@ -4499,6 +5915,7 @@
                 <a:solidFill>
                   <a:srgbClr val="FFFFFF"/>
                 </a:solidFill>
+                <a:latin typeface="Uber Move Medium" panose="02010603030201060303" pitchFamily="50" charset="0"/>
               </a:rPr>
               <a:t>- The model aims to provide accurate predictions based on various features such as time, distance, and traffic conditions.</a:t>
             </a:r>
@@ -4668,6 +6085,7 @@
                 <a:solidFill>
                   <a:srgbClr val="FFFFFF"/>
                 </a:solidFill>
+                <a:latin typeface="Uber Move Medium" panose="02010603030201060303" pitchFamily="50" charset="0"/>
               </a:rPr>
               <a:t>- In order to build a statistical model capable of predicting the duration of a trip, some adjustments need to be made, including data cleaning and adding new columns.</a:t>
             </a:r>
@@ -4880,12 +6298,103 @@
           </a:prstGeom>
         </p:spPr>
       </p:pic>
+      <p:sp>
+        <p:nvSpPr>
+          <p:cNvPr id="12" name="CaixaDeTexto 11">
+            <a:extLst>
+              <a:ext uri="{FF2B5EF4-FFF2-40B4-BE49-F238E27FC236}">
+                <a16:creationId xmlns:a16="http://schemas.microsoft.com/office/drawing/2014/main" id="{DE7B19A6-F720-5C67-9DF0-36912173E853}"/>
+              </a:ext>
+            </a:extLst>
+          </p:cNvPr>
+          <p:cNvSpPr txBox="1"/>
+          <p:nvPr/>
+        </p:nvSpPr>
+        <p:spPr>
+          <a:xfrm>
+            <a:off x="994846" y="485279"/>
+            <a:ext cx="5015305" cy="461665"/>
+          </a:xfrm>
+          <a:prstGeom prst="rect">
+            <a:avLst/>
+          </a:prstGeom>
+          <a:noFill/>
+        </p:spPr>
+        <p:txBody>
+          <a:bodyPr wrap="square" rtlCol="0">
+            <a:spAutoFit/>
+          </a:bodyPr>
+          <a:lstStyle/>
+          <a:p>
+            <a:r>
+              <a:rPr lang="pt-BR" sz="2400" dirty="0">
+                <a:solidFill>
+                  <a:schemeClr val="bg1"/>
+                </a:solidFill>
+                <a:latin typeface="Uber Move" panose="02010803030201060303" pitchFamily="50" charset="0"/>
+              </a:rPr>
+              <a:t>Data </a:t>
+            </a:r>
+            <a:r>
+              <a:rPr lang="pt-BR" sz="2400" dirty="0" err="1">
+                <a:solidFill>
+                  <a:schemeClr val="bg1"/>
+                </a:solidFill>
+                <a:latin typeface="Uber Move" panose="02010803030201060303" pitchFamily="50" charset="0"/>
+              </a:rPr>
+              <a:t>analysis</a:t>
+            </a:r>
+            <a:r>
+              <a:rPr lang="pt-BR" sz="2400" dirty="0">
+                <a:solidFill>
+                  <a:schemeClr val="bg1"/>
+                </a:solidFill>
+                <a:latin typeface="Uber Move" panose="02010803030201060303" pitchFamily="50" charset="0"/>
+              </a:rPr>
+              <a:t> for </a:t>
+            </a:r>
+            <a:r>
+              <a:rPr lang="pt-BR" sz="2400" dirty="0" err="1">
+                <a:solidFill>
+                  <a:schemeClr val="bg1"/>
+                </a:solidFill>
+                <a:latin typeface="Uber Move" panose="02010803030201060303" pitchFamily="50" charset="0"/>
+              </a:rPr>
+              <a:t>datetime</a:t>
+            </a:r>
+            <a:r>
+              <a:rPr lang="pt-BR" sz="2400" dirty="0">
+                <a:solidFill>
+                  <a:schemeClr val="bg1"/>
+                </a:solidFill>
+                <a:latin typeface="Uber Move" panose="02010803030201060303" pitchFamily="50" charset="0"/>
+              </a:rPr>
+              <a:t> </a:t>
+            </a:r>
+            <a:r>
+              <a:rPr lang="pt-BR" sz="2400" dirty="0" err="1">
+                <a:solidFill>
+                  <a:schemeClr val="bg1"/>
+                </a:solidFill>
+                <a:latin typeface="Uber Move" panose="02010803030201060303" pitchFamily="50" charset="0"/>
+              </a:rPr>
+              <a:t>pickup</a:t>
+            </a:r>
+            <a:endParaRPr lang="pt-BR" sz="2400" dirty="0">
+              <a:solidFill>
+                <a:schemeClr val="bg1"/>
+              </a:solidFill>
+              <a:latin typeface="Uber Move" panose="02010803030201060303" pitchFamily="50" charset="0"/>
+            </a:endParaRPr>
+          </a:p>
+        </p:txBody>
+      </p:sp>
       <p:pic>
         <p:nvPicPr>
-          <p:cNvPr id="7" name="Imagem 6" descr="Uma imagem contendo Logotipo&#10;&#10;Descrição gerada automaticamente">
-            <a:extLst>
-              <a:ext uri="{FF2B5EF4-FFF2-40B4-BE49-F238E27FC236}">
-                <a16:creationId xmlns:a16="http://schemas.microsoft.com/office/drawing/2014/main" id="{F9BBF8D2-3E1B-B7AA-B7F7-F877E6CD3936}"/>
+          <p:cNvPr id="8" name="Imagem 7" descr="Gráfico&#10;&#10;Descrição gerada automaticamente com confiança baixa">
+            <a:extLst>
+              <a:ext uri="{FF2B5EF4-FFF2-40B4-BE49-F238E27FC236}">
+                <a16:creationId xmlns:a16="http://schemas.microsoft.com/office/drawing/2014/main" id="{BB1D393E-7ECD-1932-B79D-78716215A03A}"/>
               </a:ext>
             </a:extLst>
           </p:cNvPr>
@@ -4902,7 +6411,7 @@
         </p:blipFill>
         <p:spPr>
           <a:xfrm>
-            <a:off x="6930207" y="1695675"/>
+            <a:off x="1869269" y="1695675"/>
             <a:ext cx="2400000" cy="1800000"/>
           </a:xfrm>
           <a:prstGeom prst="rect">
@@ -4912,10 +6421,10 @@
       </p:pic>
       <p:pic>
         <p:nvPicPr>
-          <p:cNvPr id="9" name="Imagem 8" descr="Uma imagem contendo Logotipo&#10;&#10;Descrição gerada automaticamente">
-            <a:extLst>
-              <a:ext uri="{FF2B5EF4-FFF2-40B4-BE49-F238E27FC236}">
-                <a16:creationId xmlns:a16="http://schemas.microsoft.com/office/drawing/2014/main" id="{12267A65-0551-99B9-3A1D-E960012FA274}"/>
+          <p:cNvPr id="13" name="Imagem 12" descr="Uma imagem contendo Gráfico&#10;&#10;Descrição gerada automaticamente">
+            <a:extLst>
+              <a:ext uri="{FF2B5EF4-FFF2-40B4-BE49-F238E27FC236}">
+                <a16:creationId xmlns:a16="http://schemas.microsoft.com/office/drawing/2014/main" id="{DD964A87-2E5E-E86E-133F-1268486B43F9}"/>
               </a:ext>
             </a:extLst>
           </p:cNvPr>
@@ -4932,7 +6441,7 @@
         </p:blipFill>
         <p:spPr>
           <a:xfrm>
-            <a:off x="1869269" y="1629000"/>
+            <a:off x="6930207" y="1693829"/>
             <a:ext cx="2400000" cy="1800000"/>
           </a:xfrm>
           <a:prstGeom prst="rect">
@@ -4942,10 +6451,10 @@
       </p:pic>
       <p:pic>
         <p:nvPicPr>
-          <p:cNvPr id="11" name="Imagem 10" descr="Texto&#10;&#10;Descrição gerada automaticamente com confiança baixa">
-            <a:extLst>
-              <a:ext uri="{FF2B5EF4-FFF2-40B4-BE49-F238E27FC236}">
-                <a16:creationId xmlns:a16="http://schemas.microsoft.com/office/drawing/2014/main" id="{B2058130-E08F-737A-3770-8673F8B770CC}"/>
+          <p:cNvPr id="15" name="Imagem 14" descr="Texto&#10;&#10;Descrição gerada automaticamente com confiança média">
+            <a:extLst>
+              <a:ext uri="{FF2B5EF4-FFF2-40B4-BE49-F238E27FC236}">
+                <a16:creationId xmlns:a16="http://schemas.microsoft.com/office/drawing/2014/main" id="{F56A0802-1181-2B88-F81B-B6117E3B8B55}"/>
               </a:ext>
             </a:extLst>
           </p:cNvPr>
@@ -4970,97 +6479,6 @@
           </a:prstGeom>
         </p:spPr>
       </p:pic>
-      <p:sp>
-        <p:nvSpPr>
-          <p:cNvPr id="12" name="CaixaDeTexto 11">
-            <a:extLst>
-              <a:ext uri="{FF2B5EF4-FFF2-40B4-BE49-F238E27FC236}">
-                <a16:creationId xmlns:a16="http://schemas.microsoft.com/office/drawing/2014/main" id="{DE7B19A6-F720-5C67-9DF0-36912173E853}"/>
-              </a:ext>
-            </a:extLst>
-          </p:cNvPr>
-          <p:cNvSpPr txBox="1"/>
-          <p:nvPr/>
-        </p:nvSpPr>
-        <p:spPr>
-          <a:xfrm>
-            <a:off x="994846" y="485279"/>
-            <a:ext cx="5015305" cy="461665"/>
-          </a:xfrm>
-          <a:prstGeom prst="rect">
-            <a:avLst/>
-          </a:prstGeom>
-          <a:noFill/>
-        </p:spPr>
-        <p:txBody>
-          <a:bodyPr wrap="square" rtlCol="0">
-            <a:spAutoFit/>
-          </a:bodyPr>
-          <a:lstStyle/>
-          <a:p>
-            <a:r>
-              <a:rPr lang="pt-BR" sz="2400" dirty="0">
-                <a:solidFill>
-                  <a:schemeClr val="bg1"/>
-                </a:solidFill>
-                <a:latin typeface="Uber Move" panose="02010803030201060303" pitchFamily="50" charset="0"/>
-              </a:rPr>
-              <a:t>Data </a:t>
-            </a:r>
-            <a:r>
-              <a:rPr lang="pt-BR" sz="2400" dirty="0" err="1">
-                <a:solidFill>
-                  <a:schemeClr val="bg1"/>
-                </a:solidFill>
-                <a:latin typeface="Uber Move" panose="02010803030201060303" pitchFamily="50" charset="0"/>
-              </a:rPr>
-              <a:t>analysis</a:t>
-            </a:r>
-            <a:r>
-              <a:rPr lang="pt-BR" sz="2400" dirty="0">
-                <a:solidFill>
-                  <a:schemeClr val="bg1"/>
-                </a:solidFill>
-                <a:latin typeface="Uber Move" panose="02010803030201060303" pitchFamily="50" charset="0"/>
-              </a:rPr>
-              <a:t> for </a:t>
-            </a:r>
-            <a:r>
-              <a:rPr lang="pt-BR" sz="2400" dirty="0" err="1">
-                <a:solidFill>
-                  <a:schemeClr val="bg1"/>
-                </a:solidFill>
-                <a:latin typeface="Uber Move" panose="02010803030201060303" pitchFamily="50" charset="0"/>
-              </a:rPr>
-              <a:t>datetime</a:t>
-            </a:r>
-            <a:r>
-              <a:rPr lang="pt-BR" sz="2400" dirty="0">
-                <a:solidFill>
-                  <a:schemeClr val="bg1"/>
-                </a:solidFill>
-                <a:latin typeface="Uber Move" panose="02010803030201060303" pitchFamily="50" charset="0"/>
-              </a:rPr>
-              <a:t> </a:t>
-            </a:r>
-            <a:r>
-              <a:rPr lang="pt-BR" sz="2400" dirty="0" err="1">
-                <a:solidFill>
-                  <a:schemeClr val="bg1"/>
-                </a:solidFill>
-                <a:latin typeface="Uber Move" panose="02010803030201060303" pitchFamily="50" charset="0"/>
-              </a:rPr>
-              <a:t>pickup</a:t>
-            </a:r>
-            <a:endParaRPr lang="pt-BR" sz="2400" dirty="0">
-              <a:solidFill>
-                <a:schemeClr val="bg1"/>
-              </a:solidFill>
-              <a:latin typeface="Uber Move" panose="02010803030201060303" pitchFamily="50" charset="0"/>
-            </a:endParaRPr>
-          </a:p>
-        </p:txBody>
-      </p:sp>
     </p:spTree>
     <p:extLst>
       <p:ext uri="{BB962C8B-B14F-4D97-AF65-F5344CB8AC3E}">
@@ -5071,13 +6489,13 @@
   <p:clrMapOvr>
     <a:masterClrMapping/>
   </p:clrMapOvr>
-  <mc:AlternateContent xmlns:mc="http://schemas.openxmlformats.org/markup-compatibility/2006">
-    <mc:Choice xmlns:p159="http://schemas.microsoft.com/office/powerpoint/2015/09/main" Requires="p159">
+  <mc:AlternateContent xmlns:mc="http://schemas.openxmlformats.org/markup-compatibility/2006" xmlns:p159="http://schemas.microsoft.com/office/powerpoint/2015/09/main">
+    <mc:Choice Requires="p159">
       <p:transition xmlns:p14="http://schemas.microsoft.com/office/powerpoint/2010/main" spd="slow" p14:dur="1250" advClick="0">
         <p159:morph option="byObject"/>
       </p:transition>
     </mc:Choice>
-    <mc:Fallback>
+    <mc:Fallback xmlns="">
       <p:transition spd="slow" advClick="0">
         <p:fade/>
       </p:transition>
@@ -5199,12 +6617,103 @@
           </a:p>
         </p:txBody>
       </p:sp>
+      <p:sp>
+        <p:nvSpPr>
+          <p:cNvPr id="12" name="CaixaDeTexto 11">
+            <a:extLst>
+              <a:ext uri="{FF2B5EF4-FFF2-40B4-BE49-F238E27FC236}">
+                <a16:creationId xmlns:a16="http://schemas.microsoft.com/office/drawing/2014/main" id="{5028BCF3-2B33-6982-A786-1BF07B0F1D90}"/>
+              </a:ext>
+            </a:extLst>
+          </p:cNvPr>
+          <p:cNvSpPr txBox="1"/>
+          <p:nvPr/>
+        </p:nvSpPr>
+        <p:spPr>
+          <a:xfrm>
+            <a:off x="994846" y="485279"/>
+            <a:ext cx="5015305" cy="461665"/>
+          </a:xfrm>
+          <a:prstGeom prst="rect">
+            <a:avLst/>
+          </a:prstGeom>
+          <a:noFill/>
+        </p:spPr>
+        <p:txBody>
+          <a:bodyPr wrap="square" rtlCol="0">
+            <a:spAutoFit/>
+          </a:bodyPr>
+          <a:lstStyle/>
+          <a:p>
+            <a:r>
+              <a:rPr lang="pt-BR" sz="2400" dirty="0">
+                <a:solidFill>
+                  <a:schemeClr val="bg1"/>
+                </a:solidFill>
+                <a:latin typeface="Uber Move" panose="02010803030201060303" pitchFamily="50" charset="0"/>
+              </a:rPr>
+              <a:t>Data </a:t>
+            </a:r>
+            <a:r>
+              <a:rPr lang="pt-BR" sz="2400" dirty="0" err="1">
+                <a:solidFill>
+                  <a:schemeClr val="bg1"/>
+                </a:solidFill>
+                <a:latin typeface="Uber Move" panose="02010803030201060303" pitchFamily="50" charset="0"/>
+              </a:rPr>
+              <a:t>analysis</a:t>
+            </a:r>
+            <a:r>
+              <a:rPr lang="pt-BR" sz="2400" dirty="0">
+                <a:solidFill>
+                  <a:schemeClr val="bg1"/>
+                </a:solidFill>
+                <a:latin typeface="Uber Move" panose="02010803030201060303" pitchFamily="50" charset="0"/>
+              </a:rPr>
+              <a:t> for </a:t>
+            </a:r>
+            <a:r>
+              <a:rPr lang="pt-BR" sz="2400" dirty="0" err="1">
+                <a:solidFill>
+                  <a:schemeClr val="bg1"/>
+                </a:solidFill>
+                <a:latin typeface="Uber Move" panose="02010803030201060303" pitchFamily="50" charset="0"/>
+              </a:rPr>
+              <a:t>datetime</a:t>
+            </a:r>
+            <a:r>
+              <a:rPr lang="pt-BR" sz="2400" dirty="0">
+                <a:solidFill>
+                  <a:schemeClr val="bg1"/>
+                </a:solidFill>
+                <a:latin typeface="Uber Move" panose="02010803030201060303" pitchFamily="50" charset="0"/>
+              </a:rPr>
+              <a:t> </a:t>
+            </a:r>
+            <a:r>
+              <a:rPr lang="pt-BR" sz="2400" dirty="0" err="1">
+                <a:solidFill>
+                  <a:schemeClr val="bg1"/>
+                </a:solidFill>
+                <a:latin typeface="Uber Move" panose="02010803030201060303" pitchFamily="50" charset="0"/>
+              </a:rPr>
+              <a:t>pickup</a:t>
+            </a:r>
+            <a:endParaRPr lang="pt-BR" sz="2400" dirty="0">
+              <a:solidFill>
+                <a:schemeClr val="bg1"/>
+              </a:solidFill>
+              <a:latin typeface="Uber Move" panose="02010803030201060303" pitchFamily="50" charset="0"/>
+            </a:endParaRPr>
+          </a:p>
+        </p:txBody>
+      </p:sp>
       <p:pic>
         <p:nvPicPr>
-          <p:cNvPr id="9" name="Imagem 8" descr="Uma imagem contendo Logotipo&#10;&#10;Descrição gerada automaticamente">
-            <a:extLst>
-              <a:ext uri="{FF2B5EF4-FFF2-40B4-BE49-F238E27FC236}">
-                <a16:creationId xmlns:a16="http://schemas.microsoft.com/office/drawing/2014/main" id="{6C241B36-B31B-60D6-5095-E8204BC9C1C5}"/>
+          <p:cNvPr id="3" name="Imagem 2" descr="Gráfico&#10;&#10;Descrição gerada automaticamente com confiança baixa">
+            <a:extLst>
+              <a:ext uri="{FF2B5EF4-FFF2-40B4-BE49-F238E27FC236}">
+                <a16:creationId xmlns:a16="http://schemas.microsoft.com/office/drawing/2014/main" id="{116A917C-E2E0-3902-6B59-FA4209DB88DE}"/>
               </a:ext>
             </a:extLst>
           </p:cNvPr>
@@ -5221,7 +6730,7 @@
         </p:blipFill>
         <p:spPr>
           <a:xfrm>
-            <a:off x="3186057" y="1310928"/>
+            <a:off x="3216000" y="1506122"/>
             <a:ext cx="5760000" cy="4320000"/>
           </a:xfrm>
           <a:prstGeom prst="rect">
@@ -5229,97 +6738,6 @@
           </a:prstGeom>
         </p:spPr>
       </p:pic>
-      <p:sp>
-        <p:nvSpPr>
-          <p:cNvPr id="12" name="CaixaDeTexto 11">
-            <a:extLst>
-              <a:ext uri="{FF2B5EF4-FFF2-40B4-BE49-F238E27FC236}">
-                <a16:creationId xmlns:a16="http://schemas.microsoft.com/office/drawing/2014/main" id="{5028BCF3-2B33-6982-A786-1BF07B0F1D90}"/>
-              </a:ext>
-            </a:extLst>
-          </p:cNvPr>
-          <p:cNvSpPr txBox="1"/>
-          <p:nvPr/>
-        </p:nvSpPr>
-        <p:spPr>
-          <a:xfrm>
-            <a:off x="994846" y="485279"/>
-            <a:ext cx="5015305" cy="461665"/>
-          </a:xfrm>
-          <a:prstGeom prst="rect">
-            <a:avLst/>
-          </a:prstGeom>
-          <a:noFill/>
-        </p:spPr>
-        <p:txBody>
-          <a:bodyPr wrap="square" rtlCol="0">
-            <a:spAutoFit/>
-          </a:bodyPr>
-          <a:lstStyle/>
-          <a:p>
-            <a:r>
-              <a:rPr lang="pt-BR" sz="2400" dirty="0">
-                <a:solidFill>
-                  <a:schemeClr val="bg1"/>
-                </a:solidFill>
-                <a:latin typeface="Uber Move" panose="02010803030201060303" pitchFamily="50" charset="0"/>
-              </a:rPr>
-              <a:t>Data </a:t>
-            </a:r>
-            <a:r>
-              <a:rPr lang="pt-BR" sz="2400" dirty="0" err="1">
-                <a:solidFill>
-                  <a:schemeClr val="bg1"/>
-                </a:solidFill>
-                <a:latin typeface="Uber Move" panose="02010803030201060303" pitchFamily="50" charset="0"/>
-              </a:rPr>
-              <a:t>analysis</a:t>
-            </a:r>
-            <a:r>
-              <a:rPr lang="pt-BR" sz="2400" dirty="0">
-                <a:solidFill>
-                  <a:schemeClr val="bg1"/>
-                </a:solidFill>
-                <a:latin typeface="Uber Move" panose="02010803030201060303" pitchFamily="50" charset="0"/>
-              </a:rPr>
-              <a:t> for </a:t>
-            </a:r>
-            <a:r>
-              <a:rPr lang="pt-BR" sz="2400" dirty="0" err="1">
-                <a:solidFill>
-                  <a:schemeClr val="bg1"/>
-                </a:solidFill>
-                <a:latin typeface="Uber Move" panose="02010803030201060303" pitchFamily="50" charset="0"/>
-              </a:rPr>
-              <a:t>datetime</a:t>
-            </a:r>
-            <a:r>
-              <a:rPr lang="pt-BR" sz="2400" dirty="0">
-                <a:solidFill>
-                  <a:schemeClr val="bg1"/>
-                </a:solidFill>
-                <a:latin typeface="Uber Move" panose="02010803030201060303" pitchFamily="50" charset="0"/>
-              </a:rPr>
-              <a:t> </a:t>
-            </a:r>
-            <a:r>
-              <a:rPr lang="pt-BR" sz="2400" dirty="0" err="1">
-                <a:solidFill>
-                  <a:schemeClr val="bg1"/>
-                </a:solidFill>
-                <a:latin typeface="Uber Move" panose="02010803030201060303" pitchFamily="50" charset="0"/>
-              </a:rPr>
-              <a:t>pickup</a:t>
-            </a:r>
-            <a:endParaRPr lang="pt-BR" sz="2400" dirty="0">
-              <a:solidFill>
-                <a:schemeClr val="bg1"/>
-              </a:solidFill>
-              <a:latin typeface="Uber Move" panose="02010803030201060303" pitchFamily="50" charset="0"/>
-            </a:endParaRPr>
-          </a:p>
-        </p:txBody>
-      </p:sp>
     </p:spTree>
     <p:extLst>
       <p:ext uri="{BB962C8B-B14F-4D97-AF65-F5344CB8AC3E}">
@@ -5330,13 +6748,13 @@
   <p:clrMapOvr>
     <a:masterClrMapping/>
   </p:clrMapOvr>
-  <mc:AlternateContent xmlns:mc="http://schemas.openxmlformats.org/markup-compatibility/2006">
-    <mc:Choice xmlns:p159="http://schemas.microsoft.com/office/powerpoint/2015/09/main" Requires="p159">
+  <mc:AlternateContent xmlns:mc="http://schemas.openxmlformats.org/markup-compatibility/2006" xmlns:p159="http://schemas.microsoft.com/office/powerpoint/2015/09/main">
+    <mc:Choice Requires="p159">
       <p:transition spd="slow" advClick="0">
         <p159:morph option="byObject"/>
       </p:transition>
     </mc:Choice>
-    <mc:Fallback>
+    <mc:Fallback xmlns="">
       <p:transition spd="slow" advClick="0">
         <p:fade/>
       </p:transition>
@@ -5353,7 +6771,7 @@
         <p:cNvPr id="1" name="">
           <a:extLst>
             <a:ext uri="{FF2B5EF4-FFF2-40B4-BE49-F238E27FC236}">
-              <a16:creationId xmlns:a16="http://schemas.microsoft.com/office/drawing/2014/main" id="{21893D53-9E39-BDCC-5064-78E4E761FAB1}"/>
+              <a16:creationId xmlns:a16="http://schemas.microsoft.com/office/drawing/2014/main" id="{13954EB5-0730-6598-4CCB-75846D65E3C7}"/>
             </a:ext>
           </a:extLst>
         </p:cNvPr>
@@ -5373,7 +6791,7 @@
           <p:cNvPr id="4" name="Retângulo Arredondado 3">
             <a:extLst>
               <a:ext uri="{FF2B5EF4-FFF2-40B4-BE49-F238E27FC236}">
-                <a16:creationId xmlns:a16="http://schemas.microsoft.com/office/drawing/2014/main" id="{7C453DF1-5527-4CE6-92CE-F6786E29E6B2}"/>
+                <a16:creationId xmlns:a16="http://schemas.microsoft.com/office/drawing/2014/main" id="{D936D7A9-9923-BA6E-8EAA-DC45CB8D4F99}"/>
               </a:ext>
             </a:extLst>
           </p:cNvPr>
@@ -5423,7 +6841,7 @@
           <p:cNvPr id="2" name="Título 1">
             <a:extLst>
               <a:ext uri="{FF2B5EF4-FFF2-40B4-BE49-F238E27FC236}">
-                <a16:creationId xmlns:a16="http://schemas.microsoft.com/office/drawing/2014/main" id="{5C061766-2720-6C21-F7DA-1A67E551107F}"/>
+                <a16:creationId xmlns:a16="http://schemas.microsoft.com/office/drawing/2014/main" id="{92D430BD-F368-5EB1-5407-CABAD4EEEC85}"/>
               </a:ext>
             </a:extLst>
           </p:cNvPr>
@@ -5463,7 +6881,7 @@
           <p:cNvPr id="5" name="Imagem 4" descr="Gráfico, Histograma&#10;&#10;Descrição gerada automaticamente">
             <a:extLst>
               <a:ext uri="{FF2B5EF4-FFF2-40B4-BE49-F238E27FC236}">
-                <a16:creationId xmlns:a16="http://schemas.microsoft.com/office/drawing/2014/main" id="{9AEF80B3-5192-327E-AD4F-B49945484743}"/>
+                <a16:creationId xmlns:a16="http://schemas.microsoft.com/office/drawing/2014/main" id="{643F9E35-1647-0023-FE86-42745E801E3F}"/>
               </a:ext>
             </a:extLst>
           </p:cNvPr>
@@ -5488,12 +6906,103 @@
           </a:prstGeom>
         </p:spPr>
       </p:pic>
+      <p:sp>
+        <p:nvSpPr>
+          <p:cNvPr id="12" name="CaixaDeTexto 11">
+            <a:extLst>
+              <a:ext uri="{FF2B5EF4-FFF2-40B4-BE49-F238E27FC236}">
+                <a16:creationId xmlns:a16="http://schemas.microsoft.com/office/drawing/2014/main" id="{CBA42E75-FC2E-7FD7-68B8-A4379215CC17}"/>
+              </a:ext>
+            </a:extLst>
+          </p:cNvPr>
+          <p:cNvSpPr txBox="1"/>
+          <p:nvPr/>
+        </p:nvSpPr>
+        <p:spPr>
+          <a:xfrm>
+            <a:off x="994846" y="485279"/>
+            <a:ext cx="5015305" cy="461665"/>
+          </a:xfrm>
+          <a:prstGeom prst="rect">
+            <a:avLst/>
+          </a:prstGeom>
+          <a:noFill/>
+        </p:spPr>
+        <p:txBody>
+          <a:bodyPr wrap="square" rtlCol="0">
+            <a:spAutoFit/>
+          </a:bodyPr>
+          <a:lstStyle/>
+          <a:p>
+            <a:r>
+              <a:rPr lang="pt-BR" sz="2400" dirty="0">
+                <a:solidFill>
+                  <a:schemeClr val="bg1"/>
+                </a:solidFill>
+                <a:latin typeface="Uber Move" panose="02010803030201060303" pitchFamily="50" charset="0"/>
+              </a:rPr>
+              <a:t>Data </a:t>
+            </a:r>
+            <a:r>
+              <a:rPr lang="pt-BR" sz="2400" dirty="0" err="1">
+                <a:solidFill>
+                  <a:schemeClr val="bg1"/>
+                </a:solidFill>
+                <a:latin typeface="Uber Move" panose="02010803030201060303" pitchFamily="50" charset="0"/>
+              </a:rPr>
+              <a:t>analysis</a:t>
+            </a:r>
+            <a:r>
+              <a:rPr lang="pt-BR" sz="2400" dirty="0">
+                <a:solidFill>
+                  <a:schemeClr val="bg1"/>
+                </a:solidFill>
+                <a:latin typeface="Uber Move" panose="02010803030201060303" pitchFamily="50" charset="0"/>
+              </a:rPr>
+              <a:t> for </a:t>
+            </a:r>
+            <a:r>
+              <a:rPr lang="pt-BR" sz="2400" dirty="0" err="1">
+                <a:solidFill>
+                  <a:schemeClr val="bg1"/>
+                </a:solidFill>
+                <a:latin typeface="Uber Move" panose="02010803030201060303" pitchFamily="50" charset="0"/>
+              </a:rPr>
+              <a:t>datetime</a:t>
+            </a:r>
+            <a:r>
+              <a:rPr lang="pt-BR" sz="2400" dirty="0">
+                <a:solidFill>
+                  <a:schemeClr val="bg1"/>
+                </a:solidFill>
+                <a:latin typeface="Uber Move" panose="02010803030201060303" pitchFamily="50" charset="0"/>
+              </a:rPr>
+              <a:t> </a:t>
+            </a:r>
+            <a:r>
+              <a:rPr lang="pt-BR" sz="2400" dirty="0" err="1">
+                <a:solidFill>
+                  <a:schemeClr val="bg1"/>
+                </a:solidFill>
+                <a:latin typeface="Uber Move" panose="02010803030201060303" pitchFamily="50" charset="0"/>
+              </a:rPr>
+              <a:t>pickup</a:t>
+            </a:r>
+            <a:endParaRPr lang="pt-BR" sz="2400" dirty="0">
+              <a:solidFill>
+                <a:schemeClr val="bg1"/>
+              </a:solidFill>
+              <a:latin typeface="Uber Move" panose="02010803030201060303" pitchFamily="50" charset="0"/>
+            </a:endParaRPr>
+          </a:p>
+        </p:txBody>
+      </p:sp>
       <p:pic>
         <p:nvPicPr>
-          <p:cNvPr id="7" name="Imagem 6" descr="Uma imagem contendo Logotipo&#10;&#10;Descrição gerada automaticamente">
-            <a:extLst>
-              <a:ext uri="{FF2B5EF4-FFF2-40B4-BE49-F238E27FC236}">
-                <a16:creationId xmlns:a16="http://schemas.microsoft.com/office/drawing/2014/main" id="{A2B60BC4-6D5C-1A48-D45D-47563E95D036}"/>
+          <p:cNvPr id="8" name="Imagem 7" descr="Gráfico&#10;&#10;Descrição gerada automaticamente com confiança baixa">
+            <a:extLst>
+              <a:ext uri="{FF2B5EF4-FFF2-40B4-BE49-F238E27FC236}">
+                <a16:creationId xmlns:a16="http://schemas.microsoft.com/office/drawing/2014/main" id="{CEA59109-7621-A138-7AFF-7F53C1072DB1}"/>
               </a:ext>
             </a:extLst>
           </p:cNvPr>
@@ -5510,7 +7019,7 @@
         </p:blipFill>
         <p:spPr>
           <a:xfrm>
-            <a:off x="6930207" y="1695675"/>
+            <a:off x="1869269" y="1695675"/>
             <a:ext cx="2400000" cy="1800000"/>
           </a:xfrm>
           <a:prstGeom prst="rect">
@@ -5520,10 +7029,10 @@
       </p:pic>
       <p:pic>
         <p:nvPicPr>
-          <p:cNvPr id="9" name="Imagem 8" descr="Uma imagem contendo Logotipo&#10;&#10;Descrição gerada automaticamente">
-            <a:extLst>
-              <a:ext uri="{FF2B5EF4-FFF2-40B4-BE49-F238E27FC236}">
-                <a16:creationId xmlns:a16="http://schemas.microsoft.com/office/drawing/2014/main" id="{41D5E59D-F207-A172-BEF2-1D753FC40F2C}"/>
+          <p:cNvPr id="13" name="Imagem 12" descr="Uma imagem contendo Gráfico&#10;&#10;Descrição gerada automaticamente">
+            <a:extLst>
+              <a:ext uri="{FF2B5EF4-FFF2-40B4-BE49-F238E27FC236}">
+                <a16:creationId xmlns:a16="http://schemas.microsoft.com/office/drawing/2014/main" id="{3EB8DD78-D805-A92B-BABB-2753815540C6}"/>
               </a:ext>
             </a:extLst>
           </p:cNvPr>
@@ -5540,7 +7049,7 @@
         </p:blipFill>
         <p:spPr>
           <a:xfrm>
-            <a:off x="1869269" y="1629000"/>
+            <a:off x="6930207" y="1693829"/>
             <a:ext cx="2400000" cy="1800000"/>
           </a:xfrm>
           <a:prstGeom prst="rect">
@@ -5550,10 +7059,10 @@
       </p:pic>
       <p:pic>
         <p:nvPicPr>
-          <p:cNvPr id="11" name="Imagem 10" descr="Texto&#10;&#10;Descrição gerada automaticamente com confiança baixa">
-            <a:extLst>
-              <a:ext uri="{FF2B5EF4-FFF2-40B4-BE49-F238E27FC236}">
-                <a16:creationId xmlns:a16="http://schemas.microsoft.com/office/drawing/2014/main" id="{8A1794BB-E9EF-8E9E-EA92-04A142AD7D84}"/>
+          <p:cNvPr id="15" name="Imagem 14" descr="Texto&#10;&#10;Descrição gerada automaticamente com confiança média">
+            <a:extLst>
+              <a:ext uri="{FF2B5EF4-FFF2-40B4-BE49-F238E27FC236}">
+                <a16:creationId xmlns:a16="http://schemas.microsoft.com/office/drawing/2014/main" id="{AF4C7CCF-0220-EEF5-EF7F-A8E41A1BACE3}"/>
               </a:ext>
             </a:extLst>
           </p:cNvPr>
@@ -5578,101 +7087,10 @@
           </a:prstGeom>
         </p:spPr>
       </p:pic>
-      <p:sp>
-        <p:nvSpPr>
-          <p:cNvPr id="12" name="CaixaDeTexto 11">
-            <a:extLst>
-              <a:ext uri="{FF2B5EF4-FFF2-40B4-BE49-F238E27FC236}">
-                <a16:creationId xmlns:a16="http://schemas.microsoft.com/office/drawing/2014/main" id="{4B75CD16-198C-CEB4-3677-7AF429141505}"/>
-              </a:ext>
-            </a:extLst>
-          </p:cNvPr>
-          <p:cNvSpPr txBox="1"/>
-          <p:nvPr/>
-        </p:nvSpPr>
-        <p:spPr>
-          <a:xfrm>
-            <a:off x="994846" y="485279"/>
-            <a:ext cx="5015305" cy="461665"/>
-          </a:xfrm>
-          <a:prstGeom prst="rect">
-            <a:avLst/>
-          </a:prstGeom>
-          <a:noFill/>
-        </p:spPr>
-        <p:txBody>
-          <a:bodyPr wrap="square" rtlCol="0">
-            <a:spAutoFit/>
-          </a:bodyPr>
-          <a:lstStyle/>
-          <a:p>
-            <a:r>
-              <a:rPr lang="pt-BR" sz="2400" dirty="0">
-                <a:solidFill>
-                  <a:schemeClr val="bg1"/>
-                </a:solidFill>
-                <a:latin typeface="Uber Move" panose="02010803030201060303" pitchFamily="50" charset="0"/>
-              </a:rPr>
-              <a:t>Data </a:t>
-            </a:r>
-            <a:r>
-              <a:rPr lang="pt-BR" sz="2400" dirty="0" err="1">
-                <a:solidFill>
-                  <a:schemeClr val="bg1"/>
-                </a:solidFill>
-                <a:latin typeface="Uber Move" panose="02010803030201060303" pitchFamily="50" charset="0"/>
-              </a:rPr>
-              <a:t>analysis</a:t>
-            </a:r>
-            <a:r>
-              <a:rPr lang="pt-BR" sz="2400" dirty="0">
-                <a:solidFill>
-                  <a:schemeClr val="bg1"/>
-                </a:solidFill>
-                <a:latin typeface="Uber Move" panose="02010803030201060303" pitchFamily="50" charset="0"/>
-              </a:rPr>
-              <a:t> for </a:t>
-            </a:r>
-            <a:r>
-              <a:rPr lang="pt-BR" sz="2400" dirty="0" err="1">
-                <a:solidFill>
-                  <a:schemeClr val="bg1"/>
-                </a:solidFill>
-                <a:latin typeface="Uber Move" panose="02010803030201060303" pitchFamily="50" charset="0"/>
-              </a:rPr>
-              <a:t>datetime</a:t>
-            </a:r>
-            <a:r>
-              <a:rPr lang="pt-BR" sz="2400" dirty="0">
-                <a:solidFill>
-                  <a:schemeClr val="bg1"/>
-                </a:solidFill>
-                <a:latin typeface="Uber Move" panose="02010803030201060303" pitchFamily="50" charset="0"/>
-              </a:rPr>
-              <a:t> </a:t>
-            </a:r>
-            <a:r>
-              <a:rPr lang="pt-BR" sz="2400" dirty="0" err="1">
-                <a:solidFill>
-                  <a:schemeClr val="bg1"/>
-                </a:solidFill>
-                <a:latin typeface="Uber Move" panose="02010803030201060303" pitchFamily="50" charset="0"/>
-              </a:rPr>
-              <a:t>pickup</a:t>
-            </a:r>
-            <a:endParaRPr lang="pt-BR" sz="2400" dirty="0">
-              <a:solidFill>
-                <a:schemeClr val="bg1"/>
-              </a:solidFill>
-              <a:latin typeface="Uber Move" panose="02010803030201060303" pitchFamily="50" charset="0"/>
-            </a:endParaRPr>
-          </a:p>
-        </p:txBody>
-      </p:sp>
     </p:spTree>
     <p:extLst>
       <p:ext uri="{BB962C8B-B14F-4D97-AF65-F5344CB8AC3E}">
-        <p14:creationId xmlns:p14="http://schemas.microsoft.com/office/powerpoint/2010/main" val="3276286486"/>
+        <p14:creationId xmlns:p14="http://schemas.microsoft.com/office/powerpoint/2010/main" val="2231208611"/>
       </p:ext>
     </p:extLst>
   </p:cSld>
@@ -5681,7 +7099,7 @@
   </p:clrMapOvr>
   <mc:AlternateContent xmlns:mc="http://schemas.openxmlformats.org/markup-compatibility/2006">
     <mc:Choice xmlns:p159="http://schemas.microsoft.com/office/powerpoint/2015/09/main" Requires="p159">
-      <p:transition spd="slow" advClick="0">
+      <p:transition xmlns:p14="http://schemas.microsoft.com/office/powerpoint/2010/main" spd="slow" p14:dur="1250" advClick="0">
         <p159:morph option="byObject"/>
       </p:transition>
     </mc:Choice>
@@ -5807,12 +7225,103 @@
           </a:p>
         </p:txBody>
       </p:sp>
+      <p:sp>
+        <p:nvSpPr>
+          <p:cNvPr id="12" name="CaixaDeTexto 11">
+            <a:extLst>
+              <a:ext uri="{FF2B5EF4-FFF2-40B4-BE49-F238E27FC236}">
+                <a16:creationId xmlns:a16="http://schemas.microsoft.com/office/drawing/2014/main" id="{D323D554-2621-BD1E-2F86-F3A364AD6E45}"/>
+              </a:ext>
+            </a:extLst>
+          </p:cNvPr>
+          <p:cNvSpPr txBox="1"/>
+          <p:nvPr/>
+        </p:nvSpPr>
+        <p:spPr>
+          <a:xfrm>
+            <a:off x="994846" y="485279"/>
+            <a:ext cx="5015305" cy="461665"/>
+          </a:xfrm>
+          <a:prstGeom prst="rect">
+            <a:avLst/>
+          </a:prstGeom>
+          <a:noFill/>
+        </p:spPr>
+        <p:txBody>
+          <a:bodyPr wrap="square" rtlCol="0">
+            <a:spAutoFit/>
+          </a:bodyPr>
+          <a:lstStyle/>
+          <a:p>
+            <a:r>
+              <a:rPr lang="pt-BR" sz="2400" dirty="0">
+                <a:solidFill>
+                  <a:schemeClr val="bg1"/>
+                </a:solidFill>
+                <a:latin typeface="Uber Move" panose="02010803030201060303" pitchFamily="50" charset="0"/>
+              </a:rPr>
+              <a:t>Data </a:t>
+            </a:r>
+            <a:r>
+              <a:rPr lang="pt-BR" sz="2400" dirty="0" err="1">
+                <a:solidFill>
+                  <a:schemeClr val="bg1"/>
+                </a:solidFill>
+                <a:latin typeface="Uber Move" panose="02010803030201060303" pitchFamily="50" charset="0"/>
+              </a:rPr>
+              <a:t>analysis</a:t>
+            </a:r>
+            <a:r>
+              <a:rPr lang="pt-BR" sz="2400" dirty="0">
+                <a:solidFill>
+                  <a:schemeClr val="bg1"/>
+                </a:solidFill>
+                <a:latin typeface="Uber Move" panose="02010803030201060303" pitchFamily="50" charset="0"/>
+              </a:rPr>
+              <a:t> for </a:t>
+            </a:r>
+            <a:r>
+              <a:rPr lang="pt-BR" sz="2400" dirty="0" err="1">
+                <a:solidFill>
+                  <a:schemeClr val="bg1"/>
+                </a:solidFill>
+                <a:latin typeface="Uber Move" panose="02010803030201060303" pitchFamily="50" charset="0"/>
+              </a:rPr>
+              <a:t>datetime</a:t>
+            </a:r>
+            <a:r>
+              <a:rPr lang="pt-BR" sz="2400" dirty="0">
+                <a:solidFill>
+                  <a:schemeClr val="bg1"/>
+                </a:solidFill>
+                <a:latin typeface="Uber Move" panose="02010803030201060303" pitchFamily="50" charset="0"/>
+              </a:rPr>
+              <a:t> </a:t>
+            </a:r>
+            <a:r>
+              <a:rPr lang="pt-BR" sz="2400" dirty="0" err="1">
+                <a:solidFill>
+                  <a:schemeClr val="bg1"/>
+                </a:solidFill>
+                <a:latin typeface="Uber Move" panose="02010803030201060303" pitchFamily="50" charset="0"/>
+              </a:rPr>
+              <a:t>pickup</a:t>
+            </a:r>
+            <a:endParaRPr lang="pt-BR" sz="2400" dirty="0">
+              <a:solidFill>
+                <a:schemeClr val="bg1"/>
+              </a:solidFill>
+              <a:latin typeface="Uber Move" panose="02010803030201060303" pitchFamily="50" charset="0"/>
+            </a:endParaRPr>
+          </a:p>
+        </p:txBody>
+      </p:sp>
       <p:pic>
         <p:nvPicPr>
-          <p:cNvPr id="7" name="Imagem 6" descr="Uma imagem contendo Logotipo&#10;&#10;Descrição gerada automaticamente">
-            <a:extLst>
-              <a:ext uri="{FF2B5EF4-FFF2-40B4-BE49-F238E27FC236}">
-                <a16:creationId xmlns:a16="http://schemas.microsoft.com/office/drawing/2014/main" id="{3F5D7651-98A2-4E8F-ABE2-05D9328F1B4C}"/>
+          <p:cNvPr id="5" name="Imagem 4" descr="Uma imagem contendo Gráfico&#10;&#10;Descrição gerada automaticamente">
+            <a:extLst>
+              <a:ext uri="{FF2B5EF4-FFF2-40B4-BE49-F238E27FC236}">
+                <a16:creationId xmlns:a16="http://schemas.microsoft.com/office/drawing/2014/main" id="{7D2F852C-92E8-71E3-A5FE-585243E89100}"/>
               </a:ext>
             </a:extLst>
           </p:cNvPr>
@@ -5829,7 +7338,7 @@
         </p:blipFill>
         <p:spPr>
           <a:xfrm>
-            <a:off x="3130151" y="1269000"/>
+            <a:off x="3214800" y="1506122"/>
             <a:ext cx="5760000" cy="4320000"/>
           </a:xfrm>
           <a:prstGeom prst="rect">
@@ -5837,97 +7346,6 @@
           </a:prstGeom>
         </p:spPr>
       </p:pic>
-      <p:sp>
-        <p:nvSpPr>
-          <p:cNvPr id="12" name="CaixaDeTexto 11">
-            <a:extLst>
-              <a:ext uri="{FF2B5EF4-FFF2-40B4-BE49-F238E27FC236}">
-                <a16:creationId xmlns:a16="http://schemas.microsoft.com/office/drawing/2014/main" id="{D323D554-2621-BD1E-2F86-F3A364AD6E45}"/>
-              </a:ext>
-            </a:extLst>
-          </p:cNvPr>
-          <p:cNvSpPr txBox="1"/>
-          <p:nvPr/>
-        </p:nvSpPr>
-        <p:spPr>
-          <a:xfrm>
-            <a:off x="994846" y="485279"/>
-            <a:ext cx="5015305" cy="461665"/>
-          </a:xfrm>
-          <a:prstGeom prst="rect">
-            <a:avLst/>
-          </a:prstGeom>
-          <a:noFill/>
-        </p:spPr>
-        <p:txBody>
-          <a:bodyPr wrap="square" rtlCol="0">
-            <a:spAutoFit/>
-          </a:bodyPr>
-          <a:lstStyle/>
-          <a:p>
-            <a:r>
-              <a:rPr lang="pt-BR" sz="2400" dirty="0">
-                <a:solidFill>
-                  <a:schemeClr val="bg1"/>
-                </a:solidFill>
-                <a:latin typeface="Uber Move" panose="02010803030201060303" pitchFamily="50" charset="0"/>
-              </a:rPr>
-              <a:t>Data </a:t>
-            </a:r>
-            <a:r>
-              <a:rPr lang="pt-BR" sz="2400" dirty="0" err="1">
-                <a:solidFill>
-                  <a:schemeClr val="bg1"/>
-                </a:solidFill>
-                <a:latin typeface="Uber Move" panose="02010803030201060303" pitchFamily="50" charset="0"/>
-              </a:rPr>
-              <a:t>analysis</a:t>
-            </a:r>
-            <a:r>
-              <a:rPr lang="pt-BR" sz="2400" dirty="0">
-                <a:solidFill>
-                  <a:schemeClr val="bg1"/>
-                </a:solidFill>
-                <a:latin typeface="Uber Move" panose="02010803030201060303" pitchFamily="50" charset="0"/>
-              </a:rPr>
-              <a:t> for </a:t>
-            </a:r>
-            <a:r>
-              <a:rPr lang="pt-BR" sz="2400" dirty="0" err="1">
-                <a:solidFill>
-                  <a:schemeClr val="bg1"/>
-                </a:solidFill>
-                <a:latin typeface="Uber Move" panose="02010803030201060303" pitchFamily="50" charset="0"/>
-              </a:rPr>
-              <a:t>datetime</a:t>
-            </a:r>
-            <a:r>
-              <a:rPr lang="pt-BR" sz="2400" dirty="0">
-                <a:solidFill>
-                  <a:schemeClr val="bg1"/>
-                </a:solidFill>
-                <a:latin typeface="Uber Move" panose="02010803030201060303" pitchFamily="50" charset="0"/>
-              </a:rPr>
-              <a:t> </a:t>
-            </a:r>
-            <a:r>
-              <a:rPr lang="pt-BR" sz="2400" dirty="0" err="1">
-                <a:solidFill>
-                  <a:schemeClr val="bg1"/>
-                </a:solidFill>
-                <a:latin typeface="Uber Move" panose="02010803030201060303" pitchFamily="50" charset="0"/>
-              </a:rPr>
-              <a:t>pickup</a:t>
-            </a:r>
-            <a:endParaRPr lang="pt-BR" sz="2400" dirty="0">
-              <a:solidFill>
-                <a:schemeClr val="bg1"/>
-              </a:solidFill>
-              <a:latin typeface="Uber Move" panose="02010803030201060303" pitchFamily="50" charset="0"/>
-            </a:endParaRPr>
-          </a:p>
-        </p:txBody>
-      </p:sp>
     </p:spTree>
     <p:extLst>
       <p:ext uri="{BB962C8B-B14F-4D97-AF65-F5344CB8AC3E}">
@@ -5938,13 +7356,13 @@
   <p:clrMapOvr>
     <a:masterClrMapping/>
   </p:clrMapOvr>
-  <mc:AlternateContent xmlns:mc="http://schemas.openxmlformats.org/markup-compatibility/2006">
-    <mc:Choice xmlns:p159="http://schemas.microsoft.com/office/powerpoint/2015/09/main" Requires="p159">
+  <mc:AlternateContent xmlns:mc="http://schemas.openxmlformats.org/markup-compatibility/2006" xmlns:p159="http://schemas.microsoft.com/office/powerpoint/2015/09/main">
+    <mc:Choice Requires="p159">
       <p:transition spd="slow" advClick="0">
         <p159:morph option="byObject"/>
       </p:transition>
     </mc:Choice>
-    <mc:Fallback>
+    <mc:Fallback xmlns="">
       <p:transition spd="slow" advClick="0">
         <p:fade/>
       </p:transition>
@@ -5961,7 +7379,7 @@
         <p:cNvPr id="1" name="">
           <a:extLst>
             <a:ext uri="{FF2B5EF4-FFF2-40B4-BE49-F238E27FC236}">
-              <a16:creationId xmlns:a16="http://schemas.microsoft.com/office/drawing/2014/main" id="{CF4C7742-DA57-A2BE-6866-C4443731AE41}"/>
+              <a16:creationId xmlns:a16="http://schemas.microsoft.com/office/drawing/2014/main" id="{DF9A2A8F-5DB6-8ECD-3AB2-1EEC7DD2692E}"/>
             </a:ext>
           </a:extLst>
         </p:cNvPr>
@@ -5981,7 +7399,7 @@
           <p:cNvPr id="4" name="Retângulo Arredondado 3">
             <a:extLst>
               <a:ext uri="{FF2B5EF4-FFF2-40B4-BE49-F238E27FC236}">
-                <a16:creationId xmlns:a16="http://schemas.microsoft.com/office/drawing/2014/main" id="{04D83348-968C-BD3E-8E48-47EE505843C0}"/>
+                <a16:creationId xmlns:a16="http://schemas.microsoft.com/office/drawing/2014/main" id="{68E13387-F592-5E6A-4195-101B093BA942}"/>
               </a:ext>
             </a:extLst>
           </p:cNvPr>
@@ -6031,7 +7449,7 @@
           <p:cNvPr id="2" name="Título 1">
             <a:extLst>
               <a:ext uri="{FF2B5EF4-FFF2-40B4-BE49-F238E27FC236}">
-                <a16:creationId xmlns:a16="http://schemas.microsoft.com/office/drawing/2014/main" id="{10A4E5AF-90FD-76EF-83AF-EA164EA2E73A}"/>
+                <a16:creationId xmlns:a16="http://schemas.microsoft.com/office/drawing/2014/main" id="{032BAAA3-13A3-166A-255A-4CBF33D2EBDF}"/>
               </a:ext>
             </a:extLst>
           </p:cNvPr>
@@ -6071,7 +7489,7 @@
           <p:cNvPr id="5" name="Imagem 4" descr="Gráfico, Histograma&#10;&#10;Descrição gerada automaticamente">
             <a:extLst>
               <a:ext uri="{FF2B5EF4-FFF2-40B4-BE49-F238E27FC236}">
-                <a16:creationId xmlns:a16="http://schemas.microsoft.com/office/drawing/2014/main" id="{61C15C08-D8DB-8515-38FA-15E3824EB77E}"/>
+                <a16:creationId xmlns:a16="http://schemas.microsoft.com/office/drawing/2014/main" id="{5A166EBC-1BCF-D8CC-CD7B-ECA1ECD018DA}"/>
               </a:ext>
             </a:extLst>
           </p:cNvPr>
@@ -6096,12 +7514,103 @@
           </a:prstGeom>
         </p:spPr>
       </p:pic>
+      <p:sp>
+        <p:nvSpPr>
+          <p:cNvPr id="12" name="CaixaDeTexto 11">
+            <a:extLst>
+              <a:ext uri="{FF2B5EF4-FFF2-40B4-BE49-F238E27FC236}">
+                <a16:creationId xmlns:a16="http://schemas.microsoft.com/office/drawing/2014/main" id="{FBE55CBE-BF92-5040-F520-97FC2982A2A2}"/>
+              </a:ext>
+            </a:extLst>
+          </p:cNvPr>
+          <p:cNvSpPr txBox="1"/>
+          <p:nvPr/>
+        </p:nvSpPr>
+        <p:spPr>
+          <a:xfrm>
+            <a:off x="994846" y="485279"/>
+            <a:ext cx="5015305" cy="461665"/>
+          </a:xfrm>
+          <a:prstGeom prst="rect">
+            <a:avLst/>
+          </a:prstGeom>
+          <a:noFill/>
+        </p:spPr>
+        <p:txBody>
+          <a:bodyPr wrap="square" rtlCol="0">
+            <a:spAutoFit/>
+          </a:bodyPr>
+          <a:lstStyle/>
+          <a:p>
+            <a:r>
+              <a:rPr lang="pt-BR" sz="2400" dirty="0">
+                <a:solidFill>
+                  <a:schemeClr val="bg1"/>
+                </a:solidFill>
+                <a:latin typeface="Uber Move" panose="02010803030201060303" pitchFamily="50" charset="0"/>
+              </a:rPr>
+              <a:t>Data </a:t>
+            </a:r>
+            <a:r>
+              <a:rPr lang="pt-BR" sz="2400" dirty="0" err="1">
+                <a:solidFill>
+                  <a:schemeClr val="bg1"/>
+                </a:solidFill>
+                <a:latin typeface="Uber Move" panose="02010803030201060303" pitchFamily="50" charset="0"/>
+              </a:rPr>
+              <a:t>analysis</a:t>
+            </a:r>
+            <a:r>
+              <a:rPr lang="pt-BR" sz="2400" dirty="0">
+                <a:solidFill>
+                  <a:schemeClr val="bg1"/>
+                </a:solidFill>
+                <a:latin typeface="Uber Move" panose="02010803030201060303" pitchFamily="50" charset="0"/>
+              </a:rPr>
+              <a:t> for </a:t>
+            </a:r>
+            <a:r>
+              <a:rPr lang="pt-BR" sz="2400" dirty="0" err="1">
+                <a:solidFill>
+                  <a:schemeClr val="bg1"/>
+                </a:solidFill>
+                <a:latin typeface="Uber Move" panose="02010803030201060303" pitchFamily="50" charset="0"/>
+              </a:rPr>
+              <a:t>datetime</a:t>
+            </a:r>
+            <a:r>
+              <a:rPr lang="pt-BR" sz="2400" dirty="0">
+                <a:solidFill>
+                  <a:schemeClr val="bg1"/>
+                </a:solidFill>
+                <a:latin typeface="Uber Move" panose="02010803030201060303" pitchFamily="50" charset="0"/>
+              </a:rPr>
+              <a:t> </a:t>
+            </a:r>
+            <a:r>
+              <a:rPr lang="pt-BR" sz="2400" dirty="0" err="1">
+                <a:solidFill>
+                  <a:schemeClr val="bg1"/>
+                </a:solidFill>
+                <a:latin typeface="Uber Move" panose="02010803030201060303" pitchFamily="50" charset="0"/>
+              </a:rPr>
+              <a:t>pickup</a:t>
+            </a:r>
+            <a:endParaRPr lang="pt-BR" sz="2400" dirty="0">
+              <a:solidFill>
+                <a:schemeClr val="bg1"/>
+              </a:solidFill>
+              <a:latin typeface="Uber Move" panose="02010803030201060303" pitchFamily="50" charset="0"/>
+            </a:endParaRPr>
+          </a:p>
+        </p:txBody>
+      </p:sp>
       <p:pic>
         <p:nvPicPr>
-          <p:cNvPr id="7" name="Imagem 6" descr="Uma imagem contendo Logotipo&#10;&#10;Descrição gerada automaticamente">
-            <a:extLst>
-              <a:ext uri="{FF2B5EF4-FFF2-40B4-BE49-F238E27FC236}">
-                <a16:creationId xmlns:a16="http://schemas.microsoft.com/office/drawing/2014/main" id="{27F4E6D5-7662-DA2C-97BB-BBB52E090627}"/>
+          <p:cNvPr id="8" name="Imagem 7" descr="Gráfico&#10;&#10;Descrição gerada automaticamente com confiança baixa">
+            <a:extLst>
+              <a:ext uri="{FF2B5EF4-FFF2-40B4-BE49-F238E27FC236}">
+                <a16:creationId xmlns:a16="http://schemas.microsoft.com/office/drawing/2014/main" id="{44748CCF-7F5D-69E7-4188-A6E60F4CF55B}"/>
               </a:ext>
             </a:extLst>
           </p:cNvPr>
@@ -6118,7 +7627,7 @@
         </p:blipFill>
         <p:spPr>
           <a:xfrm>
-            <a:off x="6930207" y="1695675"/>
+            <a:off x="1869269" y="1695675"/>
             <a:ext cx="2400000" cy="1800000"/>
           </a:xfrm>
           <a:prstGeom prst="rect">
@@ -6128,10 +7637,10 @@
       </p:pic>
       <p:pic>
         <p:nvPicPr>
-          <p:cNvPr id="9" name="Imagem 8" descr="Uma imagem contendo Logotipo&#10;&#10;Descrição gerada automaticamente">
-            <a:extLst>
-              <a:ext uri="{FF2B5EF4-FFF2-40B4-BE49-F238E27FC236}">
-                <a16:creationId xmlns:a16="http://schemas.microsoft.com/office/drawing/2014/main" id="{7B5CC9D0-06A2-1AC0-F17E-F3083400FD87}"/>
+          <p:cNvPr id="13" name="Imagem 12" descr="Uma imagem contendo Gráfico&#10;&#10;Descrição gerada automaticamente">
+            <a:extLst>
+              <a:ext uri="{FF2B5EF4-FFF2-40B4-BE49-F238E27FC236}">
+                <a16:creationId xmlns:a16="http://schemas.microsoft.com/office/drawing/2014/main" id="{9C2F20EC-F2B5-E693-80B2-F9620F542AB5}"/>
               </a:ext>
             </a:extLst>
           </p:cNvPr>
@@ -6148,7 +7657,7 @@
         </p:blipFill>
         <p:spPr>
           <a:xfrm>
-            <a:off x="1869269" y="1629000"/>
+            <a:off x="6930207" y="1693829"/>
             <a:ext cx="2400000" cy="1800000"/>
           </a:xfrm>
           <a:prstGeom prst="rect">
@@ -6158,10 +7667,10 @@
       </p:pic>
       <p:pic>
         <p:nvPicPr>
-          <p:cNvPr id="11" name="Imagem 10" descr="Texto&#10;&#10;Descrição gerada automaticamente com confiança baixa">
-            <a:extLst>
-              <a:ext uri="{FF2B5EF4-FFF2-40B4-BE49-F238E27FC236}">
-                <a16:creationId xmlns:a16="http://schemas.microsoft.com/office/drawing/2014/main" id="{F2A90EEE-2845-E84B-3B4E-D51B0893CAD6}"/>
+          <p:cNvPr id="15" name="Imagem 14" descr="Texto&#10;&#10;Descrição gerada automaticamente com confiança média">
+            <a:extLst>
+              <a:ext uri="{FF2B5EF4-FFF2-40B4-BE49-F238E27FC236}">
+                <a16:creationId xmlns:a16="http://schemas.microsoft.com/office/drawing/2014/main" id="{A21044E3-35EB-CC44-7183-675827957527}"/>
               </a:ext>
             </a:extLst>
           </p:cNvPr>
@@ -6186,101 +7695,10 @@
           </a:prstGeom>
         </p:spPr>
       </p:pic>
-      <p:sp>
-        <p:nvSpPr>
-          <p:cNvPr id="12" name="CaixaDeTexto 11">
-            <a:extLst>
-              <a:ext uri="{FF2B5EF4-FFF2-40B4-BE49-F238E27FC236}">
-                <a16:creationId xmlns:a16="http://schemas.microsoft.com/office/drawing/2014/main" id="{0F0442D7-D3A7-063E-5840-6DA261928041}"/>
-              </a:ext>
-            </a:extLst>
-          </p:cNvPr>
-          <p:cNvSpPr txBox="1"/>
-          <p:nvPr/>
-        </p:nvSpPr>
-        <p:spPr>
-          <a:xfrm>
-            <a:off x="994846" y="485279"/>
-            <a:ext cx="5015305" cy="461665"/>
-          </a:xfrm>
-          <a:prstGeom prst="rect">
-            <a:avLst/>
-          </a:prstGeom>
-          <a:noFill/>
-        </p:spPr>
-        <p:txBody>
-          <a:bodyPr wrap="square" rtlCol="0">
-            <a:spAutoFit/>
-          </a:bodyPr>
-          <a:lstStyle/>
-          <a:p>
-            <a:r>
-              <a:rPr lang="pt-BR" sz="2400" dirty="0">
-                <a:solidFill>
-                  <a:schemeClr val="bg1"/>
-                </a:solidFill>
-                <a:latin typeface="Uber Move" panose="02010803030201060303" pitchFamily="50" charset="0"/>
-              </a:rPr>
-              <a:t>Data </a:t>
-            </a:r>
-            <a:r>
-              <a:rPr lang="pt-BR" sz="2400" dirty="0" err="1">
-                <a:solidFill>
-                  <a:schemeClr val="bg1"/>
-                </a:solidFill>
-                <a:latin typeface="Uber Move" panose="02010803030201060303" pitchFamily="50" charset="0"/>
-              </a:rPr>
-              <a:t>analysis</a:t>
-            </a:r>
-            <a:r>
-              <a:rPr lang="pt-BR" sz="2400" dirty="0">
-                <a:solidFill>
-                  <a:schemeClr val="bg1"/>
-                </a:solidFill>
-                <a:latin typeface="Uber Move" panose="02010803030201060303" pitchFamily="50" charset="0"/>
-              </a:rPr>
-              <a:t> for </a:t>
-            </a:r>
-            <a:r>
-              <a:rPr lang="pt-BR" sz="2400" dirty="0" err="1">
-                <a:solidFill>
-                  <a:schemeClr val="bg1"/>
-                </a:solidFill>
-                <a:latin typeface="Uber Move" panose="02010803030201060303" pitchFamily="50" charset="0"/>
-              </a:rPr>
-              <a:t>datetime</a:t>
-            </a:r>
-            <a:r>
-              <a:rPr lang="pt-BR" sz="2400" dirty="0">
-                <a:solidFill>
-                  <a:schemeClr val="bg1"/>
-                </a:solidFill>
-                <a:latin typeface="Uber Move" panose="02010803030201060303" pitchFamily="50" charset="0"/>
-              </a:rPr>
-              <a:t> </a:t>
-            </a:r>
-            <a:r>
-              <a:rPr lang="pt-BR" sz="2400" dirty="0" err="1">
-                <a:solidFill>
-                  <a:schemeClr val="bg1"/>
-                </a:solidFill>
-                <a:latin typeface="Uber Move" panose="02010803030201060303" pitchFamily="50" charset="0"/>
-              </a:rPr>
-              <a:t>pickup</a:t>
-            </a:r>
-            <a:endParaRPr lang="pt-BR" sz="2400" dirty="0">
-              <a:solidFill>
-                <a:schemeClr val="bg1"/>
-              </a:solidFill>
-              <a:latin typeface="Uber Move" panose="02010803030201060303" pitchFamily="50" charset="0"/>
-            </a:endParaRPr>
-          </a:p>
-        </p:txBody>
-      </p:sp>
     </p:spTree>
     <p:extLst>
       <p:ext uri="{BB962C8B-B14F-4D97-AF65-F5344CB8AC3E}">
-        <p14:creationId xmlns:p14="http://schemas.microsoft.com/office/powerpoint/2010/main" val="3433901012"/>
+        <p14:creationId xmlns:p14="http://schemas.microsoft.com/office/powerpoint/2010/main" val="2157326119"/>
       </p:ext>
     </p:extLst>
   </p:cSld>
@@ -6289,7 +7707,7 @@
   </p:clrMapOvr>
   <mc:AlternateContent xmlns:mc="http://schemas.openxmlformats.org/markup-compatibility/2006">
     <mc:Choice xmlns:p159="http://schemas.microsoft.com/office/powerpoint/2015/09/main" Requires="p159">
-      <p:transition spd="slow" advClick="0">
+      <p:transition xmlns:p14="http://schemas.microsoft.com/office/powerpoint/2010/main" spd="slow" p14:dur="1250" advClick="0">
         <p159:morph option="byObject"/>
       </p:transition>
     </mc:Choice>
@@ -6415,12 +7833,152 @@
           </a:p>
         </p:txBody>
       </p:sp>
+      <p:sp>
+        <p:nvSpPr>
+          <p:cNvPr id="12" name="CaixaDeTexto 11">
+            <a:extLst>
+              <a:ext uri="{FF2B5EF4-FFF2-40B4-BE49-F238E27FC236}">
+                <a16:creationId xmlns:a16="http://schemas.microsoft.com/office/drawing/2014/main" id="{A3869ED5-F35D-BAF8-04A5-1C8D76F4F10D}"/>
+              </a:ext>
+            </a:extLst>
+          </p:cNvPr>
+          <p:cNvSpPr txBox="1"/>
+          <p:nvPr/>
+        </p:nvSpPr>
+        <p:spPr>
+          <a:xfrm>
+            <a:off x="994846" y="485279"/>
+            <a:ext cx="5015305" cy="461665"/>
+          </a:xfrm>
+          <a:prstGeom prst="rect">
+            <a:avLst/>
+          </a:prstGeom>
+          <a:noFill/>
+        </p:spPr>
+        <p:txBody>
+          <a:bodyPr wrap="square" rtlCol="0">
+            <a:spAutoFit/>
+          </a:bodyPr>
+          <a:lstStyle/>
+          <a:p>
+            <a:r>
+              <a:rPr lang="pt-BR" sz="2400" dirty="0">
+                <a:solidFill>
+                  <a:schemeClr val="bg1"/>
+                </a:solidFill>
+                <a:latin typeface="Uber Move" panose="02010803030201060303" pitchFamily="50" charset="0"/>
+              </a:rPr>
+              <a:t>Data </a:t>
+            </a:r>
+            <a:r>
+              <a:rPr lang="pt-BR" sz="2400" dirty="0" err="1">
+                <a:solidFill>
+                  <a:schemeClr val="bg1"/>
+                </a:solidFill>
+                <a:latin typeface="Uber Move" panose="02010803030201060303" pitchFamily="50" charset="0"/>
+              </a:rPr>
+              <a:t>analysis</a:t>
+            </a:r>
+            <a:r>
+              <a:rPr lang="pt-BR" sz="2400" dirty="0">
+                <a:solidFill>
+                  <a:schemeClr val="bg1"/>
+                </a:solidFill>
+                <a:latin typeface="Uber Move" panose="02010803030201060303" pitchFamily="50" charset="0"/>
+              </a:rPr>
+              <a:t> for </a:t>
+            </a:r>
+            <a:r>
+              <a:rPr lang="pt-BR" sz="2400" dirty="0" err="1">
+                <a:solidFill>
+                  <a:schemeClr val="bg1"/>
+                </a:solidFill>
+                <a:latin typeface="Uber Move" panose="02010803030201060303" pitchFamily="50" charset="0"/>
+              </a:rPr>
+              <a:t>datetime</a:t>
+            </a:r>
+            <a:r>
+              <a:rPr lang="pt-BR" sz="2400" dirty="0">
+                <a:solidFill>
+                  <a:schemeClr val="bg1"/>
+                </a:solidFill>
+                <a:latin typeface="Uber Move" panose="02010803030201060303" pitchFamily="50" charset="0"/>
+              </a:rPr>
+              <a:t> </a:t>
+            </a:r>
+            <a:r>
+              <a:rPr lang="pt-BR" sz="2400" dirty="0" err="1">
+                <a:solidFill>
+                  <a:schemeClr val="bg1"/>
+                </a:solidFill>
+                <a:latin typeface="Uber Move" panose="02010803030201060303" pitchFamily="50" charset="0"/>
+              </a:rPr>
+              <a:t>pickup</a:t>
+            </a:r>
+            <a:endParaRPr lang="pt-BR" sz="2400" dirty="0">
+              <a:solidFill>
+                <a:schemeClr val="bg1"/>
+              </a:solidFill>
+              <a:latin typeface="Uber Move" panose="02010803030201060303" pitchFamily="50" charset="0"/>
+            </a:endParaRPr>
+          </a:p>
+        </p:txBody>
+      </p:sp>
+      <p:sp>
+        <p:nvSpPr>
+          <p:cNvPr id="3" name="CaixaDeTexto 2">
+            <a:extLst>
+              <a:ext uri="{FF2B5EF4-FFF2-40B4-BE49-F238E27FC236}">
+                <a16:creationId xmlns:a16="http://schemas.microsoft.com/office/drawing/2014/main" id="{9D5EDF26-FF13-B118-F29A-19562EAD292C}"/>
+              </a:ext>
+            </a:extLst>
+          </p:cNvPr>
+          <p:cNvSpPr txBox="1"/>
+          <p:nvPr/>
+        </p:nvSpPr>
+        <p:spPr>
+          <a:xfrm>
+            <a:off x="-92765" y="6372721"/>
+            <a:ext cx="6957391" cy="461665"/>
+          </a:xfrm>
+          <a:prstGeom prst="rect">
+            <a:avLst/>
+          </a:prstGeom>
+          <a:noFill/>
+        </p:spPr>
+        <p:txBody>
+          <a:bodyPr wrap="square" rtlCol="0">
+            <a:spAutoFit/>
+          </a:bodyPr>
+          <a:lstStyle/>
+          <a:p>
+            <a:r>
+              <a:rPr lang="pt-BR" sz="1200" dirty="0" err="1">
+                <a:solidFill>
+                  <a:schemeClr val="bg1"/>
+                </a:solidFill>
+                <a:latin typeface="Uber Move Medium" panose="02010603030201060303" pitchFamily="50" charset="0"/>
+              </a:rPr>
+              <a:t>Source</a:t>
+            </a:r>
+            <a:r>
+              <a:rPr lang="pt-BR" sz="1200" dirty="0">
+                <a:solidFill>
+                  <a:schemeClr val="bg1"/>
+                </a:solidFill>
+                <a:latin typeface="Uber Move Medium" panose="02010603030201060303" pitchFamily="50" charset="0"/>
+              </a:rPr>
+              <a:t>: https://capital.sp.gov.br/w/noticia/prefeitura-divulga-calendario-de-feriados-pontos-facultativos-e-suspensao-de-expediente-para-2024</a:t>
+            </a:r>
+          </a:p>
+        </p:txBody>
+      </p:sp>
       <p:pic>
         <p:nvPicPr>
-          <p:cNvPr id="11" name="Imagem 10" descr="Texto&#10;&#10;Descrição gerada automaticamente com confiança baixa">
-            <a:extLst>
-              <a:ext uri="{FF2B5EF4-FFF2-40B4-BE49-F238E27FC236}">
-                <a16:creationId xmlns:a16="http://schemas.microsoft.com/office/drawing/2014/main" id="{D2A82290-940A-2158-DD80-5AA6236A75B6}"/>
+          <p:cNvPr id="5" name="Imagem 4" descr="Texto&#10;&#10;Descrição gerada automaticamente com confiança média">
+            <a:extLst>
+              <a:ext uri="{FF2B5EF4-FFF2-40B4-BE49-F238E27FC236}">
+                <a16:creationId xmlns:a16="http://schemas.microsoft.com/office/drawing/2014/main" id="{92E0C5CD-BEE2-040A-3D52-039E8200076F}"/>
               </a:ext>
             </a:extLst>
           </p:cNvPr>
@@ -6437,7 +7995,7 @@
         </p:blipFill>
         <p:spPr>
           <a:xfrm>
-            <a:off x="2911090" y="1348806"/>
+            <a:off x="3214800" y="1504800"/>
             <a:ext cx="5760000" cy="4320000"/>
           </a:xfrm>
           <a:prstGeom prst="rect">
@@ -6445,97 +8003,6 @@
           </a:prstGeom>
         </p:spPr>
       </p:pic>
-      <p:sp>
-        <p:nvSpPr>
-          <p:cNvPr id="12" name="CaixaDeTexto 11">
-            <a:extLst>
-              <a:ext uri="{FF2B5EF4-FFF2-40B4-BE49-F238E27FC236}">
-                <a16:creationId xmlns:a16="http://schemas.microsoft.com/office/drawing/2014/main" id="{A3869ED5-F35D-BAF8-04A5-1C8D76F4F10D}"/>
-              </a:ext>
-            </a:extLst>
-          </p:cNvPr>
-          <p:cNvSpPr txBox="1"/>
-          <p:nvPr/>
-        </p:nvSpPr>
-        <p:spPr>
-          <a:xfrm>
-            <a:off x="994846" y="485279"/>
-            <a:ext cx="5015305" cy="461665"/>
-          </a:xfrm>
-          <a:prstGeom prst="rect">
-            <a:avLst/>
-          </a:prstGeom>
-          <a:noFill/>
-        </p:spPr>
-        <p:txBody>
-          <a:bodyPr wrap="square" rtlCol="0">
-            <a:spAutoFit/>
-          </a:bodyPr>
-          <a:lstStyle/>
-          <a:p>
-            <a:r>
-              <a:rPr lang="pt-BR" sz="2400" dirty="0">
-                <a:solidFill>
-                  <a:schemeClr val="bg1"/>
-                </a:solidFill>
-                <a:latin typeface="Uber Move" panose="02010803030201060303" pitchFamily="50" charset="0"/>
-              </a:rPr>
-              <a:t>Data </a:t>
-            </a:r>
-            <a:r>
-              <a:rPr lang="pt-BR" sz="2400" dirty="0" err="1">
-                <a:solidFill>
-                  <a:schemeClr val="bg1"/>
-                </a:solidFill>
-                <a:latin typeface="Uber Move" panose="02010803030201060303" pitchFamily="50" charset="0"/>
-              </a:rPr>
-              <a:t>analysis</a:t>
-            </a:r>
-            <a:r>
-              <a:rPr lang="pt-BR" sz="2400" dirty="0">
-                <a:solidFill>
-                  <a:schemeClr val="bg1"/>
-                </a:solidFill>
-                <a:latin typeface="Uber Move" panose="02010803030201060303" pitchFamily="50" charset="0"/>
-              </a:rPr>
-              <a:t> for </a:t>
-            </a:r>
-            <a:r>
-              <a:rPr lang="pt-BR" sz="2400" dirty="0" err="1">
-                <a:solidFill>
-                  <a:schemeClr val="bg1"/>
-                </a:solidFill>
-                <a:latin typeface="Uber Move" panose="02010803030201060303" pitchFamily="50" charset="0"/>
-              </a:rPr>
-              <a:t>datetime</a:t>
-            </a:r>
-            <a:r>
-              <a:rPr lang="pt-BR" sz="2400" dirty="0">
-                <a:solidFill>
-                  <a:schemeClr val="bg1"/>
-                </a:solidFill>
-                <a:latin typeface="Uber Move" panose="02010803030201060303" pitchFamily="50" charset="0"/>
-              </a:rPr>
-              <a:t> </a:t>
-            </a:r>
-            <a:r>
-              <a:rPr lang="pt-BR" sz="2400" dirty="0" err="1">
-                <a:solidFill>
-                  <a:schemeClr val="bg1"/>
-                </a:solidFill>
-                <a:latin typeface="Uber Move" panose="02010803030201060303" pitchFamily="50" charset="0"/>
-              </a:rPr>
-              <a:t>pickup</a:t>
-            </a:r>
-            <a:endParaRPr lang="pt-BR" sz="2400" dirty="0">
-              <a:solidFill>
-                <a:schemeClr val="bg1"/>
-              </a:solidFill>
-              <a:latin typeface="Uber Move" panose="02010803030201060303" pitchFamily="50" charset="0"/>
-            </a:endParaRPr>
-          </a:p>
-        </p:txBody>
-      </p:sp>
     </p:spTree>
     <p:extLst>
       <p:ext uri="{BB962C8B-B14F-4D97-AF65-F5344CB8AC3E}">
@@ -6546,13 +8013,13 @@
   <p:clrMapOvr>
     <a:masterClrMapping/>
   </p:clrMapOvr>
-  <mc:AlternateContent xmlns:mc="http://schemas.openxmlformats.org/markup-compatibility/2006">
-    <mc:Choice xmlns:p159="http://schemas.microsoft.com/office/powerpoint/2015/09/main" Requires="p159">
+  <mc:AlternateContent xmlns:mc="http://schemas.openxmlformats.org/markup-compatibility/2006" xmlns:p159="http://schemas.microsoft.com/office/powerpoint/2015/09/main">
+    <mc:Choice Requires="p159">
       <p:transition spd="slow" advClick="0">
         <p159:morph option="byObject"/>
       </p:transition>
     </mc:Choice>
-    <mc:Fallback>
+    <mc:Fallback xmlns="">
       <p:transition spd="slow" advClick="0">
         <p:fade/>
       </p:transition>
@@ -6874,4 +8341,319 @@
     </a:ext>
   </a:extLst>
 </a:theme>
+</file>
+
+<file path=ppt/theme/theme2.xml><?xml version="1.0" encoding="utf-8"?>
+<a:theme xmlns:a="http://schemas.openxmlformats.org/drawingml/2006/main" name="Tema do Office">
+  <a:themeElements>
+    <a:clrScheme name="Office">
+      <a:dk1>
+        <a:sysClr val="windowText" lastClr="000000"/>
+      </a:dk1>
+      <a:lt1>
+        <a:sysClr val="window" lastClr="FFFFFF"/>
+      </a:lt1>
+      <a:dk2>
+        <a:srgbClr val="0E2841"/>
+      </a:dk2>
+      <a:lt2>
+        <a:srgbClr val="E8E8E8"/>
+      </a:lt2>
+      <a:accent1>
+        <a:srgbClr val="156082"/>
+      </a:accent1>
+      <a:accent2>
+        <a:srgbClr val="E97132"/>
+      </a:accent2>
+      <a:accent3>
+        <a:srgbClr val="196B24"/>
+      </a:accent3>
+      <a:accent4>
+        <a:srgbClr val="0F9ED5"/>
+      </a:accent4>
+      <a:accent5>
+        <a:srgbClr val="A02B93"/>
+      </a:accent5>
+      <a:accent6>
+        <a:srgbClr val="4EA72E"/>
+      </a:accent6>
+      <a:hlink>
+        <a:srgbClr val="467886"/>
+      </a:hlink>
+      <a:folHlink>
+        <a:srgbClr val="96607D"/>
+      </a:folHlink>
+    </a:clrScheme>
+    <a:fontScheme name="Office">
+      <a:majorFont>
+        <a:latin typeface="Aptos Display" panose="02110004020202020204"/>
+        <a:ea typeface=""/>
+        <a:cs typeface=""/>
+        <a:font script="Jpan" typeface="游ゴシック Light"/>
+        <a:font script="Hang" typeface="맑은 고딕"/>
+        <a:font script="Hans" typeface="等线 Light"/>
+        <a:font script="Hant" typeface="新細明體"/>
+        <a:font script="Arab" typeface="Times New Roman"/>
+        <a:font script="Hebr" typeface="Times New Roman"/>
+        <a:font script="Thai" typeface="Angsana New"/>
+        <a:font script="Ethi" typeface="Nyala"/>
+        <a:font script="Beng" typeface="Vrinda"/>
+        <a:font script="Gujr" typeface="Shruti"/>
+        <a:font script="Khmr" typeface="MoolBoran"/>
+        <a:font script="Knda" typeface="Tunga"/>
+        <a:font script="Guru" typeface="Raavi"/>
+        <a:font script="Cans" typeface="Euphemia"/>
+        <a:font script="Cher" typeface="Plantagenet Cherokee"/>
+        <a:font script="Yiii" typeface="Microsoft Yi Baiti"/>
+        <a:font script="Tibt" typeface="Microsoft Himalaya"/>
+        <a:font script="Thaa" typeface="MV Boli"/>
+        <a:font script="Deva" typeface="Mangal"/>
+        <a:font script="Telu" typeface="Gautami"/>
+        <a:font script="Taml" typeface="Latha"/>
+        <a:font script="Syrc" typeface="Estrangelo Edessa"/>
+        <a:font script="Orya" typeface="Kalinga"/>
+        <a:font script="Mlym" typeface="Kartika"/>
+        <a:font script="Laoo" typeface="DokChampa"/>
+        <a:font script="Sinh" typeface="Iskoola Pota"/>
+        <a:font script="Mong" typeface="Mongolian Baiti"/>
+        <a:font script="Viet" typeface="Times New Roman"/>
+        <a:font script="Uigh" typeface="Microsoft Uighur"/>
+        <a:font script="Geor" typeface="Sylfaen"/>
+        <a:font script="Armn" typeface="Arial"/>
+        <a:font script="Bugi" typeface="Leelawadee UI"/>
+        <a:font script="Bopo" typeface="Microsoft JhengHei"/>
+        <a:font script="Java" typeface="Javanese Text"/>
+        <a:font script="Lisu" typeface="Segoe UI"/>
+        <a:font script="Mymr" typeface="Myanmar Text"/>
+        <a:font script="Nkoo" typeface="Ebrima"/>
+        <a:font script="Olck" typeface="Nirmala UI"/>
+        <a:font script="Osma" typeface="Ebrima"/>
+        <a:font script="Phag" typeface="Phagspa"/>
+        <a:font script="Syrn" typeface="Estrangelo Edessa"/>
+        <a:font script="Syrj" typeface="Estrangelo Edessa"/>
+        <a:font script="Syre" typeface="Estrangelo Edessa"/>
+        <a:font script="Sora" typeface="Nirmala UI"/>
+        <a:font script="Tale" typeface="Microsoft Tai Le"/>
+        <a:font script="Talu" typeface="Microsoft New Tai Lue"/>
+        <a:font script="Tfng" typeface="Ebrima"/>
+      </a:majorFont>
+      <a:minorFont>
+        <a:latin typeface="Aptos" panose="02110004020202020204"/>
+        <a:ea typeface=""/>
+        <a:cs typeface=""/>
+        <a:font script="Jpan" typeface="游ゴシック"/>
+        <a:font script="Hang" typeface="맑은 고딕"/>
+        <a:font script="Hans" typeface="等线"/>
+        <a:font script="Hant" typeface="新細明體"/>
+        <a:font script="Arab" typeface="Arial"/>
+        <a:font script="Hebr" typeface="Arial"/>
+        <a:font script="Thai" typeface="Cordia New"/>
+        <a:font script="Ethi" typeface="Nyala"/>
+        <a:font script="Beng" typeface="Vrinda"/>
+        <a:font script="Gujr" typeface="Shruti"/>
+        <a:font script="Khmr" typeface="DaunPenh"/>
+        <a:font script="Knda" typeface="Tunga"/>
+        <a:font script="Guru" typeface="Raavi"/>
+        <a:font script="Cans" typeface="Euphemia"/>
+        <a:font script="Cher" typeface="Plantagenet Cherokee"/>
+        <a:font script="Yiii" typeface="Microsoft Yi Baiti"/>
+        <a:font script="Tibt" typeface="Microsoft Himalaya"/>
+        <a:font script="Thaa" typeface="MV Boli"/>
+        <a:font script="Deva" typeface="Mangal"/>
+        <a:font script="Telu" typeface="Gautami"/>
+        <a:font script="Taml" typeface="Latha"/>
+        <a:font script="Syrc" typeface="Estrangelo Edessa"/>
+        <a:font script="Orya" typeface="Kalinga"/>
+        <a:font script="Mlym" typeface="Kartika"/>
+        <a:font script="Laoo" typeface="DokChampa"/>
+        <a:font script="Sinh" typeface="Iskoola Pota"/>
+        <a:font script="Mong" typeface="Mongolian Baiti"/>
+        <a:font script="Viet" typeface="Arial"/>
+        <a:font script="Uigh" typeface="Microsoft Uighur"/>
+        <a:font script="Geor" typeface="Sylfaen"/>
+        <a:font script="Armn" typeface="Arial"/>
+        <a:font script="Bugi" typeface="Leelawadee UI"/>
+        <a:font script="Bopo" typeface="Microsoft JhengHei"/>
+        <a:font script="Java" typeface="Javanese Text"/>
+        <a:font script="Lisu" typeface="Segoe UI"/>
+        <a:font script="Mymr" typeface="Myanmar Text"/>
+        <a:font script="Nkoo" typeface="Ebrima"/>
+        <a:font script="Olck" typeface="Nirmala UI"/>
+        <a:font script="Osma" typeface="Ebrima"/>
+        <a:font script="Phag" typeface="Phagspa"/>
+        <a:font script="Syrn" typeface="Estrangelo Edessa"/>
+        <a:font script="Syrj" typeface="Estrangelo Edessa"/>
+        <a:font script="Syre" typeface="Estrangelo Edessa"/>
+        <a:font script="Sora" typeface="Nirmala UI"/>
+        <a:font script="Tale" typeface="Microsoft Tai Le"/>
+        <a:font script="Talu" typeface="Microsoft New Tai Lue"/>
+        <a:font script="Tfng" typeface="Ebrima"/>
+      </a:minorFont>
+    </a:fontScheme>
+    <a:fmtScheme name="Office">
+      <a:fillStyleLst>
+        <a:solidFill>
+          <a:schemeClr val="phClr"/>
+        </a:solidFill>
+        <a:gradFill rotWithShape="1">
+          <a:gsLst>
+            <a:gs pos="0">
+              <a:schemeClr val="phClr">
+                <a:lumMod val="110000"/>
+                <a:satMod val="105000"/>
+                <a:tint val="67000"/>
+              </a:schemeClr>
+            </a:gs>
+            <a:gs pos="50000">
+              <a:schemeClr val="phClr">
+                <a:lumMod val="105000"/>
+                <a:satMod val="103000"/>
+                <a:tint val="73000"/>
+              </a:schemeClr>
+            </a:gs>
+            <a:gs pos="100000">
+              <a:schemeClr val="phClr">
+                <a:lumMod val="105000"/>
+                <a:satMod val="109000"/>
+                <a:tint val="81000"/>
+              </a:schemeClr>
+            </a:gs>
+          </a:gsLst>
+          <a:lin ang="5400000" scaled="0"/>
+        </a:gradFill>
+        <a:gradFill rotWithShape="1">
+          <a:gsLst>
+            <a:gs pos="0">
+              <a:schemeClr val="phClr">
+                <a:satMod val="103000"/>
+                <a:lumMod val="102000"/>
+                <a:tint val="94000"/>
+              </a:schemeClr>
+            </a:gs>
+            <a:gs pos="50000">
+              <a:schemeClr val="phClr">
+                <a:satMod val="110000"/>
+                <a:lumMod val="100000"/>
+                <a:shade val="100000"/>
+              </a:schemeClr>
+            </a:gs>
+            <a:gs pos="100000">
+              <a:schemeClr val="phClr">
+                <a:lumMod val="99000"/>
+                <a:satMod val="120000"/>
+                <a:shade val="78000"/>
+              </a:schemeClr>
+            </a:gs>
+          </a:gsLst>
+          <a:lin ang="5400000" scaled="0"/>
+        </a:gradFill>
+      </a:fillStyleLst>
+      <a:lnStyleLst>
+        <a:ln w="12700" cap="flat" cmpd="sng" algn="ctr">
+          <a:solidFill>
+            <a:schemeClr val="phClr"/>
+          </a:solidFill>
+          <a:prstDash val="solid"/>
+          <a:miter lim="800000"/>
+        </a:ln>
+        <a:ln w="19050" cap="flat" cmpd="sng" algn="ctr">
+          <a:solidFill>
+            <a:schemeClr val="phClr"/>
+          </a:solidFill>
+          <a:prstDash val="solid"/>
+          <a:miter lim="800000"/>
+        </a:ln>
+        <a:ln w="25400" cap="flat" cmpd="sng" algn="ctr">
+          <a:solidFill>
+            <a:schemeClr val="phClr"/>
+          </a:solidFill>
+          <a:prstDash val="solid"/>
+          <a:miter lim="800000"/>
+        </a:ln>
+      </a:lnStyleLst>
+      <a:effectStyleLst>
+        <a:effectStyle>
+          <a:effectLst/>
+        </a:effectStyle>
+        <a:effectStyle>
+          <a:effectLst/>
+        </a:effectStyle>
+        <a:effectStyle>
+          <a:effectLst>
+            <a:outerShdw blurRad="57150" dist="19050" dir="5400000" algn="ctr" rotWithShape="0">
+              <a:srgbClr val="000000">
+                <a:alpha val="63000"/>
+              </a:srgbClr>
+            </a:outerShdw>
+          </a:effectLst>
+        </a:effectStyle>
+      </a:effectStyleLst>
+      <a:bgFillStyleLst>
+        <a:solidFill>
+          <a:schemeClr val="phClr"/>
+        </a:solidFill>
+        <a:solidFill>
+          <a:schemeClr val="phClr">
+            <a:tint val="95000"/>
+            <a:satMod val="170000"/>
+          </a:schemeClr>
+        </a:solidFill>
+        <a:gradFill rotWithShape="1">
+          <a:gsLst>
+            <a:gs pos="0">
+              <a:schemeClr val="phClr">
+                <a:tint val="93000"/>
+                <a:satMod val="150000"/>
+                <a:shade val="98000"/>
+                <a:lumMod val="102000"/>
+              </a:schemeClr>
+            </a:gs>
+            <a:gs pos="50000">
+              <a:schemeClr val="phClr">
+                <a:tint val="98000"/>
+                <a:satMod val="130000"/>
+                <a:shade val="90000"/>
+                <a:lumMod val="103000"/>
+              </a:schemeClr>
+            </a:gs>
+            <a:gs pos="100000">
+              <a:schemeClr val="phClr">
+                <a:shade val="63000"/>
+                <a:satMod val="120000"/>
+              </a:schemeClr>
+            </a:gs>
+          </a:gsLst>
+          <a:lin ang="5400000" scaled="0"/>
+        </a:gradFill>
+      </a:bgFillStyleLst>
+    </a:fmtScheme>
+  </a:themeElements>
+  <a:objectDefaults>
+    <a:lnDef>
+      <a:spPr/>
+      <a:bodyPr/>
+      <a:lstStyle/>
+      <a:style>
+        <a:lnRef idx="2">
+          <a:schemeClr val="accent1"/>
+        </a:lnRef>
+        <a:fillRef idx="0">
+          <a:schemeClr val="accent1"/>
+        </a:fillRef>
+        <a:effectRef idx="1">
+          <a:schemeClr val="accent1"/>
+        </a:effectRef>
+        <a:fontRef idx="minor">
+          <a:schemeClr val="tx1"/>
+        </a:fontRef>
+      </a:style>
+    </a:lnDef>
+  </a:objectDefaults>
+  <a:extraClrSchemeLst/>
+  <a:extLst>
+    <a:ext uri="{05A4C25C-085E-4340-85A3-A5531E510DB2}">
+      <thm15:themeFamily xmlns:thm15="http://schemas.microsoft.com/office/thememl/2012/main" name="Office Theme" id="{2E142A2C-CD16-42D6-873A-C26D2A0506FA}" vid="{1BDDFF52-6CD6-40A5-AB3C-68EB2F1E4D0A}"/>
+    </a:ext>
+  </a:extLst>
+</a:theme>
 </file>
</xml_diff>